<commit_message>
Update poodle presentation slides
</commit_message>
<xml_diff>
--- a/poodle_diagrams.pptx
+++ b/poodle_diagrams.pptx
@@ -5,11 +5,16 @@
     <p:sldMasterId id="2147483648" r:id="rId1"/>
   </p:sldMasterIdLst>
   <p:notesMasterIdLst>
-    <p:notesMasterId r:id="rId4"/>
+    <p:notesMasterId r:id="rId9"/>
   </p:notesMasterIdLst>
   <p:sldIdLst>
-    <p:sldId id="257" r:id="rId2"/>
-    <p:sldId id="256" r:id="rId3"/>
+    <p:sldId id="263" r:id="rId2"/>
+    <p:sldId id="262" r:id="rId3"/>
+    <p:sldId id="258" r:id="rId4"/>
+    <p:sldId id="259" r:id="rId5"/>
+    <p:sldId id="261" r:id="rId6"/>
+    <p:sldId id="256" r:id="rId7"/>
+    <p:sldId id="260" r:id="rId8"/>
   </p:sldIdLst>
   <p:sldSz cx="12192000" cy="6858000"/>
   <p:notesSz cx="6858000" cy="9144000"/>
@@ -108,7 +113,16 @@
       </a:defRPr>
     </a:lvl9pPr>
   </p:defaultTextStyle>
+  <p:extLst>
+    <p:ext uri="{EFAFB233-063F-42B5-8137-9DF3F51BA10A}">
+      <p15:sldGuideLst xmlns:p15="http://schemas.microsoft.com/office/powerpoint/2012/main"/>
+    </p:ext>
+  </p:extLst>
 </p:presentation>
+</file>
+
+<file path=ppt/revisionInfo.xml><?xml version="1.0" encoding="utf-8"?>
+<p1510:revInfo xmlns:a="http://schemas.openxmlformats.org/drawingml/2006/main" xmlns:r="http://schemas.openxmlformats.org/officeDocument/2006/relationships" xmlns:p1510="http://schemas.microsoft.com/office/powerpoint/2015/10/main"/>
 </file>
 
 <file path=ppt/notesMasters/notesMaster1.xml><?xml version="1.0" encoding="utf-8"?>
@@ -193,7 +207,7 @@
           <a:p>
             <a:fld id="{D7151E31-02AE-43D1-BE64-49EDF76833BE}" type="datetimeFigureOut">
               <a:rPr lang="en-US" smtClean="0"/>
-              <a:t>4/1/2018</a:t>
+              <a:t>4/15/2018</a:t>
             </a:fld>
             <a:endParaRPr lang="en-US"/>
           </a:p>
@@ -460,672 +474,6 @@
 </p:notesMaster>
 </file>
 
-<file path=ppt/notesSlides/notesSlide1.xml><?xml version="1.0" encoding="utf-8"?>
-<p:notes xmlns:a="http://schemas.openxmlformats.org/drawingml/2006/main" xmlns:r="http://schemas.openxmlformats.org/officeDocument/2006/relationships" xmlns:p="http://schemas.openxmlformats.org/presentationml/2006/main">
-  <p:cSld>
-    <p:spTree>
-      <p:nvGrpSpPr>
-        <p:cNvPr id="1" name=""/>
-        <p:cNvGrpSpPr/>
-        <p:nvPr/>
-      </p:nvGrpSpPr>
-      <p:grpSpPr>
-        <a:xfrm>
-          <a:off x="0" y="0"/>
-          <a:ext cx="0" cy="0"/>
-          <a:chOff x="0" y="0"/>
-          <a:chExt cx="0" cy="0"/>
-        </a:xfrm>
-      </p:grpSpPr>
-      <p:sp>
-        <p:nvSpPr>
-          <p:cNvPr id="44034" name="Rectangle 7"/>
-          <p:cNvSpPr>
-            <a:spLocks noGrp="1" noChangeArrowheads="1"/>
-          </p:cNvSpPr>
-          <p:nvPr>
-            <p:ph type="sldNum" sz="quarter" idx="5"/>
-          </p:nvPr>
-        </p:nvSpPr>
-        <p:spPr>
-          <a:noFill/>
-        </p:spPr>
-        <p:txBody>
-          <a:bodyPr/>
-          <a:lstStyle/>
-          <a:p>
-            <a:fld id="{155BADCD-40B0-4943-A8D6-6BC32A70B22D}" type="slidenum">
-              <a:rPr lang="en-AU">
-                <a:latin typeface="Arial" pitchFamily="-84" charset="0"/>
-              </a:rPr>
-              <a:pPr/>
-              <a:t>1</a:t>
-            </a:fld>
-            <a:endParaRPr lang="en-AU">
-              <a:latin typeface="Arial" pitchFamily="-84" charset="0"/>
-            </a:endParaRPr>
-          </a:p>
-        </p:txBody>
-      </p:sp>
-      <p:sp>
-        <p:nvSpPr>
-          <p:cNvPr id="44035" name="Rectangle 2"/>
-          <p:cNvSpPr>
-            <a:spLocks noGrp="1" noRot="1" noChangeAspect="1" noChangeArrowheads="1" noTextEdit="1"/>
-          </p:cNvSpPr>
-          <p:nvPr>
-            <p:ph type="sldImg"/>
-          </p:nvPr>
-        </p:nvSpPr>
-        <p:spPr>
-          <a:solidFill>
-            <a:srgbClr val="FFFFFF"/>
-          </a:solidFill>
-          <a:ln/>
-        </p:spPr>
-      </p:sp>
-      <p:sp>
-        <p:nvSpPr>
-          <p:cNvPr id="44036" name="Rectangle 3"/>
-          <p:cNvSpPr>
-            <a:spLocks noGrp="1" noChangeArrowheads="1"/>
-          </p:cNvSpPr>
-          <p:nvPr>
-            <p:ph type="body" idx="1"/>
-          </p:nvPr>
-        </p:nvSpPr>
-        <p:spPr>
-          <a:noFill/>
-          <a:ln/>
-        </p:spPr>
-        <p:txBody>
-          <a:bodyPr/>
-          <a:lstStyle/>
-          <a:p>
-            <a:r>
-              <a:rPr lang="en-US" dirty="0">
-                <a:latin typeface="Arial" pitchFamily="-84" charset="0"/>
-                <a:ea typeface="ＭＳ Ｐゴシック" pitchFamily="-84" charset="-128"/>
-                <a:cs typeface="ＭＳ Ｐゴシック" pitchFamily="-84" charset="-128"/>
-              </a:rPr>
-              <a:t> </a:t>
-            </a:r>
-            <a:r>
-              <a:rPr lang="en-US" dirty="0">
-                <a:highlight>
-                  <a:srgbClr val="FFFF00"/>
-                </a:highlight>
-                <a:latin typeface="Arial" pitchFamily="-84" charset="0"/>
-                <a:ea typeface="ＭＳ Ｐゴシック" pitchFamily="-84" charset="-128"/>
-                <a:cs typeface="ＭＳ Ｐゴシック" pitchFamily="-84" charset="-128"/>
-              </a:rPr>
-              <a:t>To overcome the security deficiencies of ECB, we would like a technique in which</a:t>
-            </a:r>
-          </a:p>
-          <a:p>
-            <a:r>
-              <a:rPr lang="en-US" dirty="0">
-                <a:highlight>
-                  <a:srgbClr val="FFFF00"/>
-                </a:highlight>
-                <a:latin typeface="Arial" pitchFamily="-84" charset="0"/>
-                <a:ea typeface="ＭＳ Ｐゴシック" pitchFamily="-84" charset="-128"/>
-                <a:cs typeface="ＭＳ Ｐゴシック" pitchFamily="-84" charset="-128"/>
-              </a:rPr>
-              <a:t>the same plaintext block, if repeated, produces different </a:t>
-            </a:r>
-            <a:r>
-              <a:rPr lang="en-US" dirty="0" err="1">
-                <a:highlight>
-                  <a:srgbClr val="FFFF00"/>
-                </a:highlight>
-                <a:latin typeface="Arial" pitchFamily="-84" charset="0"/>
-                <a:ea typeface="ＭＳ Ｐゴシック" pitchFamily="-84" charset="-128"/>
-                <a:cs typeface="ＭＳ Ｐゴシック" pitchFamily="-84" charset="-128"/>
-              </a:rPr>
-              <a:t>ciphertext</a:t>
-            </a:r>
-            <a:r>
-              <a:rPr lang="en-US" dirty="0">
-                <a:highlight>
-                  <a:srgbClr val="FFFF00"/>
-                </a:highlight>
-                <a:latin typeface="Arial" pitchFamily="-84" charset="0"/>
-                <a:ea typeface="ＭＳ Ｐゴシック" pitchFamily="-84" charset="-128"/>
-                <a:cs typeface="ＭＳ Ｐゴシック" pitchFamily="-84" charset="-128"/>
-              </a:rPr>
-              <a:t> blocks</a:t>
-            </a:r>
-            <a:r>
-              <a:rPr lang="en-US" dirty="0">
-                <a:latin typeface="Arial" pitchFamily="-84" charset="0"/>
-                <a:ea typeface="ＭＳ Ｐゴシック" pitchFamily="-84" charset="-128"/>
-                <a:cs typeface="ＭＳ Ｐゴシック" pitchFamily="-84" charset="-128"/>
-              </a:rPr>
-              <a:t>. A</a:t>
-            </a:r>
-          </a:p>
-          <a:p>
-            <a:r>
-              <a:rPr lang="en-US" dirty="0">
-                <a:latin typeface="Arial" pitchFamily="-84" charset="0"/>
-                <a:ea typeface="ＭＳ Ｐゴシック" pitchFamily="-84" charset="-128"/>
-                <a:cs typeface="ＭＳ Ｐゴシック" pitchFamily="-84" charset="-128"/>
-              </a:rPr>
-              <a:t>simple way to satisfy this requirement is the cipher block chaining  (CBC ) mode</a:t>
-            </a:r>
-          </a:p>
-          <a:p>
-            <a:r>
-              <a:rPr lang="en-US" dirty="0">
-                <a:latin typeface="Arial" pitchFamily="-84" charset="0"/>
-                <a:ea typeface="ＭＳ Ｐゴシック" pitchFamily="-84" charset="-128"/>
-                <a:cs typeface="ＭＳ Ｐゴシック" pitchFamily="-84" charset="-128"/>
-              </a:rPr>
-              <a:t>(Figure 6.4). In this scheme, the input to the encryption algorithm is the XOR of the</a:t>
-            </a:r>
-          </a:p>
-          <a:p>
-            <a:r>
-              <a:rPr lang="en-US" dirty="0">
-                <a:latin typeface="Arial" pitchFamily="-84" charset="0"/>
-                <a:ea typeface="ＭＳ Ｐゴシック" pitchFamily="-84" charset="-128"/>
-                <a:cs typeface="ＭＳ Ｐゴシック" pitchFamily="-84" charset="-128"/>
-              </a:rPr>
-              <a:t>current plaintext block and the preceding </a:t>
-            </a:r>
-            <a:r>
-              <a:rPr lang="en-US" dirty="0" err="1">
-                <a:latin typeface="Arial" pitchFamily="-84" charset="0"/>
-                <a:ea typeface="ＭＳ Ｐゴシック" pitchFamily="-84" charset="-128"/>
-                <a:cs typeface="ＭＳ Ｐゴシック" pitchFamily="-84" charset="-128"/>
-              </a:rPr>
-              <a:t>ciphertext</a:t>
-            </a:r>
-            <a:r>
-              <a:rPr lang="en-US" dirty="0">
-                <a:latin typeface="Arial" pitchFamily="-84" charset="0"/>
-                <a:ea typeface="ＭＳ Ｐゴシック" pitchFamily="-84" charset="-128"/>
-                <a:cs typeface="ＭＳ Ｐゴシック" pitchFamily="-84" charset="-128"/>
-              </a:rPr>
-              <a:t> block; the same key is used for</a:t>
-            </a:r>
-          </a:p>
-          <a:p>
-            <a:r>
-              <a:rPr lang="en-US" dirty="0">
-                <a:latin typeface="Arial" pitchFamily="-84" charset="0"/>
-                <a:ea typeface="ＭＳ Ｐゴシック" pitchFamily="-84" charset="-128"/>
-                <a:cs typeface="ＭＳ Ｐゴシック" pitchFamily="-84" charset="-128"/>
-              </a:rPr>
-              <a:t>each block. In effect, we have chained together the processing of the sequence of</a:t>
-            </a:r>
-          </a:p>
-          <a:p>
-            <a:r>
-              <a:rPr lang="en-US" dirty="0">
-                <a:latin typeface="Arial" pitchFamily="-84" charset="0"/>
-                <a:ea typeface="ＭＳ Ｐゴシック" pitchFamily="-84" charset="-128"/>
-                <a:cs typeface="ＭＳ Ｐゴシック" pitchFamily="-84" charset="-128"/>
-              </a:rPr>
-              <a:t>plaintext blocks. The input to the encryption function for each plaintext block bears</a:t>
-            </a:r>
-          </a:p>
-          <a:p>
-            <a:r>
-              <a:rPr lang="en-US" dirty="0">
-                <a:latin typeface="Arial" pitchFamily="-84" charset="0"/>
-                <a:ea typeface="ＭＳ Ｐゴシック" pitchFamily="-84" charset="-128"/>
-                <a:cs typeface="ＭＳ Ｐゴシック" pitchFamily="-84" charset="-128"/>
-              </a:rPr>
-              <a:t>no fixed relationship to the plaintext block. Therefore, repeating patterns of b  bits</a:t>
-            </a:r>
-          </a:p>
-          <a:p>
-            <a:r>
-              <a:rPr lang="en-US" dirty="0">
-                <a:latin typeface="Arial" pitchFamily="-84" charset="0"/>
-                <a:ea typeface="ＭＳ Ｐゴシック" pitchFamily="-84" charset="-128"/>
-                <a:cs typeface="ＭＳ Ｐゴシック" pitchFamily="-84" charset="-128"/>
-              </a:rPr>
-              <a:t>are not exposed. As with the ECB mode, the CBC mode requires that the last block</a:t>
-            </a:r>
-          </a:p>
-          <a:p>
-            <a:r>
-              <a:rPr lang="en-US" dirty="0">
-                <a:latin typeface="Arial" pitchFamily="-84" charset="0"/>
-                <a:ea typeface="ＭＳ Ｐゴシック" pitchFamily="-84" charset="-128"/>
-                <a:cs typeface="ＭＳ Ｐゴシック" pitchFamily="-84" charset="-128"/>
-              </a:rPr>
-              <a:t>be padded to a full b  bits if it is a partial block.</a:t>
-            </a:r>
-          </a:p>
-          <a:p>
-            <a:endParaRPr lang="en-US" dirty="0">
-              <a:latin typeface="Arial" pitchFamily="-84" charset="0"/>
-              <a:ea typeface="ＭＳ Ｐゴシック" pitchFamily="-84" charset="-128"/>
-              <a:cs typeface="ＭＳ Ｐゴシック" pitchFamily="-84" charset="-128"/>
-            </a:endParaRPr>
-          </a:p>
-          <a:p>
-            <a:r>
-              <a:rPr lang="en-US" dirty="0">
-                <a:latin typeface="Arial" pitchFamily="-84" charset="0"/>
-                <a:ea typeface="ＭＳ Ｐゴシック" pitchFamily="-84" charset="-128"/>
-                <a:cs typeface="ＭＳ Ｐゴシック" pitchFamily="-84" charset="-128"/>
-              </a:rPr>
-              <a:t>For decryption, each cipher block is passed through the decryption algorithm.</a:t>
-            </a:r>
-          </a:p>
-          <a:p>
-            <a:r>
-              <a:rPr lang="en-US" dirty="0">
-                <a:latin typeface="Arial" pitchFamily="-84" charset="0"/>
-                <a:ea typeface="ＭＳ Ｐゴシック" pitchFamily="-84" charset="-128"/>
-                <a:cs typeface="ＭＳ Ｐゴシック" pitchFamily="-84" charset="-128"/>
-              </a:rPr>
-              <a:t>The result is </a:t>
-            </a:r>
-            <a:r>
-              <a:rPr lang="en-US" dirty="0" err="1">
-                <a:latin typeface="Arial" pitchFamily="-84" charset="0"/>
-                <a:ea typeface="ＭＳ Ｐゴシック" pitchFamily="-84" charset="-128"/>
-                <a:cs typeface="ＭＳ Ｐゴシック" pitchFamily="-84" charset="-128"/>
-              </a:rPr>
-              <a:t>XORed</a:t>
-            </a:r>
-            <a:r>
-              <a:rPr lang="en-US" dirty="0">
-                <a:latin typeface="Arial" pitchFamily="-84" charset="0"/>
-                <a:ea typeface="ＭＳ Ｐゴシック" pitchFamily="-84" charset="-128"/>
-                <a:cs typeface="ＭＳ Ｐゴシック" pitchFamily="-84" charset="-128"/>
-              </a:rPr>
-              <a:t> with the preceding </a:t>
-            </a:r>
-            <a:r>
-              <a:rPr lang="en-US" dirty="0" err="1">
-                <a:latin typeface="Arial" pitchFamily="-84" charset="0"/>
-                <a:ea typeface="ＭＳ Ｐゴシック" pitchFamily="-84" charset="-128"/>
-                <a:cs typeface="ＭＳ Ｐゴシック" pitchFamily="-84" charset="-128"/>
-              </a:rPr>
-              <a:t>ciphertext</a:t>
-            </a:r>
-            <a:r>
-              <a:rPr lang="en-US" dirty="0">
-                <a:latin typeface="Arial" pitchFamily="-84" charset="0"/>
-                <a:ea typeface="ＭＳ Ｐゴシック" pitchFamily="-84" charset="-128"/>
-                <a:cs typeface="ＭＳ Ｐゴシック" pitchFamily="-84" charset="-128"/>
-              </a:rPr>
-              <a:t> block to produce the plaintext</a:t>
-            </a:r>
-          </a:p>
-          <a:p>
-            <a:r>
-              <a:rPr lang="en-US" dirty="0">
-                <a:latin typeface="Arial" pitchFamily="-84" charset="0"/>
-                <a:ea typeface="ＭＳ Ｐゴシック" pitchFamily="-84" charset="-128"/>
-                <a:cs typeface="ＭＳ Ｐゴシック" pitchFamily="-84" charset="-128"/>
-              </a:rPr>
-              <a:t>block.</a:t>
-            </a:r>
-          </a:p>
-          <a:p>
-            <a:endParaRPr lang="en-US" dirty="0">
-              <a:latin typeface="Arial" pitchFamily="-84" charset="0"/>
-              <a:ea typeface="ＭＳ Ｐゴシック" pitchFamily="-84" charset="-128"/>
-              <a:cs typeface="ＭＳ Ｐゴシック" pitchFamily="-84" charset="-128"/>
-            </a:endParaRPr>
-          </a:p>
-          <a:p>
-            <a:r>
-              <a:rPr lang="en-US" dirty="0">
-                <a:latin typeface="Arial" pitchFamily="-84" charset="0"/>
-                <a:ea typeface="ＭＳ Ｐゴシック" pitchFamily="-84" charset="-128"/>
-                <a:cs typeface="ＭＳ Ｐゴシック" pitchFamily="-84" charset="-128"/>
-              </a:rPr>
-              <a:t>To produce the first block of </a:t>
-            </a:r>
-            <a:r>
-              <a:rPr lang="en-US" dirty="0" err="1">
-                <a:latin typeface="Arial" pitchFamily="-84" charset="0"/>
-                <a:ea typeface="ＭＳ Ｐゴシック" pitchFamily="-84" charset="-128"/>
-                <a:cs typeface="ＭＳ Ｐゴシック" pitchFamily="-84" charset="-128"/>
-              </a:rPr>
-              <a:t>ciphertext</a:t>
-            </a:r>
-            <a:r>
-              <a:rPr lang="en-US" dirty="0">
-                <a:latin typeface="Arial" pitchFamily="-84" charset="0"/>
-                <a:ea typeface="ＭＳ Ｐゴシック" pitchFamily="-84" charset="-128"/>
-                <a:cs typeface="ＭＳ Ｐゴシック" pitchFamily="-84" charset="-128"/>
-              </a:rPr>
-              <a:t>, an initialization vector (IV) is </a:t>
-            </a:r>
-            <a:r>
-              <a:rPr lang="en-US" dirty="0" err="1">
-                <a:latin typeface="Arial" pitchFamily="-84" charset="0"/>
-                <a:ea typeface="ＭＳ Ｐゴシック" pitchFamily="-84" charset="-128"/>
-                <a:cs typeface="ＭＳ Ｐゴシック" pitchFamily="-84" charset="-128"/>
-              </a:rPr>
-              <a:t>XORed</a:t>
-            </a:r>
-            <a:endParaRPr lang="en-US" dirty="0">
-              <a:latin typeface="Arial" pitchFamily="-84" charset="0"/>
-              <a:ea typeface="ＭＳ Ｐゴシック" pitchFamily="-84" charset="-128"/>
-              <a:cs typeface="ＭＳ Ｐゴシック" pitchFamily="-84" charset="-128"/>
-            </a:endParaRPr>
-          </a:p>
-          <a:p>
-            <a:r>
-              <a:rPr lang="en-US" dirty="0">
-                <a:latin typeface="Arial" pitchFamily="-84" charset="0"/>
-                <a:ea typeface="ＭＳ Ｐゴシック" pitchFamily="-84" charset="-128"/>
-                <a:cs typeface="ＭＳ Ｐゴシック" pitchFamily="-84" charset="-128"/>
-              </a:rPr>
-              <a:t>with the first block of plaintext. On decryption, the IV is </a:t>
-            </a:r>
-            <a:r>
-              <a:rPr lang="en-US" dirty="0" err="1">
-                <a:latin typeface="Arial" pitchFamily="-84" charset="0"/>
-                <a:ea typeface="ＭＳ Ｐゴシック" pitchFamily="-84" charset="-128"/>
-                <a:cs typeface="ＭＳ Ｐゴシック" pitchFamily="-84" charset="-128"/>
-              </a:rPr>
-              <a:t>XORed</a:t>
-            </a:r>
-            <a:r>
-              <a:rPr lang="en-US" dirty="0">
-                <a:latin typeface="Arial" pitchFamily="-84" charset="0"/>
-                <a:ea typeface="ＭＳ Ｐゴシック" pitchFamily="-84" charset="-128"/>
-                <a:cs typeface="ＭＳ Ｐゴシック" pitchFamily="-84" charset="-128"/>
-              </a:rPr>
-              <a:t> with the output</a:t>
-            </a:r>
-          </a:p>
-          <a:p>
-            <a:r>
-              <a:rPr lang="en-US" dirty="0">
-                <a:latin typeface="Arial" pitchFamily="-84" charset="0"/>
-                <a:ea typeface="ＭＳ Ｐゴシック" pitchFamily="-84" charset="-128"/>
-                <a:cs typeface="ＭＳ Ｐゴシック" pitchFamily="-84" charset="-128"/>
-              </a:rPr>
-              <a:t>of the decryption algorithm to recover the first block of plaintext. The IV is a data</a:t>
-            </a:r>
-          </a:p>
-          <a:p>
-            <a:r>
-              <a:rPr lang="en-US" dirty="0">
-                <a:latin typeface="Arial" pitchFamily="-84" charset="0"/>
-                <a:ea typeface="ＭＳ Ｐゴシック" pitchFamily="-84" charset="-128"/>
-                <a:cs typeface="ＭＳ Ｐゴシック" pitchFamily="-84" charset="-128"/>
-              </a:rPr>
-              <a:t>block that is the same size as the cipher block.</a:t>
-            </a:r>
-          </a:p>
-          <a:p>
-            <a:endParaRPr lang="en-US" dirty="0">
-              <a:latin typeface="Arial" pitchFamily="-84" charset="0"/>
-              <a:ea typeface="ＭＳ Ｐゴシック" pitchFamily="-84" charset="-128"/>
-              <a:cs typeface="ＭＳ Ｐゴシック" pitchFamily="-84" charset="-128"/>
-            </a:endParaRPr>
-          </a:p>
-          <a:p>
-            <a:r>
-              <a:rPr lang="en-US" dirty="0">
-                <a:latin typeface="Arial" pitchFamily="-84" charset="0"/>
-                <a:ea typeface="ＭＳ Ｐゴシック" pitchFamily="-84" charset="-128"/>
-                <a:cs typeface="ＭＳ Ｐゴシック" pitchFamily="-84" charset="-128"/>
-              </a:rPr>
-              <a:t>The IV must be known to both the sender and receiver but be unpredictable</a:t>
-            </a:r>
-          </a:p>
-          <a:p>
-            <a:r>
-              <a:rPr lang="en-US" dirty="0">
-                <a:latin typeface="Arial" pitchFamily="-84" charset="0"/>
-                <a:ea typeface="ＭＳ Ｐゴシック" pitchFamily="-84" charset="-128"/>
-                <a:cs typeface="ＭＳ Ｐゴシック" pitchFamily="-84" charset="-128"/>
-              </a:rPr>
-              <a:t>by a third party. In particular, for any given plaintext, it must not be possible to</a:t>
-            </a:r>
-          </a:p>
-          <a:p>
-            <a:r>
-              <a:rPr lang="en-US" dirty="0">
-                <a:latin typeface="Arial" pitchFamily="-84" charset="0"/>
-                <a:ea typeface="ＭＳ Ｐゴシック" pitchFamily="-84" charset="-128"/>
-                <a:cs typeface="ＭＳ Ｐゴシック" pitchFamily="-84" charset="-128"/>
-              </a:rPr>
-              <a:t>predict the IV that will be associated to the plaintext in advance of the generation</a:t>
-            </a:r>
-          </a:p>
-          <a:p>
-            <a:r>
-              <a:rPr lang="en-US" dirty="0">
-                <a:latin typeface="Arial" pitchFamily="-84" charset="0"/>
-                <a:ea typeface="ＭＳ Ｐゴシック" pitchFamily="-84" charset="-128"/>
-                <a:cs typeface="ＭＳ Ｐゴシック" pitchFamily="-84" charset="-128"/>
-              </a:rPr>
-              <a:t>of the IV. For maximum security, the IV should be protected against unauthorized</a:t>
-            </a:r>
-          </a:p>
-          <a:p>
-            <a:r>
-              <a:rPr lang="en-US" dirty="0">
-                <a:latin typeface="Arial" pitchFamily="-84" charset="0"/>
-                <a:ea typeface="ＭＳ Ｐゴシック" pitchFamily="-84" charset="-128"/>
-                <a:cs typeface="ＭＳ Ｐゴシック" pitchFamily="-84" charset="-128"/>
-              </a:rPr>
-              <a:t>changes. This could be done by sending the IV using ECB encryption. One reason</a:t>
-            </a:r>
-          </a:p>
-          <a:p>
-            <a:r>
-              <a:rPr lang="en-US" dirty="0">
-                <a:latin typeface="Arial" pitchFamily="-84" charset="0"/>
-                <a:ea typeface="ＭＳ Ｐゴシック" pitchFamily="-84" charset="-128"/>
-                <a:cs typeface="ＭＳ Ｐゴシック" pitchFamily="-84" charset="-128"/>
-              </a:rPr>
-              <a:t>for protecting the IV is as follows: </a:t>
-            </a:r>
-            <a:r>
-              <a:rPr lang="en-US" dirty="0">
-                <a:solidFill>
-                  <a:srgbClr val="FF0000"/>
-                </a:solidFill>
-                <a:highlight>
-                  <a:srgbClr val="FFFF00"/>
-                </a:highlight>
-                <a:latin typeface="Arial" pitchFamily="-84" charset="0"/>
-                <a:ea typeface="ＭＳ Ｐゴシック" pitchFamily="-84" charset="-128"/>
-                <a:cs typeface="ＭＳ Ｐゴシック" pitchFamily="-84" charset="-128"/>
-              </a:rPr>
-              <a:t>If an opponent is able to fool the receiver into</a:t>
-            </a:r>
-          </a:p>
-          <a:p>
-            <a:r>
-              <a:rPr lang="en-US" dirty="0">
-                <a:solidFill>
-                  <a:srgbClr val="FF0000"/>
-                </a:solidFill>
-                <a:highlight>
-                  <a:srgbClr val="FFFF00"/>
-                </a:highlight>
-                <a:latin typeface="Arial" pitchFamily="-84" charset="0"/>
-                <a:ea typeface="ＭＳ Ｐゴシック" pitchFamily="-84" charset="-128"/>
-                <a:cs typeface="ＭＳ Ｐゴシック" pitchFamily="-84" charset="-128"/>
-              </a:rPr>
-              <a:t>using a different value for IV, then the opponent is able to invert selected bits in the</a:t>
-            </a:r>
-          </a:p>
-          <a:p>
-            <a:r>
-              <a:rPr lang="en-US" dirty="0">
-                <a:solidFill>
-                  <a:srgbClr val="FF0000"/>
-                </a:solidFill>
-                <a:highlight>
-                  <a:srgbClr val="FFFF00"/>
-                </a:highlight>
-                <a:latin typeface="Arial" pitchFamily="-84" charset="0"/>
-                <a:ea typeface="ＭＳ Ｐゴシック" pitchFamily="-84" charset="-128"/>
-                <a:cs typeface="ＭＳ Ｐゴシック" pitchFamily="-84" charset="-128"/>
-              </a:rPr>
-              <a:t>first block of plaintext.</a:t>
-            </a:r>
-          </a:p>
-          <a:p>
-            <a:endParaRPr lang="en-US" dirty="0">
-              <a:latin typeface="Arial" pitchFamily="-84" charset="0"/>
-              <a:ea typeface="ＭＳ Ｐゴシック" pitchFamily="-84" charset="-128"/>
-              <a:cs typeface="ＭＳ Ｐゴシック" pitchFamily="-84" charset="-128"/>
-            </a:endParaRPr>
-          </a:p>
-          <a:p>
-            <a:r>
-              <a:rPr lang="en-US" dirty="0">
-                <a:latin typeface="Arial" pitchFamily="-84" charset="0"/>
-                <a:ea typeface="ＭＳ Ｐゴシック" pitchFamily="-84" charset="-128"/>
-                <a:cs typeface="ＭＳ Ｐゴシック" pitchFamily="-84" charset="-128"/>
-              </a:rPr>
-              <a:t> So long as it is unpredictable, the specific choice of IV is unimportant.</a:t>
-            </a:r>
-          </a:p>
-          <a:p>
-            <a:r>
-              <a:rPr lang="en-US" dirty="0">
-                <a:latin typeface="Arial" pitchFamily="-84" charset="0"/>
-                <a:ea typeface="ＭＳ Ｐゴシック" pitchFamily="-84" charset="-128"/>
-                <a:cs typeface="ＭＳ Ｐゴシック" pitchFamily="-84" charset="-128"/>
-              </a:rPr>
-              <a:t>SP800-38A recommends two possible methods: The first method is to apply the</a:t>
-            </a:r>
-          </a:p>
-          <a:p>
-            <a:r>
-              <a:rPr lang="en-US" dirty="0">
-                <a:latin typeface="Arial" pitchFamily="-84" charset="0"/>
-                <a:ea typeface="ＭＳ Ｐゴシック" pitchFamily="-84" charset="-128"/>
-                <a:cs typeface="ＭＳ Ｐゴシック" pitchFamily="-84" charset="-128"/>
-              </a:rPr>
-              <a:t>encryption function, under the same key that is used for the encryption of the plaintext,</a:t>
-            </a:r>
-          </a:p>
-          <a:p>
-            <a:r>
-              <a:rPr lang="en-US" dirty="0">
-                <a:latin typeface="Arial" pitchFamily="-84" charset="0"/>
-                <a:ea typeface="ＭＳ Ｐゴシック" pitchFamily="-84" charset="-128"/>
-                <a:cs typeface="ＭＳ Ｐゴシック" pitchFamily="-84" charset="-128"/>
-              </a:rPr>
-              <a:t>to a nonce .  The nonce must be a data block that is unique to each execution of</a:t>
-            </a:r>
-          </a:p>
-          <a:p>
-            <a:r>
-              <a:rPr lang="en-US" dirty="0">
-                <a:latin typeface="Arial" pitchFamily="-84" charset="0"/>
-                <a:ea typeface="ＭＳ Ｐゴシック" pitchFamily="-84" charset="-128"/>
-                <a:cs typeface="ＭＳ Ｐゴシック" pitchFamily="-84" charset="-128"/>
-              </a:rPr>
-              <a:t>the encryption operation. For example, the nonce may be a counter, a timestamp, or</a:t>
-            </a:r>
-          </a:p>
-          <a:p>
-            <a:r>
-              <a:rPr lang="en-US" dirty="0">
-                <a:latin typeface="Arial" pitchFamily="-84" charset="0"/>
-                <a:ea typeface="ＭＳ Ｐゴシック" pitchFamily="-84" charset="-128"/>
-                <a:cs typeface="ＭＳ Ｐゴシック" pitchFamily="-84" charset="-128"/>
-              </a:rPr>
-              <a:t> a message number. The second method is to generate a random data block using a</a:t>
-            </a:r>
-          </a:p>
-          <a:p>
-            <a:r>
-              <a:rPr lang="en-US" dirty="0">
-                <a:latin typeface="Arial" pitchFamily="-84" charset="0"/>
-                <a:ea typeface="ＭＳ Ｐゴシック" pitchFamily="-84" charset="-128"/>
-                <a:cs typeface="ＭＳ Ｐゴシック" pitchFamily="-84" charset="-128"/>
-              </a:rPr>
-              <a:t>random number generator.</a:t>
-            </a:r>
-          </a:p>
-          <a:p>
-            <a:endParaRPr lang="en-US" dirty="0">
-              <a:latin typeface="Arial" pitchFamily="-84" charset="0"/>
-              <a:ea typeface="ＭＳ Ｐゴシック" pitchFamily="-84" charset="-128"/>
-              <a:cs typeface="ＭＳ Ｐゴシック" pitchFamily="-84" charset="-128"/>
-            </a:endParaRPr>
-          </a:p>
-          <a:p>
-            <a:r>
-              <a:rPr lang="en-US" dirty="0">
-                <a:latin typeface="Arial" pitchFamily="-84" charset="0"/>
-                <a:ea typeface="ＭＳ Ｐゴシック" pitchFamily="-84" charset="-128"/>
-                <a:cs typeface="ＭＳ Ｐゴシック" pitchFamily="-84" charset="-128"/>
-              </a:rPr>
-              <a:t>In conclusion, because of the chaining mechanism of CBC, it is an appropriate</a:t>
-            </a:r>
-          </a:p>
-          <a:p>
-            <a:r>
-              <a:rPr lang="en-US" dirty="0">
-                <a:latin typeface="Arial" pitchFamily="-84" charset="0"/>
-                <a:ea typeface="ＭＳ Ｐゴシック" pitchFamily="-84" charset="-128"/>
-                <a:cs typeface="ＭＳ Ｐゴシック" pitchFamily="-84" charset="-128"/>
-              </a:rPr>
-              <a:t>mode for encrypting messages of length greater than b  bits.</a:t>
-            </a:r>
-          </a:p>
-          <a:p>
-            <a:endParaRPr lang="en-US" dirty="0">
-              <a:latin typeface="Arial" pitchFamily="-84" charset="0"/>
-              <a:ea typeface="ＭＳ Ｐゴシック" pitchFamily="-84" charset="-128"/>
-              <a:cs typeface="ＭＳ Ｐゴシック" pitchFamily="-84" charset="-128"/>
-            </a:endParaRPr>
-          </a:p>
-          <a:p>
-            <a:r>
-              <a:rPr lang="en-US" dirty="0">
-                <a:latin typeface="Arial" pitchFamily="-84" charset="0"/>
-                <a:ea typeface="ＭＳ Ｐゴシック" pitchFamily="-84" charset="-128"/>
-                <a:cs typeface="ＭＳ Ｐゴシック" pitchFamily="-84" charset="-128"/>
-              </a:rPr>
-              <a:t>In addition to its use to achieve confidentiality, the CBC mode can be used for</a:t>
-            </a:r>
-          </a:p>
-          <a:p>
-            <a:r>
-              <a:rPr lang="en-US" dirty="0">
-                <a:latin typeface="Arial" pitchFamily="-84" charset="0"/>
-                <a:ea typeface="ＭＳ Ｐゴシック" pitchFamily="-84" charset="-128"/>
-                <a:cs typeface="ＭＳ Ｐゴシック" pitchFamily="-84" charset="-128"/>
-              </a:rPr>
-              <a:t>authentication. This use is described in Chapter 12.</a:t>
-            </a:r>
-            <a:endParaRPr lang="en-AU" dirty="0">
-              <a:latin typeface="Arial" pitchFamily="-84" charset="0"/>
-              <a:ea typeface="ＭＳ Ｐゴシック" pitchFamily="-84" charset="-128"/>
-              <a:cs typeface="ＭＳ Ｐゴシック" pitchFamily="-84" charset="-128"/>
-            </a:endParaRPr>
-          </a:p>
-        </p:txBody>
-      </p:sp>
-    </p:spTree>
-    <p:extLst>
-      <p:ext uri="{BB962C8B-B14F-4D97-AF65-F5344CB8AC3E}">
-        <p14:creationId xmlns:p14="http://schemas.microsoft.com/office/powerpoint/2010/main" val="3207175266"/>
-      </p:ext>
-    </p:extLst>
-  </p:cSld>
-  <p:clrMapOvr>
-    <a:masterClrMapping/>
-  </p:clrMapOvr>
-</p:notes>
-</file>
-
 <file path=ppt/slideLayouts/slideLayout1.xml><?xml version="1.0" encoding="utf-8"?>
 <p:sldLayout xmlns:a="http://schemas.openxmlformats.org/drawingml/2006/main" xmlns:r="http://schemas.openxmlformats.org/officeDocument/2006/relationships" xmlns:p="http://schemas.openxmlformats.org/presentationml/2006/main" type="title" preserve="1">
   <p:cSld name="Title Slide">
@@ -1273,7 +621,7 @@
           <a:p>
             <a:fld id="{A63647DE-AEB3-4529-9A0F-32F40491E286}" type="datetimeFigureOut">
               <a:rPr lang="en-US" smtClean="0"/>
-              <a:t>4/1/2018</a:t>
+              <a:t>4/15/2018</a:t>
             </a:fld>
             <a:endParaRPr lang="en-US"/>
           </a:p>
@@ -1471,7 +819,7 @@
           <a:p>
             <a:fld id="{A63647DE-AEB3-4529-9A0F-32F40491E286}" type="datetimeFigureOut">
               <a:rPr lang="en-US" smtClean="0"/>
-              <a:t>4/1/2018</a:t>
+              <a:t>4/15/2018</a:t>
             </a:fld>
             <a:endParaRPr lang="en-US"/>
           </a:p>
@@ -1679,7 +1027,7 @@
           <a:p>
             <a:fld id="{A63647DE-AEB3-4529-9A0F-32F40491E286}" type="datetimeFigureOut">
               <a:rPr lang="en-US" smtClean="0"/>
-              <a:t>4/1/2018</a:t>
+              <a:t>4/15/2018</a:t>
             </a:fld>
             <a:endParaRPr lang="en-US"/>
           </a:p>
@@ -1877,7 +1225,7 @@
           <a:p>
             <a:fld id="{A63647DE-AEB3-4529-9A0F-32F40491E286}" type="datetimeFigureOut">
               <a:rPr lang="en-US" smtClean="0"/>
-              <a:t>4/1/2018</a:t>
+              <a:t>4/15/2018</a:t>
             </a:fld>
             <a:endParaRPr lang="en-US"/>
           </a:p>
@@ -2152,7 +1500,7 @@
           <a:p>
             <a:fld id="{A63647DE-AEB3-4529-9A0F-32F40491E286}" type="datetimeFigureOut">
               <a:rPr lang="en-US" smtClean="0"/>
-              <a:t>4/1/2018</a:t>
+              <a:t>4/15/2018</a:t>
             </a:fld>
             <a:endParaRPr lang="en-US"/>
           </a:p>
@@ -2417,7 +1765,7 @@
           <a:p>
             <a:fld id="{A63647DE-AEB3-4529-9A0F-32F40491E286}" type="datetimeFigureOut">
               <a:rPr lang="en-US" smtClean="0"/>
-              <a:t>4/1/2018</a:t>
+              <a:t>4/15/2018</a:t>
             </a:fld>
             <a:endParaRPr lang="en-US"/>
           </a:p>
@@ -2829,7 +2177,7 @@
           <a:p>
             <a:fld id="{A63647DE-AEB3-4529-9A0F-32F40491E286}" type="datetimeFigureOut">
               <a:rPr lang="en-US" smtClean="0"/>
-              <a:t>4/1/2018</a:t>
+              <a:t>4/15/2018</a:t>
             </a:fld>
             <a:endParaRPr lang="en-US"/>
           </a:p>
@@ -2970,7 +2318,7 @@
           <a:p>
             <a:fld id="{A63647DE-AEB3-4529-9A0F-32F40491E286}" type="datetimeFigureOut">
               <a:rPr lang="en-US" smtClean="0"/>
-              <a:t>4/1/2018</a:t>
+              <a:t>4/15/2018</a:t>
             </a:fld>
             <a:endParaRPr lang="en-US"/>
           </a:p>
@@ -3083,7 +2431,7 @@
           <a:p>
             <a:fld id="{A63647DE-AEB3-4529-9A0F-32F40491E286}" type="datetimeFigureOut">
               <a:rPr lang="en-US" smtClean="0"/>
-              <a:t>4/1/2018</a:t>
+              <a:t>4/15/2018</a:t>
             </a:fld>
             <a:endParaRPr lang="en-US"/>
           </a:p>
@@ -3394,7 +2742,7 @@
           <a:p>
             <a:fld id="{A63647DE-AEB3-4529-9A0F-32F40491E286}" type="datetimeFigureOut">
               <a:rPr lang="en-US" smtClean="0"/>
-              <a:t>4/1/2018</a:t>
+              <a:t>4/15/2018</a:t>
             </a:fld>
             <a:endParaRPr lang="en-US"/>
           </a:p>
@@ -3682,7 +3030,7 @@
           <a:p>
             <a:fld id="{A63647DE-AEB3-4529-9A0F-32F40491E286}" type="datetimeFigureOut">
               <a:rPr lang="en-US" smtClean="0"/>
-              <a:t>4/1/2018</a:t>
+              <a:t>4/15/2018</a:t>
             </a:fld>
             <a:endParaRPr lang="en-US"/>
           </a:p>
@@ -3923,7 +3271,7 @@
           <a:p>
             <a:fld id="{A63647DE-AEB3-4529-9A0F-32F40491E286}" type="datetimeFigureOut">
               <a:rPr lang="en-US" smtClean="0"/>
-              <a:t>4/1/2018</a:t>
+              <a:t>4/15/2018</a:t>
             </a:fld>
             <a:endParaRPr lang="en-US"/>
           </a:p>
@@ -4342,77 +3690,74 @@
       </p:grpSpPr>
       <p:sp>
         <p:nvSpPr>
-          <p:cNvPr id="43010" name="Rectangle 1026"/>
+          <p:cNvPr id="2" name="Title 1">
+            <a:extLst>
+              <a:ext uri="{FF2B5EF4-FFF2-40B4-BE49-F238E27FC236}">
+                <a16:creationId xmlns:a16="http://schemas.microsoft.com/office/drawing/2014/main" id="{42E0E755-6CEA-4DD3-B7DC-3068811C478E}"/>
+              </a:ext>
+            </a:extLst>
+          </p:cNvPr>
           <p:cNvSpPr>
-            <a:spLocks noGrp="1" noChangeArrowheads="1"/>
+            <a:spLocks noGrp="1"/>
           </p:cNvSpPr>
           <p:nvPr>
-            <p:ph type="title" idx="4294967295"/>
+            <p:ph type="ctrTitle"/>
           </p:nvPr>
         </p:nvSpPr>
-        <p:spPr>
-          <a:xfrm>
-            <a:off x="1524000" y="228600"/>
-            <a:ext cx="2743200" cy="5867400"/>
-          </a:xfrm>
-        </p:spPr>
+        <p:spPr/>
         <p:txBody>
           <a:bodyPr/>
           <a:lstStyle/>
           <a:p>
-            <a:pPr eaLnBrk="1" hangingPunct="1"/>
-            <a:r>
-              <a:rPr lang="en-AU" sz="4800" dirty="0"/>
-              <a:t>Cipher Block Chaining (CBC)</a:t>
-            </a:r>
-          </a:p>
-        </p:txBody>
-      </p:sp>
-      <p:pic>
-        <p:nvPicPr>
-          <p:cNvPr id="43011" name="Picture 3" descr="f4.pdf"/>
-          <p:cNvPicPr>
-            <a:picLocks noChangeAspect="1"/>
-          </p:cNvPicPr>
-          <p:nvPr/>
-        </p:nvPicPr>
-        <p:blipFill>
-          <a:blip r:embed="rId3"/>
-          <a:srcRect l="3529" t="10909" b="8182"/>
-          <a:stretch>
-            <a:fillRect/>
-          </a:stretch>
-        </p:blipFill>
-        <p:spPr bwMode="auto">
-          <a:xfrm>
-            <a:off x="4349750" y="0"/>
-            <a:ext cx="6318250" cy="6858000"/>
-          </a:xfrm>
-          <a:prstGeom prst="rect">
-            <a:avLst/>
-          </a:prstGeom>
-          <a:noFill/>
-          <a:ln w="9525">
-            <a:noFill/>
-            <a:miter lim="800000"/>
-            <a:headEnd/>
-            <a:tailEnd/>
-          </a:ln>
-        </p:spPr>
-      </p:pic>
+            <a:r>
+              <a:rPr lang="en-US" dirty="0"/>
+              <a:t>Padding Attacks</a:t>
+            </a:r>
+            <a:br>
+              <a:rPr lang="en-US" dirty="0"/>
+            </a:br>
+            <a:r>
+              <a:rPr lang="en-US" dirty="0"/>
+              <a:t>POODLE</a:t>
+            </a:r>
+          </a:p>
+        </p:txBody>
+      </p:sp>
+      <p:sp>
+        <p:nvSpPr>
+          <p:cNvPr id="3" name="Subtitle 2">
+            <a:extLst>
+              <a:ext uri="{FF2B5EF4-FFF2-40B4-BE49-F238E27FC236}">
+                <a16:creationId xmlns:a16="http://schemas.microsoft.com/office/drawing/2014/main" id="{D9BCA019-69A6-4D74-B620-77B986499682}"/>
+              </a:ext>
+            </a:extLst>
+          </p:cNvPr>
+          <p:cNvSpPr>
+            <a:spLocks noGrp="1"/>
+          </p:cNvSpPr>
+          <p:nvPr>
+            <p:ph type="subTitle" idx="1"/>
+          </p:nvPr>
+        </p:nvSpPr>
+        <p:spPr/>
+        <p:txBody>
+          <a:bodyPr/>
+          <a:lstStyle/>
+          <a:p>
+            <a:endParaRPr lang="en-US"/>
+          </a:p>
+        </p:txBody>
+      </p:sp>
     </p:spTree>
     <p:extLst>
       <p:ext uri="{BB962C8B-B14F-4D97-AF65-F5344CB8AC3E}">
-        <p14:creationId xmlns:p14="http://schemas.microsoft.com/office/powerpoint/2010/main" val="719835553"/>
+        <p14:creationId xmlns:p14="http://schemas.microsoft.com/office/powerpoint/2010/main" val="4170841019"/>
       </p:ext>
     </p:extLst>
   </p:cSld>
   <p:clrMapOvr>
     <a:masterClrMapping/>
   </p:clrMapOvr>
-  <p:transition spd="med">
-    <p:pull dir="rd"/>
-  </p:transition>
 </p:sld>
 </file>
 
@@ -4433,6 +3778,1541 @@
           <a:chExt cx="0" cy="0"/>
         </a:xfrm>
       </p:grpSpPr>
+      <p:sp>
+        <p:nvSpPr>
+          <p:cNvPr id="2" name="Title 1">
+            <a:extLst>
+              <a:ext uri="{FF2B5EF4-FFF2-40B4-BE49-F238E27FC236}">
+                <a16:creationId xmlns:a16="http://schemas.microsoft.com/office/drawing/2014/main" id="{192D89FB-05EA-420A-A11A-E46B908CCC7A}"/>
+              </a:ext>
+            </a:extLst>
+          </p:cNvPr>
+          <p:cNvSpPr>
+            <a:spLocks noGrp="1"/>
+          </p:cNvSpPr>
+          <p:nvPr>
+            <p:ph type="title"/>
+          </p:nvPr>
+        </p:nvSpPr>
+        <p:spPr>
+          <a:xfrm>
+            <a:off x="716813" y="77942"/>
+            <a:ext cx="10515600" cy="1325563"/>
+          </a:xfrm>
+        </p:spPr>
+        <p:txBody>
+          <a:bodyPr/>
+          <a:lstStyle/>
+          <a:p>
+            <a:r>
+              <a:rPr lang="en-US" dirty="0"/>
+              <a:t>POODLE Attack Overview</a:t>
+            </a:r>
+          </a:p>
+        </p:txBody>
+      </p:sp>
+      <p:sp>
+        <p:nvSpPr>
+          <p:cNvPr id="6" name="Rectangle 5">
+            <a:extLst>
+              <a:ext uri="{FF2B5EF4-FFF2-40B4-BE49-F238E27FC236}">
+                <a16:creationId xmlns:a16="http://schemas.microsoft.com/office/drawing/2014/main" id="{4DE506FF-4E6A-4898-B76B-BF87D476115F}"/>
+              </a:ext>
+            </a:extLst>
+          </p:cNvPr>
+          <p:cNvSpPr/>
+          <p:nvPr/>
+        </p:nvSpPr>
+        <p:spPr>
+          <a:xfrm>
+            <a:off x="838201" y="2060294"/>
+            <a:ext cx="2449010" cy="1782501"/>
+          </a:xfrm>
+          <a:prstGeom prst="rect">
+            <a:avLst/>
+          </a:prstGeom>
+          <a:noFill/>
+          <a:ln>
+            <a:solidFill>
+              <a:schemeClr val="tx1"/>
+            </a:solidFill>
+          </a:ln>
+        </p:spPr>
+        <p:style>
+          <a:lnRef idx="2">
+            <a:schemeClr val="accent1">
+              <a:shade val="50000"/>
+            </a:schemeClr>
+          </a:lnRef>
+          <a:fillRef idx="1">
+            <a:schemeClr val="accent1"/>
+          </a:fillRef>
+          <a:effectRef idx="0">
+            <a:schemeClr val="accent1"/>
+          </a:effectRef>
+          <a:fontRef idx="minor">
+            <a:schemeClr val="lt1"/>
+          </a:fontRef>
+        </p:style>
+        <p:txBody>
+          <a:bodyPr rtlCol="0" anchor="ctr"/>
+          <a:lstStyle/>
+          <a:p>
+            <a:pPr algn="ctr"/>
+            <a:endParaRPr lang="en-US"/>
+          </a:p>
+        </p:txBody>
+      </p:sp>
+      <p:sp>
+        <p:nvSpPr>
+          <p:cNvPr id="7" name="Rectangle 6">
+            <a:extLst>
+              <a:ext uri="{FF2B5EF4-FFF2-40B4-BE49-F238E27FC236}">
+                <a16:creationId xmlns:a16="http://schemas.microsoft.com/office/drawing/2014/main" id="{9F2DAF2B-C6E5-47BB-A305-74D95C61B546}"/>
+              </a:ext>
+            </a:extLst>
+          </p:cNvPr>
+          <p:cNvSpPr/>
+          <p:nvPr/>
+        </p:nvSpPr>
+        <p:spPr>
+          <a:xfrm>
+            <a:off x="922289" y="2149748"/>
+            <a:ext cx="2194193" cy="1261884"/>
+          </a:xfrm>
+          <a:prstGeom prst="rect">
+            <a:avLst/>
+          </a:prstGeom>
+          <a:noFill/>
+        </p:spPr>
+        <p:txBody>
+          <a:bodyPr wrap="square" lIns="91440" tIns="45720" rIns="91440" bIns="45720">
+            <a:spAutoFit/>
+          </a:bodyPr>
+          <a:lstStyle/>
+          <a:p>
+            <a:r>
+              <a:rPr lang="en-US" sz="4400" dirty="0">
+                <a:ln w="0"/>
+                <a:effectLst>
+                  <a:outerShdw blurRad="38100" dist="19050" dir="2700000" algn="tl" rotWithShape="0">
+                    <a:schemeClr val="dk1">
+                      <a:alpha val="40000"/>
+                    </a:schemeClr>
+                  </a:outerShdw>
+                </a:effectLst>
+              </a:rPr>
+              <a:t>Client</a:t>
+            </a:r>
+          </a:p>
+          <a:p>
+            <a:r>
+              <a:rPr lang="en-US" sz="3200" dirty="0">
+                <a:ln w="0"/>
+                <a:effectLst>
+                  <a:outerShdw blurRad="38100" dist="19050" dir="2700000" algn="tl" rotWithShape="0">
+                    <a:schemeClr val="dk1">
+                      <a:alpha val="40000"/>
+                    </a:schemeClr>
+                  </a:outerShdw>
+                </a:effectLst>
+              </a:rPr>
+              <a:t>Browser</a:t>
+            </a:r>
+            <a:endParaRPr lang="en-US" sz="2800" b="0" cap="none" spc="0" dirty="0">
+              <a:ln w="0"/>
+              <a:solidFill>
+                <a:schemeClr val="tx1"/>
+              </a:solidFill>
+              <a:effectLst>
+                <a:outerShdw blurRad="38100" dist="19050" dir="2700000" algn="tl" rotWithShape="0">
+                  <a:schemeClr val="dk1">
+                    <a:alpha val="40000"/>
+                  </a:schemeClr>
+                </a:outerShdw>
+              </a:effectLst>
+            </a:endParaRPr>
+          </a:p>
+        </p:txBody>
+      </p:sp>
+      <p:sp>
+        <p:nvSpPr>
+          <p:cNvPr id="8" name="Rectangle 7">
+            <a:extLst>
+              <a:ext uri="{FF2B5EF4-FFF2-40B4-BE49-F238E27FC236}">
+                <a16:creationId xmlns:a16="http://schemas.microsoft.com/office/drawing/2014/main" id="{B5B08FA1-3555-4AFF-89CC-4072757563AB}"/>
+              </a:ext>
+            </a:extLst>
+          </p:cNvPr>
+          <p:cNvSpPr/>
+          <p:nvPr/>
+        </p:nvSpPr>
+        <p:spPr>
+          <a:xfrm>
+            <a:off x="4791326" y="1488366"/>
+            <a:ext cx="2449010" cy="1782501"/>
+          </a:xfrm>
+          <a:prstGeom prst="rect">
+            <a:avLst/>
+          </a:prstGeom>
+          <a:noFill/>
+          <a:ln>
+            <a:solidFill>
+              <a:schemeClr val="tx1"/>
+            </a:solidFill>
+          </a:ln>
+        </p:spPr>
+        <p:style>
+          <a:lnRef idx="2">
+            <a:schemeClr val="accent1">
+              <a:shade val="50000"/>
+            </a:schemeClr>
+          </a:lnRef>
+          <a:fillRef idx="1">
+            <a:schemeClr val="accent1"/>
+          </a:fillRef>
+          <a:effectRef idx="0">
+            <a:schemeClr val="accent1"/>
+          </a:effectRef>
+          <a:fontRef idx="minor">
+            <a:schemeClr val="lt1"/>
+          </a:fontRef>
+        </p:style>
+        <p:txBody>
+          <a:bodyPr rtlCol="0" anchor="ctr"/>
+          <a:lstStyle/>
+          <a:p>
+            <a:pPr algn="ctr"/>
+            <a:endParaRPr lang="en-US"/>
+          </a:p>
+        </p:txBody>
+      </p:sp>
+      <p:sp>
+        <p:nvSpPr>
+          <p:cNvPr id="9" name="Rectangle 8">
+            <a:extLst>
+              <a:ext uri="{FF2B5EF4-FFF2-40B4-BE49-F238E27FC236}">
+                <a16:creationId xmlns:a16="http://schemas.microsoft.com/office/drawing/2014/main" id="{E543B30F-4A5D-40F4-A19A-C803D264CD3B}"/>
+              </a:ext>
+            </a:extLst>
+          </p:cNvPr>
+          <p:cNvSpPr/>
+          <p:nvPr/>
+        </p:nvSpPr>
+        <p:spPr>
+          <a:xfrm>
+            <a:off x="4791326" y="1658088"/>
+            <a:ext cx="2212520" cy="1261884"/>
+          </a:xfrm>
+          <a:prstGeom prst="rect">
+            <a:avLst/>
+          </a:prstGeom>
+          <a:noFill/>
+        </p:spPr>
+        <p:txBody>
+          <a:bodyPr wrap="square" lIns="91440" tIns="45720" rIns="91440" bIns="45720">
+            <a:spAutoFit/>
+          </a:bodyPr>
+          <a:lstStyle/>
+          <a:p>
+            <a:r>
+              <a:rPr lang="en-US" sz="4400" b="0" cap="none" spc="0" dirty="0">
+                <a:ln w="0"/>
+                <a:solidFill>
+                  <a:schemeClr val="tx1"/>
+                </a:solidFill>
+                <a:effectLst>
+                  <a:outerShdw blurRad="38100" dist="19050" dir="2700000" algn="tl" rotWithShape="0">
+                    <a:schemeClr val="dk1">
+                      <a:alpha val="40000"/>
+                    </a:schemeClr>
+                  </a:outerShdw>
+                </a:effectLst>
+              </a:rPr>
+              <a:t>Attacker</a:t>
+            </a:r>
+          </a:p>
+          <a:p>
+            <a:r>
+              <a:rPr lang="en-US" sz="3200" dirty="0" err="1">
+                <a:ln w="0"/>
+                <a:effectLst>
+                  <a:outerShdw blurRad="38100" dist="19050" dir="2700000" algn="tl" rotWithShape="0">
+                    <a:schemeClr val="dk1">
+                      <a:alpha val="40000"/>
+                    </a:schemeClr>
+                  </a:outerShdw>
+                </a:effectLst>
+              </a:rPr>
+              <a:t>MitM</a:t>
+            </a:r>
+            <a:endParaRPr lang="en-US" sz="3200" dirty="0">
+              <a:ln w="0"/>
+              <a:effectLst>
+                <a:outerShdw blurRad="38100" dist="19050" dir="2700000" algn="tl" rotWithShape="0">
+                  <a:schemeClr val="dk1">
+                    <a:alpha val="40000"/>
+                  </a:schemeClr>
+                </a:outerShdw>
+              </a:effectLst>
+            </a:endParaRPr>
+          </a:p>
+        </p:txBody>
+      </p:sp>
+      <p:sp>
+        <p:nvSpPr>
+          <p:cNvPr id="10" name="Rectangle 9">
+            <a:extLst>
+              <a:ext uri="{FF2B5EF4-FFF2-40B4-BE49-F238E27FC236}">
+                <a16:creationId xmlns:a16="http://schemas.microsoft.com/office/drawing/2014/main" id="{76149543-7631-4BF6-B489-2F8BDCBFF9CC}"/>
+              </a:ext>
+            </a:extLst>
+          </p:cNvPr>
+          <p:cNvSpPr/>
+          <p:nvPr/>
+        </p:nvSpPr>
+        <p:spPr>
+          <a:xfrm>
+            <a:off x="8904790" y="1467353"/>
+            <a:ext cx="2449010" cy="1782501"/>
+          </a:xfrm>
+          <a:prstGeom prst="rect">
+            <a:avLst/>
+          </a:prstGeom>
+          <a:noFill/>
+          <a:ln>
+            <a:solidFill>
+              <a:schemeClr val="tx1"/>
+            </a:solidFill>
+          </a:ln>
+        </p:spPr>
+        <p:style>
+          <a:lnRef idx="2">
+            <a:schemeClr val="accent1">
+              <a:shade val="50000"/>
+            </a:schemeClr>
+          </a:lnRef>
+          <a:fillRef idx="1">
+            <a:schemeClr val="accent1"/>
+          </a:fillRef>
+          <a:effectRef idx="0">
+            <a:schemeClr val="accent1"/>
+          </a:effectRef>
+          <a:fontRef idx="minor">
+            <a:schemeClr val="lt1"/>
+          </a:fontRef>
+        </p:style>
+        <p:txBody>
+          <a:bodyPr rtlCol="0" anchor="ctr"/>
+          <a:lstStyle/>
+          <a:p>
+            <a:pPr algn="ctr"/>
+            <a:endParaRPr lang="en-US"/>
+          </a:p>
+        </p:txBody>
+      </p:sp>
+      <p:sp>
+        <p:nvSpPr>
+          <p:cNvPr id="11" name="Rectangle 10">
+            <a:extLst>
+              <a:ext uri="{FF2B5EF4-FFF2-40B4-BE49-F238E27FC236}">
+                <a16:creationId xmlns:a16="http://schemas.microsoft.com/office/drawing/2014/main" id="{609E4D53-4EEE-445D-AC5C-248EAFF08793}"/>
+              </a:ext>
+            </a:extLst>
+          </p:cNvPr>
+          <p:cNvSpPr/>
+          <p:nvPr/>
+        </p:nvSpPr>
+        <p:spPr>
+          <a:xfrm>
+            <a:off x="8904790" y="1556807"/>
+            <a:ext cx="2449010" cy="1077218"/>
+          </a:xfrm>
+          <a:prstGeom prst="rect">
+            <a:avLst/>
+          </a:prstGeom>
+          <a:noFill/>
+        </p:spPr>
+        <p:txBody>
+          <a:bodyPr wrap="square" lIns="91440" tIns="45720" rIns="91440" bIns="45720">
+            <a:spAutoFit/>
+          </a:bodyPr>
+          <a:lstStyle/>
+          <a:p>
+            <a:r>
+              <a:rPr lang="en-US" sz="3200" b="0" cap="none" spc="0" dirty="0">
+                <a:ln w="0"/>
+                <a:solidFill>
+                  <a:schemeClr val="tx1"/>
+                </a:solidFill>
+                <a:effectLst>
+                  <a:outerShdw blurRad="38100" dist="19050" dir="2700000" algn="tl" rotWithShape="0">
+                    <a:schemeClr val="dk1">
+                      <a:alpha val="40000"/>
+                    </a:schemeClr>
+                  </a:outerShdw>
+                </a:effectLst>
+              </a:rPr>
+              <a:t>HTTPS Server</a:t>
+            </a:r>
+          </a:p>
+          <a:p>
+            <a:r>
+              <a:rPr lang="en-US" sz="3200" b="0" cap="none" spc="0" dirty="0">
+                <a:ln w="0"/>
+                <a:solidFill>
+                  <a:schemeClr val="tx1"/>
+                </a:solidFill>
+                <a:effectLst>
+                  <a:outerShdw blurRad="38100" dist="19050" dir="2700000" algn="tl" rotWithShape="0">
+                    <a:schemeClr val="dk1">
+                      <a:alpha val="40000"/>
+                    </a:schemeClr>
+                  </a:outerShdw>
+                </a:effectLst>
+              </a:rPr>
+              <a:t>Oracle</a:t>
+            </a:r>
+          </a:p>
+        </p:txBody>
+      </p:sp>
+      <p:sp>
+        <p:nvSpPr>
+          <p:cNvPr id="12" name="Rectangle 11">
+            <a:extLst>
+              <a:ext uri="{FF2B5EF4-FFF2-40B4-BE49-F238E27FC236}">
+                <a16:creationId xmlns:a16="http://schemas.microsoft.com/office/drawing/2014/main" id="{80020FAA-566E-45BA-A3A8-958887BF9BCE}"/>
+              </a:ext>
+            </a:extLst>
+          </p:cNvPr>
+          <p:cNvSpPr/>
+          <p:nvPr/>
+        </p:nvSpPr>
+        <p:spPr>
+          <a:xfrm>
+            <a:off x="4347260" y="4653568"/>
+            <a:ext cx="2449010" cy="1782501"/>
+          </a:xfrm>
+          <a:prstGeom prst="rect">
+            <a:avLst/>
+          </a:prstGeom>
+          <a:noFill/>
+          <a:ln>
+            <a:solidFill>
+              <a:schemeClr val="tx1"/>
+            </a:solidFill>
+          </a:ln>
+        </p:spPr>
+        <p:style>
+          <a:lnRef idx="2">
+            <a:schemeClr val="accent1">
+              <a:shade val="50000"/>
+            </a:schemeClr>
+          </a:lnRef>
+          <a:fillRef idx="1">
+            <a:schemeClr val="accent1"/>
+          </a:fillRef>
+          <a:effectRef idx="0">
+            <a:schemeClr val="accent1"/>
+          </a:effectRef>
+          <a:fontRef idx="minor">
+            <a:schemeClr val="lt1"/>
+          </a:fontRef>
+        </p:style>
+        <p:txBody>
+          <a:bodyPr rtlCol="0" anchor="ctr"/>
+          <a:lstStyle/>
+          <a:p>
+            <a:pPr algn="ctr"/>
+            <a:endParaRPr lang="en-US"/>
+          </a:p>
+        </p:txBody>
+      </p:sp>
+      <p:sp>
+        <p:nvSpPr>
+          <p:cNvPr id="13" name="Rectangle 12">
+            <a:extLst>
+              <a:ext uri="{FF2B5EF4-FFF2-40B4-BE49-F238E27FC236}">
+                <a16:creationId xmlns:a16="http://schemas.microsoft.com/office/drawing/2014/main" id="{3C74FF0B-BD0F-4F37-A6A2-D514A727E8A7}"/>
+              </a:ext>
+            </a:extLst>
+          </p:cNvPr>
+          <p:cNvSpPr/>
+          <p:nvPr/>
+        </p:nvSpPr>
+        <p:spPr>
+          <a:xfrm>
+            <a:off x="4431348" y="4743022"/>
+            <a:ext cx="2212520" cy="1261884"/>
+          </a:xfrm>
+          <a:prstGeom prst="rect">
+            <a:avLst/>
+          </a:prstGeom>
+          <a:noFill/>
+        </p:spPr>
+        <p:txBody>
+          <a:bodyPr wrap="square" lIns="91440" tIns="45720" rIns="91440" bIns="45720">
+            <a:spAutoFit/>
+          </a:bodyPr>
+          <a:lstStyle/>
+          <a:p>
+            <a:r>
+              <a:rPr lang="en-US" sz="4400" b="0" cap="none" spc="0" dirty="0">
+                <a:ln w="0"/>
+                <a:solidFill>
+                  <a:schemeClr val="tx1"/>
+                </a:solidFill>
+                <a:effectLst>
+                  <a:outerShdw blurRad="38100" dist="19050" dir="2700000" algn="tl" rotWithShape="0">
+                    <a:schemeClr val="dk1">
+                      <a:alpha val="40000"/>
+                    </a:schemeClr>
+                  </a:outerShdw>
+                </a:effectLst>
+              </a:rPr>
+              <a:t>Attacker</a:t>
+            </a:r>
+            <a:endParaRPr lang="en-US" sz="2800" b="0" cap="none" spc="0" dirty="0">
+              <a:ln w="0"/>
+              <a:solidFill>
+                <a:schemeClr val="tx1"/>
+              </a:solidFill>
+              <a:effectLst>
+                <a:outerShdw blurRad="38100" dist="19050" dir="2700000" algn="tl" rotWithShape="0">
+                  <a:schemeClr val="dk1">
+                    <a:alpha val="40000"/>
+                  </a:schemeClr>
+                </a:outerShdw>
+              </a:effectLst>
+            </a:endParaRPr>
+          </a:p>
+          <a:p>
+            <a:r>
+              <a:rPr lang="en-US" sz="3200" dirty="0">
+                <a:ln w="0"/>
+                <a:effectLst>
+                  <a:outerShdw blurRad="38100" dist="19050" dir="2700000" algn="tl" rotWithShape="0">
+                    <a:schemeClr val="dk1">
+                      <a:alpha val="40000"/>
+                    </a:schemeClr>
+                  </a:outerShdw>
+                </a:effectLst>
+              </a:rPr>
+              <a:t>HTTP Server</a:t>
+            </a:r>
+            <a:endParaRPr lang="en-US" sz="3200" b="0" cap="none" spc="0" dirty="0">
+              <a:ln w="0"/>
+              <a:solidFill>
+                <a:schemeClr val="tx1"/>
+              </a:solidFill>
+              <a:effectLst>
+                <a:outerShdw blurRad="38100" dist="19050" dir="2700000" algn="tl" rotWithShape="0">
+                  <a:schemeClr val="dk1">
+                    <a:alpha val="40000"/>
+                  </a:schemeClr>
+                </a:outerShdw>
+              </a:effectLst>
+            </a:endParaRPr>
+          </a:p>
+        </p:txBody>
+      </p:sp>
+      <p:sp>
+        <p:nvSpPr>
+          <p:cNvPr id="14" name="Arrow: Right 13">
+            <a:extLst>
+              <a:ext uri="{FF2B5EF4-FFF2-40B4-BE49-F238E27FC236}">
+                <a16:creationId xmlns:a16="http://schemas.microsoft.com/office/drawing/2014/main" id="{8872773A-9D9E-4849-B5EF-C8B720836D83}"/>
+              </a:ext>
+            </a:extLst>
+          </p:cNvPr>
+          <p:cNvSpPr/>
+          <p:nvPr/>
+        </p:nvSpPr>
+        <p:spPr>
+          <a:xfrm rot="2318257">
+            <a:off x="1314515" y="4824802"/>
+            <a:ext cx="3235650" cy="265559"/>
+          </a:xfrm>
+          <a:prstGeom prst="rightArrow">
+            <a:avLst>
+              <a:gd name="adj1" fmla="val 50000"/>
+              <a:gd name="adj2" fmla="val 158621"/>
+            </a:avLst>
+          </a:prstGeom>
+        </p:spPr>
+        <p:style>
+          <a:lnRef idx="2">
+            <a:schemeClr val="accent1">
+              <a:shade val="50000"/>
+            </a:schemeClr>
+          </a:lnRef>
+          <a:fillRef idx="1">
+            <a:schemeClr val="accent1"/>
+          </a:fillRef>
+          <a:effectRef idx="0">
+            <a:schemeClr val="accent1"/>
+          </a:effectRef>
+          <a:fontRef idx="minor">
+            <a:schemeClr val="lt1"/>
+          </a:fontRef>
+        </p:style>
+        <p:txBody>
+          <a:bodyPr rtlCol="0" anchor="ctr"/>
+          <a:lstStyle/>
+          <a:p>
+            <a:pPr algn="ctr"/>
+            <a:endParaRPr lang="en-US"/>
+          </a:p>
+        </p:txBody>
+      </p:sp>
+      <p:sp>
+        <p:nvSpPr>
+          <p:cNvPr id="15" name="Arrow: Right 14">
+            <a:extLst>
+              <a:ext uri="{FF2B5EF4-FFF2-40B4-BE49-F238E27FC236}">
+                <a16:creationId xmlns:a16="http://schemas.microsoft.com/office/drawing/2014/main" id="{CBB717CB-F310-436E-A97B-BD4F8EB80C6B}"/>
+              </a:ext>
+            </a:extLst>
+          </p:cNvPr>
+          <p:cNvSpPr/>
+          <p:nvPr/>
+        </p:nvSpPr>
+        <p:spPr>
+          <a:xfrm rot="13134776">
+            <a:off x="2163765" y="4553988"/>
+            <a:ext cx="2293424" cy="242655"/>
+          </a:xfrm>
+          <a:prstGeom prst="rightArrow">
+            <a:avLst>
+              <a:gd name="adj1" fmla="val 50000"/>
+              <a:gd name="adj2" fmla="val 158621"/>
+            </a:avLst>
+          </a:prstGeom>
+        </p:spPr>
+        <p:style>
+          <a:lnRef idx="2">
+            <a:schemeClr val="accent1">
+              <a:shade val="50000"/>
+            </a:schemeClr>
+          </a:lnRef>
+          <a:fillRef idx="1">
+            <a:schemeClr val="accent1"/>
+          </a:fillRef>
+          <a:effectRef idx="0">
+            <a:schemeClr val="accent1"/>
+          </a:effectRef>
+          <a:fontRef idx="minor">
+            <a:schemeClr val="lt1"/>
+          </a:fontRef>
+        </p:style>
+        <p:txBody>
+          <a:bodyPr rtlCol="0" anchor="ctr"/>
+          <a:lstStyle/>
+          <a:p>
+            <a:pPr algn="ctr"/>
+            <a:endParaRPr lang="en-US"/>
+          </a:p>
+        </p:txBody>
+      </p:sp>
+      <p:sp>
+        <p:nvSpPr>
+          <p:cNvPr id="16" name="Arrow: Right 15">
+            <a:extLst>
+              <a:ext uri="{FF2B5EF4-FFF2-40B4-BE49-F238E27FC236}">
+                <a16:creationId xmlns:a16="http://schemas.microsoft.com/office/drawing/2014/main" id="{9B99E4CE-0042-4CBA-A144-29F1C7102C6F}"/>
+              </a:ext>
+            </a:extLst>
+          </p:cNvPr>
+          <p:cNvSpPr/>
+          <p:nvPr/>
+        </p:nvSpPr>
+        <p:spPr>
+          <a:xfrm>
+            <a:off x="3352972" y="2168912"/>
+            <a:ext cx="1408335" cy="240233"/>
+          </a:xfrm>
+          <a:prstGeom prst="rightArrow">
+            <a:avLst>
+              <a:gd name="adj1" fmla="val 50000"/>
+              <a:gd name="adj2" fmla="val 158621"/>
+            </a:avLst>
+          </a:prstGeom>
+        </p:spPr>
+        <p:style>
+          <a:lnRef idx="2">
+            <a:schemeClr val="accent1">
+              <a:shade val="50000"/>
+            </a:schemeClr>
+          </a:lnRef>
+          <a:fillRef idx="1">
+            <a:schemeClr val="accent1"/>
+          </a:fillRef>
+          <a:effectRef idx="0">
+            <a:schemeClr val="accent1"/>
+          </a:effectRef>
+          <a:fontRef idx="minor">
+            <a:schemeClr val="lt1"/>
+          </a:fontRef>
+        </p:style>
+        <p:txBody>
+          <a:bodyPr rtlCol="0" anchor="ctr"/>
+          <a:lstStyle/>
+          <a:p>
+            <a:pPr algn="ctr"/>
+            <a:endParaRPr lang="en-US"/>
+          </a:p>
+        </p:txBody>
+      </p:sp>
+      <p:sp>
+        <p:nvSpPr>
+          <p:cNvPr id="17" name="Arrow: Right 16">
+            <a:extLst>
+              <a:ext uri="{FF2B5EF4-FFF2-40B4-BE49-F238E27FC236}">
+                <a16:creationId xmlns:a16="http://schemas.microsoft.com/office/drawing/2014/main" id="{2224E20F-D9E0-4076-933B-374F8B1A6256}"/>
+              </a:ext>
+            </a:extLst>
+          </p:cNvPr>
+          <p:cNvSpPr/>
+          <p:nvPr/>
+        </p:nvSpPr>
+        <p:spPr>
+          <a:xfrm>
+            <a:off x="7368395" y="2168913"/>
+            <a:ext cx="1408335" cy="240233"/>
+          </a:xfrm>
+          <a:prstGeom prst="rightArrow">
+            <a:avLst>
+              <a:gd name="adj1" fmla="val 50000"/>
+              <a:gd name="adj2" fmla="val 158621"/>
+            </a:avLst>
+          </a:prstGeom>
+        </p:spPr>
+        <p:style>
+          <a:lnRef idx="2">
+            <a:schemeClr val="accent1">
+              <a:shade val="50000"/>
+            </a:schemeClr>
+          </a:lnRef>
+          <a:fillRef idx="1">
+            <a:schemeClr val="accent1"/>
+          </a:fillRef>
+          <a:effectRef idx="0">
+            <a:schemeClr val="accent1"/>
+          </a:effectRef>
+          <a:fontRef idx="minor">
+            <a:schemeClr val="lt1"/>
+          </a:fontRef>
+        </p:style>
+        <p:txBody>
+          <a:bodyPr rtlCol="0" anchor="ctr"/>
+          <a:lstStyle/>
+          <a:p>
+            <a:pPr algn="ctr"/>
+            <a:endParaRPr lang="en-US"/>
+          </a:p>
+        </p:txBody>
+      </p:sp>
+      <p:sp>
+        <p:nvSpPr>
+          <p:cNvPr id="18" name="Rectangle 17">
+            <a:extLst>
+              <a:ext uri="{FF2B5EF4-FFF2-40B4-BE49-F238E27FC236}">
+                <a16:creationId xmlns:a16="http://schemas.microsoft.com/office/drawing/2014/main" id="{B8106248-1CDC-4C58-8CAF-FA62C262EE42}"/>
+              </a:ext>
+            </a:extLst>
+          </p:cNvPr>
+          <p:cNvSpPr/>
+          <p:nvPr/>
+        </p:nvSpPr>
+        <p:spPr>
+          <a:xfrm>
+            <a:off x="2228078" y="4726748"/>
+            <a:ext cx="340157" cy="461665"/>
+          </a:xfrm>
+          <a:prstGeom prst="rect">
+            <a:avLst/>
+          </a:prstGeom>
+          <a:noFill/>
+        </p:spPr>
+        <p:txBody>
+          <a:bodyPr wrap="none" lIns="91440" tIns="45720" rIns="91440" bIns="45720">
+            <a:spAutoFit/>
+          </a:bodyPr>
+          <a:lstStyle/>
+          <a:p>
+            <a:pPr algn="ctr"/>
+            <a:r>
+              <a:rPr lang="en-US" sz="2400" dirty="0">
+                <a:ln w="0"/>
+                <a:solidFill>
+                  <a:srgbClr val="FF0000"/>
+                </a:solidFill>
+                <a:effectLst>
+                  <a:outerShdw blurRad="38100" dist="19050" dir="2700000" algn="tl" rotWithShape="0">
+                    <a:schemeClr val="dk1">
+                      <a:alpha val="40000"/>
+                    </a:schemeClr>
+                  </a:outerShdw>
+                </a:effectLst>
+              </a:rPr>
+              <a:t>1</a:t>
+            </a:r>
+          </a:p>
+        </p:txBody>
+      </p:sp>
+      <p:sp>
+        <p:nvSpPr>
+          <p:cNvPr id="19" name="Rectangle 18">
+            <a:extLst>
+              <a:ext uri="{FF2B5EF4-FFF2-40B4-BE49-F238E27FC236}">
+                <a16:creationId xmlns:a16="http://schemas.microsoft.com/office/drawing/2014/main" id="{CDA7B38A-806E-4842-A8D4-F682C9967D95}"/>
+              </a:ext>
+            </a:extLst>
+          </p:cNvPr>
+          <p:cNvSpPr/>
+          <p:nvPr/>
+        </p:nvSpPr>
+        <p:spPr>
+          <a:xfrm>
+            <a:off x="3514797" y="4281357"/>
+            <a:ext cx="340157" cy="461665"/>
+          </a:xfrm>
+          <a:prstGeom prst="rect">
+            <a:avLst/>
+          </a:prstGeom>
+          <a:noFill/>
+        </p:spPr>
+        <p:txBody>
+          <a:bodyPr wrap="none" lIns="91440" tIns="45720" rIns="91440" bIns="45720">
+            <a:spAutoFit/>
+          </a:bodyPr>
+          <a:lstStyle/>
+          <a:p>
+            <a:pPr algn="ctr"/>
+            <a:r>
+              <a:rPr lang="en-US" sz="2400" dirty="0">
+                <a:ln w="0"/>
+                <a:solidFill>
+                  <a:srgbClr val="FF0000"/>
+                </a:solidFill>
+                <a:effectLst>
+                  <a:outerShdw blurRad="38100" dist="19050" dir="2700000" algn="tl" rotWithShape="0">
+                    <a:schemeClr val="dk1">
+                      <a:alpha val="40000"/>
+                    </a:schemeClr>
+                  </a:outerShdw>
+                </a:effectLst>
+              </a:rPr>
+              <a:t>2</a:t>
+            </a:r>
+          </a:p>
+        </p:txBody>
+      </p:sp>
+      <p:sp>
+        <p:nvSpPr>
+          <p:cNvPr id="20" name="Rectangle 19">
+            <a:extLst>
+              <a:ext uri="{FF2B5EF4-FFF2-40B4-BE49-F238E27FC236}">
+                <a16:creationId xmlns:a16="http://schemas.microsoft.com/office/drawing/2014/main" id="{224CBED7-9C4E-4100-933A-3EF23166ACC9}"/>
+              </a:ext>
+            </a:extLst>
+          </p:cNvPr>
+          <p:cNvSpPr/>
+          <p:nvPr/>
+        </p:nvSpPr>
+        <p:spPr>
+          <a:xfrm>
+            <a:off x="3757705" y="1750575"/>
+            <a:ext cx="340158" cy="461665"/>
+          </a:xfrm>
+          <a:prstGeom prst="rect">
+            <a:avLst/>
+          </a:prstGeom>
+          <a:noFill/>
+        </p:spPr>
+        <p:txBody>
+          <a:bodyPr wrap="none" lIns="91440" tIns="45720" rIns="91440" bIns="45720">
+            <a:spAutoFit/>
+          </a:bodyPr>
+          <a:lstStyle/>
+          <a:p>
+            <a:pPr algn="ctr"/>
+            <a:r>
+              <a:rPr lang="en-US" sz="2400" dirty="0">
+                <a:ln w="0"/>
+                <a:solidFill>
+                  <a:srgbClr val="FF0000"/>
+                </a:solidFill>
+                <a:effectLst>
+                  <a:outerShdw blurRad="38100" dist="19050" dir="2700000" algn="tl" rotWithShape="0">
+                    <a:schemeClr val="dk1">
+                      <a:alpha val="40000"/>
+                    </a:schemeClr>
+                  </a:outerShdw>
+                </a:effectLst>
+              </a:rPr>
+              <a:t>3</a:t>
+            </a:r>
+          </a:p>
+        </p:txBody>
+      </p:sp>
+      <p:sp>
+        <p:nvSpPr>
+          <p:cNvPr id="21" name="Rectangle 20">
+            <a:extLst>
+              <a:ext uri="{FF2B5EF4-FFF2-40B4-BE49-F238E27FC236}">
+                <a16:creationId xmlns:a16="http://schemas.microsoft.com/office/drawing/2014/main" id="{D90923BC-72C4-49ED-969A-221891091B69}"/>
+              </a:ext>
+            </a:extLst>
+          </p:cNvPr>
+          <p:cNvSpPr/>
+          <p:nvPr/>
+        </p:nvSpPr>
+        <p:spPr>
+          <a:xfrm>
+            <a:off x="7763720" y="1690688"/>
+            <a:ext cx="340158" cy="461665"/>
+          </a:xfrm>
+          <a:prstGeom prst="rect">
+            <a:avLst/>
+          </a:prstGeom>
+          <a:noFill/>
+        </p:spPr>
+        <p:txBody>
+          <a:bodyPr wrap="none" lIns="91440" tIns="45720" rIns="91440" bIns="45720">
+            <a:spAutoFit/>
+          </a:bodyPr>
+          <a:lstStyle/>
+          <a:p>
+            <a:pPr algn="ctr"/>
+            <a:r>
+              <a:rPr lang="en-US" sz="2400" dirty="0">
+                <a:ln w="0"/>
+                <a:solidFill>
+                  <a:srgbClr val="FF0000"/>
+                </a:solidFill>
+                <a:effectLst>
+                  <a:outerShdw blurRad="38100" dist="19050" dir="2700000" algn="tl" rotWithShape="0">
+                    <a:schemeClr val="dk1">
+                      <a:alpha val="40000"/>
+                    </a:schemeClr>
+                  </a:outerShdw>
+                </a:effectLst>
+              </a:rPr>
+              <a:t>4</a:t>
+            </a:r>
+          </a:p>
+        </p:txBody>
+      </p:sp>
+      <p:sp>
+        <p:nvSpPr>
+          <p:cNvPr id="23" name="Arrow: Right 22">
+            <a:extLst>
+              <a:ext uri="{FF2B5EF4-FFF2-40B4-BE49-F238E27FC236}">
+                <a16:creationId xmlns:a16="http://schemas.microsoft.com/office/drawing/2014/main" id="{87329284-36C0-4875-AED0-E06BBA6BF547}"/>
+              </a:ext>
+            </a:extLst>
+          </p:cNvPr>
+          <p:cNvSpPr/>
+          <p:nvPr/>
+        </p:nvSpPr>
+        <p:spPr>
+          <a:xfrm rot="10800000">
+            <a:off x="7337080" y="2510461"/>
+            <a:ext cx="1408335" cy="240233"/>
+          </a:xfrm>
+          <a:prstGeom prst="rightArrow">
+            <a:avLst>
+              <a:gd name="adj1" fmla="val 50000"/>
+              <a:gd name="adj2" fmla="val 158621"/>
+            </a:avLst>
+          </a:prstGeom>
+        </p:spPr>
+        <p:style>
+          <a:lnRef idx="2">
+            <a:schemeClr val="accent1">
+              <a:shade val="50000"/>
+            </a:schemeClr>
+          </a:lnRef>
+          <a:fillRef idx="1">
+            <a:schemeClr val="accent1"/>
+          </a:fillRef>
+          <a:effectRef idx="0">
+            <a:schemeClr val="accent1"/>
+          </a:effectRef>
+          <a:fontRef idx="minor">
+            <a:schemeClr val="lt1"/>
+          </a:fontRef>
+        </p:style>
+        <p:txBody>
+          <a:bodyPr rtlCol="0" anchor="ctr"/>
+          <a:lstStyle/>
+          <a:p>
+            <a:pPr algn="ctr"/>
+            <a:endParaRPr lang="en-US"/>
+          </a:p>
+        </p:txBody>
+      </p:sp>
+      <p:sp>
+        <p:nvSpPr>
+          <p:cNvPr id="24" name="Rectangle 23">
+            <a:extLst>
+              <a:ext uri="{FF2B5EF4-FFF2-40B4-BE49-F238E27FC236}">
+                <a16:creationId xmlns:a16="http://schemas.microsoft.com/office/drawing/2014/main" id="{0427CB78-1FE8-43AF-9480-8033E9C7909A}"/>
+              </a:ext>
+            </a:extLst>
+          </p:cNvPr>
+          <p:cNvSpPr/>
+          <p:nvPr/>
+        </p:nvSpPr>
+        <p:spPr>
+          <a:xfrm>
+            <a:off x="8111178" y="2741293"/>
+            <a:ext cx="340158" cy="461665"/>
+          </a:xfrm>
+          <a:prstGeom prst="rect">
+            <a:avLst/>
+          </a:prstGeom>
+          <a:noFill/>
+        </p:spPr>
+        <p:txBody>
+          <a:bodyPr wrap="none" lIns="91440" tIns="45720" rIns="91440" bIns="45720">
+            <a:spAutoFit/>
+          </a:bodyPr>
+          <a:lstStyle/>
+          <a:p>
+            <a:pPr algn="ctr"/>
+            <a:r>
+              <a:rPr lang="en-US" sz="2400" dirty="0">
+                <a:ln w="0"/>
+                <a:solidFill>
+                  <a:srgbClr val="FF0000"/>
+                </a:solidFill>
+                <a:effectLst>
+                  <a:outerShdw blurRad="38100" dist="19050" dir="2700000" algn="tl" rotWithShape="0">
+                    <a:schemeClr val="dk1">
+                      <a:alpha val="40000"/>
+                    </a:schemeClr>
+                  </a:outerShdw>
+                </a:effectLst>
+              </a:rPr>
+              <a:t>5</a:t>
+            </a:r>
+          </a:p>
+        </p:txBody>
+      </p:sp>
+      <p:sp>
+        <p:nvSpPr>
+          <p:cNvPr id="25" name="Arrow: Right 24">
+            <a:extLst>
+              <a:ext uri="{FF2B5EF4-FFF2-40B4-BE49-F238E27FC236}">
+                <a16:creationId xmlns:a16="http://schemas.microsoft.com/office/drawing/2014/main" id="{60299009-0B78-449C-AE9D-8E8A077EDC51}"/>
+              </a:ext>
+            </a:extLst>
+          </p:cNvPr>
+          <p:cNvSpPr/>
+          <p:nvPr/>
+        </p:nvSpPr>
+        <p:spPr>
+          <a:xfrm rot="5400000">
+            <a:off x="4948069" y="3893670"/>
+            <a:ext cx="1234846" cy="195496"/>
+          </a:xfrm>
+          <a:prstGeom prst="rightArrow">
+            <a:avLst>
+              <a:gd name="adj1" fmla="val 50000"/>
+              <a:gd name="adj2" fmla="val 158621"/>
+            </a:avLst>
+          </a:prstGeom>
+        </p:spPr>
+        <p:style>
+          <a:lnRef idx="2">
+            <a:schemeClr val="accent1">
+              <a:shade val="50000"/>
+            </a:schemeClr>
+          </a:lnRef>
+          <a:fillRef idx="1">
+            <a:schemeClr val="accent1"/>
+          </a:fillRef>
+          <a:effectRef idx="0">
+            <a:schemeClr val="accent1"/>
+          </a:effectRef>
+          <a:fontRef idx="minor">
+            <a:schemeClr val="lt1"/>
+          </a:fontRef>
+        </p:style>
+        <p:txBody>
+          <a:bodyPr rtlCol="0" anchor="ctr"/>
+          <a:lstStyle/>
+          <a:p>
+            <a:pPr algn="ctr"/>
+            <a:endParaRPr lang="en-US"/>
+          </a:p>
+        </p:txBody>
+      </p:sp>
+      <p:sp>
+        <p:nvSpPr>
+          <p:cNvPr id="26" name="Rectangle 25">
+            <a:extLst>
+              <a:ext uri="{FF2B5EF4-FFF2-40B4-BE49-F238E27FC236}">
+                <a16:creationId xmlns:a16="http://schemas.microsoft.com/office/drawing/2014/main" id="{F0DACDF4-C527-4D80-BE57-22FF0A27254E}"/>
+              </a:ext>
+            </a:extLst>
+          </p:cNvPr>
+          <p:cNvSpPr/>
+          <p:nvPr/>
+        </p:nvSpPr>
+        <p:spPr>
+          <a:xfrm>
+            <a:off x="5634455" y="3638808"/>
+            <a:ext cx="340158" cy="461665"/>
+          </a:xfrm>
+          <a:prstGeom prst="rect">
+            <a:avLst/>
+          </a:prstGeom>
+          <a:noFill/>
+        </p:spPr>
+        <p:txBody>
+          <a:bodyPr wrap="none" lIns="91440" tIns="45720" rIns="91440" bIns="45720">
+            <a:spAutoFit/>
+          </a:bodyPr>
+          <a:lstStyle/>
+          <a:p>
+            <a:pPr algn="ctr"/>
+            <a:r>
+              <a:rPr lang="en-US" sz="2400" dirty="0">
+                <a:ln w="0"/>
+                <a:solidFill>
+                  <a:srgbClr val="FF0000"/>
+                </a:solidFill>
+                <a:effectLst>
+                  <a:outerShdw blurRad="38100" dist="19050" dir="2700000" algn="tl" rotWithShape="0">
+                    <a:schemeClr val="dk1">
+                      <a:alpha val="40000"/>
+                    </a:schemeClr>
+                  </a:outerShdw>
+                </a:effectLst>
+              </a:rPr>
+              <a:t>6</a:t>
+            </a:r>
+          </a:p>
+        </p:txBody>
+      </p:sp>
+      <p:sp>
+        <p:nvSpPr>
+          <p:cNvPr id="27" name="TextBox 26">
+            <a:extLst>
+              <a:ext uri="{FF2B5EF4-FFF2-40B4-BE49-F238E27FC236}">
+                <a16:creationId xmlns:a16="http://schemas.microsoft.com/office/drawing/2014/main" id="{6DF5D03A-506F-4AED-AA58-0D9D9BE25303}"/>
+              </a:ext>
+            </a:extLst>
+          </p:cNvPr>
+          <p:cNvSpPr txBox="1"/>
+          <p:nvPr/>
+        </p:nvSpPr>
+        <p:spPr>
+          <a:xfrm>
+            <a:off x="6880358" y="3655278"/>
+            <a:ext cx="5206677" cy="2862322"/>
+          </a:xfrm>
+          <a:prstGeom prst="rect">
+            <a:avLst/>
+          </a:prstGeom>
+          <a:noFill/>
+        </p:spPr>
+        <p:txBody>
+          <a:bodyPr wrap="square" rtlCol="0">
+            <a:spAutoFit/>
+          </a:bodyPr>
+          <a:lstStyle/>
+          <a:p>
+            <a:r>
+              <a:rPr lang="en-US" dirty="0"/>
+              <a:t>1. Client browses Attacker HTTP server</a:t>
+            </a:r>
+          </a:p>
+          <a:p>
+            <a:r>
+              <a:rPr lang="en-US" dirty="0"/>
+              <a:t>2. Attacker server injects HTTPS request generator</a:t>
+            </a:r>
+          </a:p>
+          <a:p>
+            <a:r>
+              <a:rPr lang="en-US" dirty="0"/>
+              <a:t>3. Client sends HTTPS request with secret cookie</a:t>
+            </a:r>
+          </a:p>
+          <a:p>
+            <a:r>
+              <a:rPr lang="en-US" dirty="0"/>
+              <a:t>     Attacker intercepts and modifies HTTPS request</a:t>
+            </a:r>
+          </a:p>
+          <a:p>
+            <a:r>
+              <a:rPr lang="en-US" dirty="0"/>
+              <a:t>4. Attacker forward modified HTTPS request</a:t>
+            </a:r>
+          </a:p>
+          <a:p>
+            <a:r>
+              <a:rPr lang="en-US" dirty="0"/>
+              <a:t>5. HTTPS server acts as oracle</a:t>
+            </a:r>
+          </a:p>
+          <a:p>
+            <a:r>
+              <a:rPr lang="en-US" dirty="0"/>
+              <a:t>     Attacker deciphers byte</a:t>
+            </a:r>
+          </a:p>
+          <a:p>
+            <a:r>
+              <a:rPr lang="en-US" dirty="0"/>
+              <a:t>6. Attacker updates request generator</a:t>
+            </a:r>
+          </a:p>
+          <a:p>
+            <a:endParaRPr lang="en-US" dirty="0"/>
+          </a:p>
+          <a:p>
+            <a:r>
+              <a:rPr lang="en-US" dirty="0"/>
+              <a:t>Trigger client to update request, repeating steps</a:t>
+            </a:r>
+          </a:p>
+        </p:txBody>
+      </p:sp>
+    </p:spTree>
+    <p:extLst>
+      <p:ext uri="{BB962C8B-B14F-4D97-AF65-F5344CB8AC3E}">
+        <p14:creationId xmlns:p14="http://schemas.microsoft.com/office/powerpoint/2010/main" val="3934950487"/>
+      </p:ext>
+    </p:extLst>
+  </p:cSld>
+  <p:clrMapOvr>
+    <a:masterClrMapping/>
+  </p:clrMapOvr>
+</p:sld>
+</file>
+
+<file path=ppt/slides/slide3.xml><?xml version="1.0" encoding="utf-8"?>
+<p:sld xmlns:a="http://schemas.openxmlformats.org/drawingml/2006/main" xmlns:r="http://schemas.openxmlformats.org/officeDocument/2006/relationships" xmlns:p="http://schemas.openxmlformats.org/presentationml/2006/main">
+  <p:cSld>
+    <p:spTree>
+      <p:nvGrpSpPr>
+        <p:cNvPr id="1" name=""/>
+        <p:cNvGrpSpPr/>
+        <p:nvPr/>
+      </p:nvGrpSpPr>
+      <p:grpSpPr>
+        <a:xfrm>
+          <a:off x="0" y="0"/>
+          <a:ext cx="0" cy="0"/>
+          <a:chOff x="0" y="0"/>
+          <a:chExt cx="0" cy="0"/>
+        </a:xfrm>
+      </p:grpSpPr>
+      <p:sp>
+        <p:nvSpPr>
+          <p:cNvPr id="2" name="Title 1">
+            <a:extLst>
+              <a:ext uri="{FF2B5EF4-FFF2-40B4-BE49-F238E27FC236}">
+                <a16:creationId xmlns:a16="http://schemas.microsoft.com/office/drawing/2014/main" id="{192D89FB-05EA-420A-A11A-E46B908CCC7A}"/>
+              </a:ext>
+            </a:extLst>
+          </p:cNvPr>
+          <p:cNvSpPr>
+            <a:spLocks noGrp="1"/>
+          </p:cNvSpPr>
+          <p:nvPr>
+            <p:ph type="title"/>
+          </p:nvPr>
+        </p:nvSpPr>
+        <p:spPr/>
+        <p:txBody>
+          <a:bodyPr/>
+          <a:lstStyle/>
+          <a:p>
+            <a:r>
+              <a:rPr lang="en-US" dirty="0"/>
+              <a:t>SSLv3 Vulnerability 1</a:t>
+            </a:r>
+          </a:p>
+        </p:txBody>
+      </p:sp>
+      <p:sp>
+        <p:nvSpPr>
+          <p:cNvPr id="3" name="Content Placeholder 2">
+            <a:extLst>
+              <a:ext uri="{FF2B5EF4-FFF2-40B4-BE49-F238E27FC236}">
+                <a16:creationId xmlns:a16="http://schemas.microsoft.com/office/drawing/2014/main" id="{5425A1EC-6D6F-4E79-962E-A97E57038B26}"/>
+              </a:ext>
+            </a:extLst>
+          </p:cNvPr>
+          <p:cNvSpPr>
+            <a:spLocks noGrp="1"/>
+          </p:cNvSpPr>
+          <p:nvPr>
+            <p:ph idx="1"/>
+          </p:nvPr>
+        </p:nvSpPr>
+        <p:spPr/>
+        <p:txBody>
+          <a:bodyPr/>
+          <a:lstStyle/>
+          <a:p>
+            <a:r>
+              <a:rPr lang="en-US" dirty="0"/>
+              <a:t>Padding scheme: only the last padding byte is examined, so an oracle will accept any padding as long as the last byte is between 0..(b-1)</a:t>
+            </a:r>
+          </a:p>
+          <a:p>
+            <a:endParaRPr lang="en-US" dirty="0"/>
+          </a:p>
+        </p:txBody>
+      </p:sp>
+      <p:pic>
+        <p:nvPicPr>
+          <p:cNvPr id="4" name="Picture 3">
+            <a:extLst>
+              <a:ext uri="{FF2B5EF4-FFF2-40B4-BE49-F238E27FC236}">
+                <a16:creationId xmlns:a16="http://schemas.microsoft.com/office/drawing/2014/main" id="{65363B68-A9D9-4CD8-B56E-AE661E33C376}"/>
+              </a:ext>
+            </a:extLst>
+          </p:cNvPr>
+          <p:cNvPicPr>
+            <a:picLocks noChangeAspect="1"/>
+          </p:cNvPicPr>
+          <p:nvPr/>
+        </p:nvPicPr>
+        <p:blipFill>
+          <a:blip r:embed="rId2"/>
+          <a:stretch>
+            <a:fillRect/>
+          </a:stretch>
+        </p:blipFill>
+        <p:spPr>
+          <a:xfrm>
+            <a:off x="836984" y="3289630"/>
+            <a:ext cx="10718333" cy="3184911"/>
+          </a:xfrm>
+          <a:prstGeom prst="rect">
+            <a:avLst/>
+          </a:prstGeom>
+        </p:spPr>
+      </p:pic>
+    </p:spTree>
+    <p:extLst>
+      <p:ext uri="{BB962C8B-B14F-4D97-AF65-F5344CB8AC3E}">
+        <p14:creationId xmlns:p14="http://schemas.microsoft.com/office/powerpoint/2010/main" val="3028239802"/>
+      </p:ext>
+    </p:extLst>
+  </p:cSld>
+  <p:clrMapOvr>
+    <a:masterClrMapping/>
+  </p:clrMapOvr>
+</p:sld>
+</file>
+
+<file path=ppt/slides/slide4.xml><?xml version="1.0" encoding="utf-8"?>
+<p:sld xmlns:a="http://schemas.openxmlformats.org/drawingml/2006/main" xmlns:r="http://schemas.openxmlformats.org/officeDocument/2006/relationships" xmlns:p="http://schemas.openxmlformats.org/presentationml/2006/main">
+  <p:cSld>
+    <p:spTree>
+      <p:nvGrpSpPr>
+        <p:cNvPr id="1" name=""/>
+        <p:cNvGrpSpPr/>
+        <p:nvPr/>
+      </p:nvGrpSpPr>
+      <p:grpSpPr>
+        <a:xfrm>
+          <a:off x="0" y="0"/>
+          <a:ext cx="0" cy="0"/>
+          <a:chOff x="0" y="0"/>
+          <a:chExt cx="0" cy="0"/>
+        </a:xfrm>
+      </p:grpSpPr>
+      <p:sp>
+        <p:nvSpPr>
+          <p:cNvPr id="2" name="Title 1">
+            <a:extLst>
+              <a:ext uri="{FF2B5EF4-FFF2-40B4-BE49-F238E27FC236}">
+                <a16:creationId xmlns:a16="http://schemas.microsoft.com/office/drawing/2014/main" id="{192D89FB-05EA-420A-A11A-E46B908CCC7A}"/>
+              </a:ext>
+            </a:extLst>
+          </p:cNvPr>
+          <p:cNvSpPr>
+            <a:spLocks noGrp="1"/>
+          </p:cNvSpPr>
+          <p:nvPr>
+            <p:ph type="title"/>
+          </p:nvPr>
+        </p:nvSpPr>
+        <p:spPr/>
+        <p:txBody>
+          <a:bodyPr/>
+          <a:lstStyle/>
+          <a:p>
+            <a:r>
+              <a:rPr lang="en-US" dirty="0"/>
+              <a:t>SSLv3 Vulnerability 2</a:t>
+            </a:r>
+          </a:p>
+        </p:txBody>
+      </p:sp>
+      <p:sp>
+        <p:nvSpPr>
+          <p:cNvPr id="3" name="Content Placeholder 2">
+            <a:extLst>
+              <a:ext uri="{FF2B5EF4-FFF2-40B4-BE49-F238E27FC236}">
+                <a16:creationId xmlns:a16="http://schemas.microsoft.com/office/drawing/2014/main" id="{5425A1EC-6D6F-4E79-962E-A97E57038B26}"/>
+              </a:ext>
+            </a:extLst>
+          </p:cNvPr>
+          <p:cNvSpPr>
+            <a:spLocks noGrp="1"/>
+          </p:cNvSpPr>
+          <p:nvPr>
+            <p:ph idx="1"/>
+          </p:nvPr>
+        </p:nvSpPr>
+        <p:spPr/>
+        <p:txBody>
+          <a:bodyPr/>
+          <a:lstStyle/>
+          <a:p>
+            <a:r>
+              <a:rPr lang="en-US" dirty="0"/>
+              <a:t>MAC then encrypt: SSLv3 </a:t>
+            </a:r>
+            <a:r>
+              <a:rPr lang="en-US" dirty="0" err="1"/>
+              <a:t>HMAC</a:t>
+            </a:r>
+            <a:r>
+              <a:rPr lang="en-US" dirty="0"/>
+              <a:t> does not account for the padding, so a full block of padding at the end of an encrypted message may be replaced with an arbitrary block of data, and if the block of data contains a final byte equal to 15 (or (blocksize-1)), the oracle will accept the message as valid, since it recognizes the padding as correct, and the MAC in the previous blocks is unaffected</a:t>
+            </a:r>
+          </a:p>
+        </p:txBody>
+      </p:sp>
+    </p:spTree>
+    <p:extLst>
+      <p:ext uri="{BB962C8B-B14F-4D97-AF65-F5344CB8AC3E}">
+        <p14:creationId xmlns:p14="http://schemas.microsoft.com/office/powerpoint/2010/main" val="1074019918"/>
+      </p:ext>
+    </p:extLst>
+  </p:cSld>
+  <p:clrMapOvr>
+    <a:masterClrMapping/>
+  </p:clrMapOvr>
+</p:sld>
+</file>
+
+<file path=ppt/slides/slide5.xml><?xml version="1.0" encoding="utf-8"?>
+<p:sld xmlns:a="http://schemas.openxmlformats.org/drawingml/2006/main" xmlns:r="http://schemas.openxmlformats.org/officeDocument/2006/relationships" xmlns:p="http://schemas.openxmlformats.org/presentationml/2006/main">
+  <p:cSld>
+    <p:spTree>
+      <p:nvGrpSpPr>
+        <p:cNvPr id="1" name=""/>
+        <p:cNvGrpSpPr/>
+        <p:nvPr/>
+      </p:nvGrpSpPr>
+      <p:grpSpPr>
+        <a:xfrm>
+          <a:off x="0" y="0"/>
+          <a:ext cx="0" cy="0"/>
+          <a:chOff x="0" y="0"/>
+          <a:chExt cx="0" cy="0"/>
+        </a:xfrm>
+      </p:grpSpPr>
+      <p:sp>
+        <p:nvSpPr>
+          <p:cNvPr id="2" name="Title 1">
+            <a:extLst>
+              <a:ext uri="{FF2B5EF4-FFF2-40B4-BE49-F238E27FC236}">
+                <a16:creationId xmlns:a16="http://schemas.microsoft.com/office/drawing/2014/main" id="{192D89FB-05EA-420A-A11A-E46B908CCC7A}"/>
+              </a:ext>
+            </a:extLst>
+          </p:cNvPr>
+          <p:cNvSpPr>
+            <a:spLocks noGrp="1"/>
+          </p:cNvSpPr>
+          <p:nvPr>
+            <p:ph type="title"/>
+          </p:nvPr>
+        </p:nvSpPr>
+        <p:spPr/>
+        <p:txBody>
+          <a:bodyPr/>
+          <a:lstStyle/>
+          <a:p>
+            <a:r>
+              <a:rPr lang="en-US" dirty="0"/>
+              <a:t>POODLE Attack Steps</a:t>
+            </a:r>
+          </a:p>
+        </p:txBody>
+      </p:sp>
+      <p:sp>
+        <p:nvSpPr>
+          <p:cNvPr id="3" name="Content Placeholder 2">
+            <a:extLst>
+              <a:ext uri="{FF2B5EF4-FFF2-40B4-BE49-F238E27FC236}">
+                <a16:creationId xmlns:a16="http://schemas.microsoft.com/office/drawing/2014/main" id="{5425A1EC-6D6F-4E79-962E-A97E57038B26}"/>
+              </a:ext>
+            </a:extLst>
+          </p:cNvPr>
+          <p:cNvSpPr>
+            <a:spLocks noGrp="1"/>
+          </p:cNvSpPr>
+          <p:nvPr>
+            <p:ph idx="1"/>
+          </p:nvPr>
+        </p:nvSpPr>
+        <p:spPr/>
+        <p:txBody>
+          <a:bodyPr/>
+          <a:lstStyle/>
+          <a:p>
+            <a:r>
+              <a:rPr lang="en-US" dirty="0"/>
+              <a:t>Diagram</a:t>
+            </a:r>
+          </a:p>
+        </p:txBody>
+      </p:sp>
+    </p:spTree>
+    <p:extLst>
+      <p:ext uri="{BB962C8B-B14F-4D97-AF65-F5344CB8AC3E}">
+        <p14:creationId xmlns:p14="http://schemas.microsoft.com/office/powerpoint/2010/main" val="1400334043"/>
+      </p:ext>
+    </p:extLst>
+  </p:cSld>
+  <p:clrMapOvr>
+    <a:masterClrMapping/>
+  </p:clrMapOvr>
+</p:sld>
+</file>
+
+<file path=ppt/slides/slide6.xml><?xml version="1.0" encoding="utf-8"?>
+<p:sld xmlns:a="http://schemas.openxmlformats.org/drawingml/2006/main" xmlns:r="http://schemas.openxmlformats.org/officeDocument/2006/relationships" xmlns:p="http://schemas.openxmlformats.org/presentationml/2006/main">
+  <p:cSld>
+    <p:spTree>
+      <p:nvGrpSpPr>
+        <p:cNvPr id="1" name=""/>
+        <p:cNvGrpSpPr/>
+        <p:nvPr/>
+      </p:nvGrpSpPr>
+      <p:grpSpPr>
+        <a:xfrm>
+          <a:off x="0" y="0"/>
+          <a:ext cx="0" cy="0"/>
+          <a:chOff x="0" y="0"/>
+          <a:chExt cx="0" cy="0"/>
+        </a:xfrm>
+      </p:grpSpPr>
       <p:pic>
         <p:nvPicPr>
           <p:cNvPr id="4" name="Picture 3" descr="f4.pdf">
@@ -4449,13 +5329,13 @@
         </p:nvPicPr>
         <p:blipFill rotWithShape="1">
           <a:blip r:embed="rId2"/>
-          <a:srcRect l="3529" t="10909" b="16408"/>
+          <a:srcRect l="3529" t="48462" b="16408"/>
           <a:stretch/>
         </p:blipFill>
         <p:spPr bwMode="auto">
           <a:xfrm>
-            <a:off x="285750" y="0"/>
-            <a:ext cx="6318250" cy="6160770"/>
+            <a:off x="333513" y="3404268"/>
+            <a:ext cx="6235339" cy="2938657"/>
           </a:xfrm>
           <a:prstGeom prst="rect">
             <a:avLst/>
@@ -4469,10 +5349,2213 @@
           </a:ln>
         </p:spPr>
       </p:pic>
+      <p:pic>
+        <p:nvPicPr>
+          <p:cNvPr id="14" name="Picture 13" descr="f4.pdf">
+            <a:extLst>
+              <a:ext uri="{FF2B5EF4-FFF2-40B4-BE49-F238E27FC236}">
+                <a16:creationId xmlns:a16="http://schemas.microsoft.com/office/drawing/2014/main" id="{8D2ED021-9B97-4FFB-AE6B-509DDFE26C9A}"/>
+              </a:ext>
+            </a:extLst>
+          </p:cNvPr>
+          <p:cNvPicPr>
+            <a:picLocks noChangeAspect="1"/>
+          </p:cNvPicPr>
+          <p:nvPr/>
+        </p:nvPicPr>
+        <p:blipFill rotWithShape="1">
+          <a:blip r:embed="rId2"/>
+          <a:srcRect l="3529" t="10909" b="53101"/>
+          <a:stretch/>
+        </p:blipFill>
+        <p:spPr bwMode="auto">
+          <a:xfrm>
+            <a:off x="-56225" y="314446"/>
+            <a:ext cx="6318250" cy="3050614"/>
+          </a:xfrm>
+          <a:prstGeom prst="rect">
+            <a:avLst/>
+          </a:prstGeom>
+          <a:noFill/>
+          <a:ln w="9525">
+            <a:noFill/>
+            <a:miter lim="800000"/>
+            <a:headEnd/>
+            <a:tailEnd/>
+          </a:ln>
+        </p:spPr>
+      </p:pic>
+      <p:sp>
+        <p:nvSpPr>
+          <p:cNvPr id="2" name="Rectangle 1">
+            <a:extLst>
+              <a:ext uri="{FF2B5EF4-FFF2-40B4-BE49-F238E27FC236}">
+                <a16:creationId xmlns:a16="http://schemas.microsoft.com/office/drawing/2014/main" id="{0BD134F0-BDD4-420E-B858-8A52915C7D60}"/>
+              </a:ext>
+            </a:extLst>
+          </p:cNvPr>
+          <p:cNvSpPr/>
+          <p:nvPr/>
+        </p:nvSpPr>
+        <p:spPr>
+          <a:xfrm>
+            <a:off x="2534856" y="590310"/>
+            <a:ext cx="925974" cy="243068"/>
+          </a:xfrm>
+          <a:prstGeom prst="rect">
+            <a:avLst/>
+          </a:prstGeom>
+          <a:solidFill>
+            <a:schemeClr val="bg1"/>
+          </a:solidFill>
+          <a:ln w="19050">
+            <a:solidFill>
+              <a:srgbClr val="FF0000"/>
+            </a:solidFill>
+          </a:ln>
+        </p:spPr>
+        <p:style>
+          <a:lnRef idx="2">
+            <a:schemeClr val="accent1">
+              <a:shade val="50000"/>
+            </a:schemeClr>
+          </a:lnRef>
+          <a:fillRef idx="1">
+            <a:schemeClr val="accent1"/>
+          </a:fillRef>
+          <a:effectRef idx="0">
+            <a:schemeClr val="accent1"/>
+          </a:effectRef>
+          <a:fontRef idx="minor">
+            <a:schemeClr val="lt1"/>
+          </a:fontRef>
+        </p:style>
+        <p:txBody>
+          <a:bodyPr rtlCol="0" anchor="ctr"/>
+          <a:lstStyle/>
+          <a:p>
+            <a:pPr algn="ctr"/>
+            <a:r>
+              <a:rPr lang="en-US" i="1" dirty="0">
+                <a:solidFill>
+                  <a:schemeClr val="tx1"/>
+                </a:solidFill>
+              </a:rPr>
+              <a:t>P</a:t>
+            </a:r>
+            <a:r>
+              <a:rPr lang="en-US" sz="1400" i="1" dirty="0">
+                <a:solidFill>
+                  <a:schemeClr val="tx1"/>
+                </a:solidFill>
+              </a:rPr>
+              <a:t>i</a:t>
+            </a:r>
+            <a:endParaRPr lang="en-US" i="1" dirty="0">
+              <a:solidFill>
+                <a:schemeClr val="tx1"/>
+              </a:solidFill>
+            </a:endParaRPr>
+          </a:p>
+        </p:txBody>
+      </p:sp>
+      <p:sp>
+        <p:nvSpPr>
+          <p:cNvPr id="18" name="Rectangle 17">
+            <a:extLst>
+              <a:ext uri="{FF2B5EF4-FFF2-40B4-BE49-F238E27FC236}">
+                <a16:creationId xmlns:a16="http://schemas.microsoft.com/office/drawing/2014/main" id="{25F472B1-C9B3-4447-BBA7-B9870DC1020B}"/>
+              </a:ext>
+            </a:extLst>
+          </p:cNvPr>
+          <p:cNvSpPr/>
+          <p:nvPr/>
+        </p:nvSpPr>
+        <p:spPr>
+          <a:xfrm>
+            <a:off x="580663" y="2478912"/>
+            <a:ext cx="925974" cy="243068"/>
+          </a:xfrm>
+          <a:prstGeom prst="rect">
+            <a:avLst/>
+          </a:prstGeom>
+          <a:solidFill>
+            <a:schemeClr val="bg1"/>
+          </a:solidFill>
+          <a:ln w="19050">
+            <a:solidFill>
+              <a:schemeClr val="tx1"/>
+            </a:solidFill>
+          </a:ln>
+        </p:spPr>
+        <p:style>
+          <a:lnRef idx="2">
+            <a:schemeClr val="accent1">
+              <a:shade val="50000"/>
+            </a:schemeClr>
+          </a:lnRef>
+          <a:fillRef idx="1">
+            <a:schemeClr val="accent1"/>
+          </a:fillRef>
+          <a:effectRef idx="0">
+            <a:schemeClr val="accent1"/>
+          </a:effectRef>
+          <a:fontRef idx="minor">
+            <a:schemeClr val="lt1"/>
+          </a:fontRef>
+        </p:style>
+        <p:txBody>
+          <a:bodyPr rtlCol="0" anchor="ctr"/>
+          <a:lstStyle/>
+          <a:p>
+            <a:pPr algn="ctr"/>
+            <a:r>
+              <a:rPr lang="en-US" i="1" dirty="0">
+                <a:solidFill>
+                  <a:schemeClr val="tx1"/>
+                </a:solidFill>
+              </a:rPr>
+              <a:t>C</a:t>
+            </a:r>
+            <a:r>
+              <a:rPr lang="en-US" sz="1400" i="1" dirty="0">
+                <a:solidFill>
+                  <a:schemeClr val="tx1"/>
+                </a:solidFill>
+              </a:rPr>
+              <a:t>i-1</a:t>
+            </a:r>
+            <a:endParaRPr lang="en-US" i="1" dirty="0">
+              <a:solidFill>
+                <a:schemeClr val="tx1"/>
+              </a:solidFill>
+            </a:endParaRPr>
+          </a:p>
+        </p:txBody>
+      </p:sp>
+      <p:sp>
+        <p:nvSpPr>
+          <p:cNvPr id="19" name="Rectangle 18">
+            <a:extLst>
+              <a:ext uri="{FF2B5EF4-FFF2-40B4-BE49-F238E27FC236}">
+                <a16:creationId xmlns:a16="http://schemas.microsoft.com/office/drawing/2014/main" id="{F8615EE9-5C73-4531-A0C4-104262691082}"/>
+              </a:ext>
+            </a:extLst>
+          </p:cNvPr>
+          <p:cNvSpPr/>
+          <p:nvPr/>
+        </p:nvSpPr>
+        <p:spPr>
+          <a:xfrm>
+            <a:off x="580663" y="590310"/>
+            <a:ext cx="925974" cy="243068"/>
+          </a:xfrm>
+          <a:prstGeom prst="rect">
+            <a:avLst/>
+          </a:prstGeom>
+          <a:solidFill>
+            <a:schemeClr val="bg1"/>
+          </a:solidFill>
+          <a:ln w="19050">
+            <a:solidFill>
+              <a:schemeClr val="tx1"/>
+            </a:solidFill>
+          </a:ln>
+        </p:spPr>
+        <p:style>
+          <a:lnRef idx="2">
+            <a:schemeClr val="accent1">
+              <a:shade val="50000"/>
+            </a:schemeClr>
+          </a:lnRef>
+          <a:fillRef idx="1">
+            <a:schemeClr val="accent1"/>
+          </a:fillRef>
+          <a:effectRef idx="0">
+            <a:schemeClr val="accent1"/>
+          </a:effectRef>
+          <a:fontRef idx="minor">
+            <a:schemeClr val="lt1"/>
+          </a:fontRef>
+        </p:style>
+        <p:txBody>
+          <a:bodyPr rtlCol="0" anchor="ctr"/>
+          <a:lstStyle/>
+          <a:p>
+            <a:pPr algn="ctr"/>
+            <a:r>
+              <a:rPr lang="en-US" i="1" dirty="0">
+                <a:solidFill>
+                  <a:schemeClr val="tx1"/>
+                </a:solidFill>
+              </a:rPr>
+              <a:t>P</a:t>
+            </a:r>
+            <a:r>
+              <a:rPr lang="en-US" sz="1400" i="1" dirty="0">
+                <a:solidFill>
+                  <a:schemeClr val="tx1"/>
+                </a:solidFill>
+              </a:rPr>
+              <a:t>i-1</a:t>
+            </a:r>
+            <a:endParaRPr lang="en-US" i="1" dirty="0">
+              <a:solidFill>
+                <a:schemeClr val="tx1"/>
+              </a:solidFill>
+            </a:endParaRPr>
+          </a:p>
+        </p:txBody>
+      </p:sp>
+      <p:sp>
+        <p:nvSpPr>
+          <p:cNvPr id="20" name="Rectangle 19">
+            <a:extLst>
+              <a:ext uri="{FF2B5EF4-FFF2-40B4-BE49-F238E27FC236}">
+                <a16:creationId xmlns:a16="http://schemas.microsoft.com/office/drawing/2014/main" id="{A940C020-F1AC-4612-9A1D-4ADE773CBE8D}"/>
+              </a:ext>
+            </a:extLst>
+          </p:cNvPr>
+          <p:cNvSpPr/>
+          <p:nvPr/>
+        </p:nvSpPr>
+        <p:spPr>
+          <a:xfrm>
+            <a:off x="47243" y="711844"/>
+            <a:ext cx="429952" cy="402563"/>
+          </a:xfrm>
+          <a:prstGeom prst="rect">
+            <a:avLst/>
+          </a:prstGeom>
+          <a:solidFill>
+            <a:schemeClr val="bg1"/>
+          </a:solidFill>
+          <a:ln w="19050">
+            <a:solidFill>
+              <a:schemeClr val="bg1"/>
+            </a:solidFill>
+          </a:ln>
+        </p:spPr>
+        <p:style>
+          <a:lnRef idx="2">
+            <a:schemeClr val="accent1">
+              <a:shade val="50000"/>
+            </a:schemeClr>
+          </a:lnRef>
+          <a:fillRef idx="1">
+            <a:schemeClr val="accent1"/>
+          </a:fillRef>
+          <a:effectRef idx="0">
+            <a:schemeClr val="accent1"/>
+          </a:effectRef>
+          <a:fontRef idx="minor">
+            <a:schemeClr val="lt1"/>
+          </a:fontRef>
+        </p:style>
+        <p:txBody>
+          <a:bodyPr rtlCol="0" anchor="ctr"/>
+          <a:lstStyle/>
+          <a:p>
+            <a:pPr algn="ctr"/>
+            <a:endParaRPr lang="en-US" i="1" dirty="0">
+              <a:solidFill>
+                <a:schemeClr val="tx1"/>
+              </a:solidFill>
+            </a:endParaRPr>
+          </a:p>
+        </p:txBody>
+      </p:sp>
+      <p:sp>
+        <p:nvSpPr>
+          <p:cNvPr id="21" name="Rectangle 20">
+            <a:extLst>
+              <a:ext uri="{FF2B5EF4-FFF2-40B4-BE49-F238E27FC236}">
+                <a16:creationId xmlns:a16="http://schemas.microsoft.com/office/drawing/2014/main" id="{876C38A9-EB99-44BB-9755-DFE74004F134}"/>
+              </a:ext>
+            </a:extLst>
+          </p:cNvPr>
+          <p:cNvSpPr/>
+          <p:nvPr/>
+        </p:nvSpPr>
+        <p:spPr>
+          <a:xfrm>
+            <a:off x="2525209" y="2495652"/>
+            <a:ext cx="925974" cy="243068"/>
+          </a:xfrm>
+          <a:prstGeom prst="rect">
+            <a:avLst/>
+          </a:prstGeom>
+          <a:solidFill>
+            <a:schemeClr val="bg1"/>
+          </a:solidFill>
+          <a:ln w="19050">
+            <a:solidFill>
+              <a:schemeClr val="tx1"/>
+            </a:solidFill>
+          </a:ln>
+        </p:spPr>
+        <p:style>
+          <a:lnRef idx="2">
+            <a:schemeClr val="accent1">
+              <a:shade val="50000"/>
+            </a:schemeClr>
+          </a:lnRef>
+          <a:fillRef idx="1">
+            <a:schemeClr val="accent1"/>
+          </a:fillRef>
+          <a:effectRef idx="0">
+            <a:schemeClr val="accent1"/>
+          </a:effectRef>
+          <a:fontRef idx="minor">
+            <a:schemeClr val="lt1"/>
+          </a:fontRef>
+        </p:style>
+        <p:txBody>
+          <a:bodyPr rtlCol="0" anchor="ctr"/>
+          <a:lstStyle/>
+          <a:p>
+            <a:pPr algn="ctr"/>
+            <a:r>
+              <a:rPr lang="en-US" i="1" dirty="0">
+                <a:solidFill>
+                  <a:schemeClr val="tx1"/>
+                </a:solidFill>
+              </a:rPr>
+              <a:t>C</a:t>
+            </a:r>
+            <a:r>
+              <a:rPr lang="en-US" sz="1400" i="1" dirty="0">
+                <a:solidFill>
+                  <a:schemeClr val="tx1"/>
+                </a:solidFill>
+              </a:rPr>
+              <a:t>i</a:t>
+            </a:r>
+            <a:endParaRPr lang="en-US" i="1" dirty="0">
+              <a:solidFill>
+                <a:schemeClr val="tx1"/>
+              </a:solidFill>
+            </a:endParaRPr>
+          </a:p>
+        </p:txBody>
+      </p:sp>
+      <p:sp>
+        <p:nvSpPr>
+          <p:cNvPr id="6" name="Rectangle 5">
+            <a:extLst>
+              <a:ext uri="{FF2B5EF4-FFF2-40B4-BE49-F238E27FC236}">
+                <a16:creationId xmlns:a16="http://schemas.microsoft.com/office/drawing/2014/main" id="{8121A904-BC4E-4284-B083-9DE0A1706665}"/>
+              </a:ext>
+            </a:extLst>
+          </p:cNvPr>
+          <p:cNvSpPr/>
+          <p:nvPr/>
+        </p:nvSpPr>
+        <p:spPr>
+          <a:xfrm>
+            <a:off x="6797431" y="1839753"/>
+            <a:ext cx="4702779" cy="3416320"/>
+          </a:xfrm>
+          <a:prstGeom prst="rect">
+            <a:avLst/>
+          </a:prstGeom>
+          <a:ln>
+            <a:solidFill>
+              <a:schemeClr val="tx1"/>
+            </a:solidFill>
+          </a:ln>
+        </p:spPr>
+        <p:txBody>
+          <a:bodyPr wrap="square">
+            <a:spAutoFit/>
+          </a:bodyPr>
+          <a:lstStyle/>
+          <a:p>
+            <a:pPr>
+              <a:tabLst>
+                <a:tab pos="285750" algn="l"/>
+              </a:tabLst>
+            </a:pPr>
+            <a:r>
+              <a:rPr lang="en-US" dirty="0">
+                <a:latin typeface="Calibri" panose="020F0502020204030204" pitchFamily="34" charset="0"/>
+                <a:ea typeface="Calibri" panose="020F0502020204030204" pitchFamily="34" charset="0"/>
+                <a:cs typeface="Times New Roman" panose="02020603050405020304" pitchFamily="18" charset="0"/>
+              </a:rPr>
+              <a:t>After Oracle success, attacker knows:</a:t>
+            </a:r>
+          </a:p>
+          <a:p>
+            <a:pPr>
+              <a:tabLst>
+                <a:tab pos="285750" algn="l"/>
+              </a:tabLst>
+            </a:pPr>
+            <a:r>
+              <a:rPr lang="en-US" dirty="0">
+                <a:latin typeface="Calibri" panose="020F0502020204030204" pitchFamily="34" charset="0"/>
+                <a:ea typeface="Calibri" panose="020F0502020204030204" pitchFamily="34" charset="0"/>
+                <a:cs typeface="Times New Roman" panose="02020603050405020304" pitchFamily="18" charset="0"/>
+              </a:rPr>
+              <a:t>1. D</a:t>
+            </a:r>
+            <a:r>
+              <a:rPr lang="en-US" baseline="-25000" dirty="0">
+                <a:latin typeface="Calibri" panose="020F0502020204030204" pitchFamily="34" charset="0"/>
+                <a:ea typeface="Calibri" panose="020F0502020204030204" pitchFamily="34" charset="0"/>
+                <a:cs typeface="Times New Roman" panose="02020603050405020304" pitchFamily="18" charset="0"/>
+              </a:rPr>
+              <a:t>K</a:t>
+            </a:r>
+            <a:r>
+              <a:rPr lang="en-US" dirty="0">
+                <a:latin typeface="Calibri" panose="020F0502020204030204" pitchFamily="34" charset="0"/>
+                <a:ea typeface="Calibri" panose="020F0502020204030204" pitchFamily="34" charset="0"/>
+                <a:cs typeface="Times New Roman" panose="02020603050405020304" pitchFamily="18" charset="0"/>
+              </a:rPr>
+              <a:t>(C</a:t>
+            </a:r>
+            <a:r>
+              <a:rPr lang="en-US" baseline="-25000" dirty="0">
+                <a:latin typeface="Calibri" panose="020F0502020204030204" pitchFamily="34" charset="0"/>
+                <a:ea typeface="Calibri" panose="020F0502020204030204" pitchFamily="34" charset="0"/>
+                <a:cs typeface="Times New Roman" panose="02020603050405020304" pitchFamily="18" charset="0"/>
+              </a:rPr>
+              <a:t>i</a:t>
+            </a:r>
+            <a:r>
+              <a:rPr lang="en-US" dirty="0">
+                <a:latin typeface="Calibri" panose="020F0502020204030204" pitchFamily="34" charset="0"/>
+                <a:ea typeface="Calibri" panose="020F0502020204030204" pitchFamily="34" charset="0"/>
+                <a:cs typeface="Times New Roman" panose="02020603050405020304" pitchFamily="18" charset="0"/>
+              </a:rPr>
+              <a:t>)[15] </a:t>
+            </a:r>
+            <a:r>
+              <a:rPr lang="en-US" dirty="0">
+                <a:latin typeface="Cambria Math" panose="02040503050406030204" pitchFamily="18" charset="0"/>
+                <a:ea typeface="Calibri" panose="020F0502020204030204" pitchFamily="34" charset="0"/>
+                <a:cs typeface="Cambria Math" panose="02040503050406030204" pitchFamily="18" charset="0"/>
+              </a:rPr>
+              <a:t>⊕</a:t>
+            </a:r>
+            <a:r>
+              <a:rPr lang="en-US" dirty="0">
+                <a:latin typeface="Calibri" panose="020F0502020204030204" pitchFamily="34" charset="0"/>
+                <a:ea typeface="Calibri" panose="020F0502020204030204" pitchFamily="34" charset="0"/>
+                <a:cs typeface="Times New Roman" panose="02020603050405020304" pitchFamily="18" charset="0"/>
+              </a:rPr>
+              <a:t> C</a:t>
+            </a:r>
+            <a:r>
+              <a:rPr lang="en-US" baseline="-25000" dirty="0">
+                <a:latin typeface="Calibri" panose="020F0502020204030204" pitchFamily="34" charset="0"/>
+                <a:ea typeface="Calibri" panose="020F0502020204030204" pitchFamily="34" charset="0"/>
+                <a:cs typeface="Times New Roman" panose="02020603050405020304" pitchFamily="18" charset="0"/>
+              </a:rPr>
+              <a:t>n-</a:t>
+            </a:r>
+            <a:r>
+              <a:rPr lang="en-US" baseline="-25000" dirty="0">
+                <a:latin typeface="Calibri" panose="020F0502020204030204" pitchFamily="34" charset="0"/>
+                <a:ea typeface="Calibri" panose="020F0502020204030204" pitchFamily="34" charset="0"/>
+                <a:cs typeface="Calibri" panose="020F0502020204030204" pitchFamily="34" charset="0"/>
+              </a:rPr>
+              <a:t>­</a:t>
+            </a:r>
+            <a:r>
+              <a:rPr lang="en-US" baseline="-25000" dirty="0">
+                <a:latin typeface="Calibri" panose="020F0502020204030204" pitchFamily="34" charset="0"/>
+                <a:ea typeface="Calibri" panose="020F0502020204030204" pitchFamily="34" charset="0"/>
+                <a:cs typeface="Times New Roman" panose="02020603050405020304" pitchFamily="18" charset="0"/>
+              </a:rPr>
+              <a:t>1</a:t>
+            </a:r>
+            <a:r>
+              <a:rPr lang="en-US" dirty="0">
+                <a:latin typeface="Calibri" panose="020F0502020204030204" pitchFamily="34" charset="0"/>
+                <a:ea typeface="Calibri" panose="020F0502020204030204" pitchFamily="34" charset="0"/>
+                <a:cs typeface="Times New Roman" panose="02020603050405020304" pitchFamily="18" charset="0"/>
+              </a:rPr>
+              <a:t>[15] = 15</a:t>
+            </a:r>
+          </a:p>
+          <a:p>
+            <a:pPr>
+              <a:tabLst>
+                <a:tab pos="285750" algn="l"/>
+              </a:tabLst>
+            </a:pPr>
+            <a:endParaRPr lang="en-US" dirty="0">
+              <a:latin typeface="Calibri" panose="020F0502020204030204" pitchFamily="34" charset="0"/>
+              <a:ea typeface="Calibri" panose="020F0502020204030204" pitchFamily="34" charset="0"/>
+              <a:cs typeface="Times New Roman" panose="02020603050405020304" pitchFamily="18" charset="0"/>
+            </a:endParaRPr>
+          </a:p>
+          <a:p>
+            <a:pPr>
+              <a:tabLst>
+                <a:tab pos="285750" algn="l"/>
+              </a:tabLst>
+            </a:pPr>
+            <a:r>
+              <a:rPr lang="en-US" dirty="0">
+                <a:latin typeface="Calibri" panose="020F0502020204030204" pitchFamily="34" charset="0"/>
+                <a:ea typeface="Calibri" panose="020F0502020204030204" pitchFamily="34" charset="0"/>
+                <a:cs typeface="Times New Roman" panose="02020603050405020304" pitchFamily="18" charset="0"/>
+              </a:rPr>
+              <a:t>2. D(C</a:t>
+            </a:r>
+            <a:r>
+              <a:rPr lang="en-US" baseline="-25000" dirty="0">
+                <a:latin typeface="Calibri" panose="020F0502020204030204" pitchFamily="34" charset="0"/>
+                <a:ea typeface="Calibri" panose="020F0502020204030204" pitchFamily="34" charset="0"/>
+                <a:cs typeface="Times New Roman" panose="02020603050405020304" pitchFamily="18" charset="0"/>
+              </a:rPr>
+              <a:t>i</a:t>
+            </a:r>
+            <a:r>
+              <a:rPr lang="en-US" dirty="0">
+                <a:latin typeface="Calibri" panose="020F0502020204030204" pitchFamily="34" charset="0"/>
+                <a:ea typeface="Calibri" panose="020F0502020204030204" pitchFamily="34" charset="0"/>
+                <a:cs typeface="Times New Roman" panose="02020603050405020304" pitchFamily="18" charset="0"/>
+              </a:rPr>
+              <a:t>) = P</a:t>
+            </a:r>
+            <a:r>
+              <a:rPr lang="en-US" baseline="-25000" dirty="0">
+                <a:latin typeface="Calibri" panose="020F0502020204030204" pitchFamily="34" charset="0"/>
+                <a:ea typeface="Calibri" panose="020F0502020204030204" pitchFamily="34" charset="0"/>
+                <a:cs typeface="Times New Roman" panose="02020603050405020304" pitchFamily="18" charset="0"/>
+              </a:rPr>
+              <a:t>i</a:t>
+            </a:r>
+            <a:r>
+              <a:rPr lang="en-US" dirty="0">
+                <a:latin typeface="Calibri" panose="020F0502020204030204" pitchFamily="34" charset="0"/>
+                <a:ea typeface="Calibri" panose="020F0502020204030204" pitchFamily="34" charset="0"/>
+                <a:cs typeface="Times New Roman" panose="02020603050405020304" pitchFamily="18" charset="0"/>
+              </a:rPr>
+              <a:t> </a:t>
+            </a:r>
+            <a:r>
+              <a:rPr lang="en-US" dirty="0">
+                <a:latin typeface="Cambria Math" panose="02040503050406030204" pitchFamily="18" charset="0"/>
+                <a:ea typeface="Calibri" panose="020F0502020204030204" pitchFamily="34" charset="0"/>
+                <a:cs typeface="Cambria Math" panose="02040503050406030204" pitchFamily="18" charset="0"/>
+              </a:rPr>
+              <a:t>⊕</a:t>
+            </a:r>
+            <a:r>
+              <a:rPr lang="en-US" dirty="0">
+                <a:latin typeface="Calibri" panose="020F0502020204030204" pitchFamily="34" charset="0"/>
+                <a:ea typeface="Calibri" panose="020F0502020204030204" pitchFamily="34" charset="0"/>
+                <a:cs typeface="Times New Roman" panose="02020603050405020304" pitchFamily="18" charset="0"/>
+              </a:rPr>
+              <a:t> C</a:t>
+            </a:r>
+            <a:r>
+              <a:rPr lang="en-US" baseline="-25000" dirty="0">
+                <a:latin typeface="Calibri" panose="020F0502020204030204" pitchFamily="34" charset="0"/>
+                <a:ea typeface="Calibri" panose="020F0502020204030204" pitchFamily="34" charset="0"/>
+                <a:cs typeface="Times New Roman" panose="02020603050405020304" pitchFamily="18" charset="0"/>
+              </a:rPr>
+              <a:t>i-1</a:t>
+            </a:r>
+          </a:p>
+          <a:p>
+            <a:pPr>
+              <a:tabLst>
+                <a:tab pos="285750" algn="l"/>
+              </a:tabLst>
+            </a:pPr>
+            <a:endParaRPr lang="en-US" dirty="0">
+              <a:latin typeface="Calibri" panose="020F0502020204030204" pitchFamily="34" charset="0"/>
+              <a:ea typeface="Calibri" panose="020F0502020204030204" pitchFamily="34" charset="0"/>
+              <a:cs typeface="Times New Roman" panose="02020603050405020304" pitchFamily="18" charset="0"/>
+            </a:endParaRPr>
+          </a:p>
+          <a:p>
+            <a:pPr>
+              <a:tabLst>
+                <a:tab pos="285750" algn="l"/>
+              </a:tabLst>
+            </a:pPr>
+            <a:r>
+              <a:rPr lang="en-US" dirty="0">
+                <a:latin typeface="Calibri" panose="020F0502020204030204" pitchFamily="34" charset="0"/>
+                <a:ea typeface="Calibri" panose="020F0502020204030204" pitchFamily="34" charset="0"/>
+                <a:cs typeface="Times New Roman" panose="02020603050405020304" pitchFamily="18" charset="0"/>
+              </a:rPr>
+              <a:t>3. </a:t>
+            </a:r>
+            <a:r>
+              <a:rPr lang="pl-PL" dirty="0">
+                <a:latin typeface="Calibri" panose="020F0502020204030204" pitchFamily="34" charset="0"/>
+                <a:ea typeface="Calibri" panose="020F0502020204030204" pitchFamily="34" charset="0"/>
+                <a:cs typeface="Times New Roman" panose="02020603050405020304" pitchFamily="18" charset="0"/>
+              </a:rPr>
+              <a:t>D(C</a:t>
+            </a:r>
+            <a:r>
+              <a:rPr lang="pl-PL" baseline="-25000" dirty="0">
+                <a:latin typeface="Calibri" panose="020F0502020204030204" pitchFamily="34" charset="0"/>
+                <a:ea typeface="Calibri" panose="020F0502020204030204" pitchFamily="34" charset="0"/>
+                <a:cs typeface="Times New Roman" panose="02020603050405020304" pitchFamily="18" charset="0"/>
+              </a:rPr>
+              <a:t>i</a:t>
+            </a:r>
+            <a:r>
+              <a:rPr lang="pl-PL" dirty="0">
+                <a:latin typeface="Calibri" panose="020F0502020204030204" pitchFamily="34" charset="0"/>
+                <a:ea typeface="Calibri" panose="020F0502020204030204" pitchFamily="34" charset="0"/>
+                <a:cs typeface="Times New Roman" panose="02020603050405020304" pitchFamily="18" charset="0"/>
+              </a:rPr>
+              <a:t>)[15] = P</a:t>
+            </a:r>
+            <a:r>
+              <a:rPr lang="pl-PL" baseline="-25000" dirty="0">
+                <a:latin typeface="Calibri" panose="020F0502020204030204" pitchFamily="34" charset="0"/>
+                <a:ea typeface="Calibri" panose="020F0502020204030204" pitchFamily="34" charset="0"/>
+                <a:cs typeface="Times New Roman" panose="02020603050405020304" pitchFamily="18" charset="0"/>
+              </a:rPr>
+              <a:t>i</a:t>
+            </a:r>
+            <a:r>
+              <a:rPr lang="pl-PL" dirty="0">
+                <a:latin typeface="Calibri" panose="020F0502020204030204" pitchFamily="34" charset="0"/>
+                <a:ea typeface="Calibri" panose="020F0502020204030204" pitchFamily="34" charset="0"/>
+                <a:cs typeface="Times New Roman" panose="02020603050405020304" pitchFamily="18" charset="0"/>
+              </a:rPr>
+              <a:t>[15]</a:t>
+            </a:r>
+            <a:r>
+              <a:rPr lang="pl-PL" dirty="0">
+                <a:latin typeface="Cambria Math" panose="02040503050406030204" pitchFamily="18" charset="0"/>
+                <a:ea typeface="Calibri" panose="020F0502020204030204" pitchFamily="34" charset="0"/>
+                <a:cs typeface="Cambria Math" panose="02040503050406030204" pitchFamily="18" charset="0"/>
+              </a:rPr>
+              <a:t> ⊕</a:t>
+            </a:r>
+            <a:r>
+              <a:rPr lang="pl-PL" dirty="0">
+                <a:latin typeface="Calibri" panose="020F0502020204030204" pitchFamily="34" charset="0"/>
+                <a:ea typeface="Calibri" panose="020F0502020204030204" pitchFamily="34" charset="0"/>
+                <a:cs typeface="Times New Roman" panose="02020603050405020304" pitchFamily="18" charset="0"/>
+              </a:rPr>
+              <a:t> C</a:t>
+            </a:r>
+            <a:r>
+              <a:rPr lang="pl-PL" baseline="-25000" dirty="0">
+                <a:latin typeface="Calibri" panose="020F0502020204030204" pitchFamily="34" charset="0"/>
+                <a:ea typeface="Calibri" panose="020F0502020204030204" pitchFamily="34" charset="0"/>
+                <a:cs typeface="Times New Roman" panose="02020603050405020304" pitchFamily="18" charset="0"/>
+              </a:rPr>
+              <a:t>i-1</a:t>
+            </a:r>
+            <a:r>
+              <a:rPr lang="pl-PL" dirty="0">
+                <a:latin typeface="Calibri" panose="020F0502020204030204" pitchFamily="34" charset="0"/>
+                <a:ea typeface="Calibri" panose="020F0502020204030204" pitchFamily="34" charset="0"/>
+                <a:cs typeface="Times New Roman" panose="02020603050405020304" pitchFamily="18" charset="0"/>
+              </a:rPr>
+              <a:t>[15]</a:t>
+            </a:r>
+            <a:r>
+              <a:rPr lang="en-US" dirty="0">
+                <a:latin typeface="Calibri" panose="020F0502020204030204" pitchFamily="34" charset="0"/>
+                <a:ea typeface="Calibri" panose="020F0502020204030204" pitchFamily="34" charset="0"/>
+                <a:cs typeface="Times New Roman" panose="02020603050405020304" pitchFamily="18" charset="0"/>
+              </a:rPr>
+              <a:t>             Bitwise	</a:t>
+            </a:r>
+          </a:p>
+          <a:p>
+            <a:pPr>
+              <a:tabLst>
+                <a:tab pos="285750" algn="l"/>
+              </a:tabLst>
+            </a:pPr>
+            <a:r>
+              <a:rPr lang="en-US" dirty="0">
+                <a:latin typeface="Calibri" panose="020F0502020204030204" pitchFamily="34" charset="0"/>
+                <a:ea typeface="Calibri" panose="020F0502020204030204" pitchFamily="34" charset="0"/>
+                <a:cs typeface="Times New Roman" panose="02020603050405020304" pitchFamily="18" charset="0"/>
+              </a:rPr>
+              <a:t>4. (P</a:t>
+            </a:r>
+            <a:r>
+              <a:rPr lang="en-US" baseline="-25000" dirty="0">
+                <a:latin typeface="Calibri" panose="020F0502020204030204" pitchFamily="34" charset="0"/>
+                <a:ea typeface="Calibri" panose="020F0502020204030204" pitchFamily="34" charset="0"/>
+                <a:cs typeface="Times New Roman" panose="02020603050405020304" pitchFamily="18" charset="0"/>
+              </a:rPr>
+              <a:t>i</a:t>
+            </a:r>
+            <a:r>
+              <a:rPr lang="en-US" dirty="0">
+                <a:latin typeface="Calibri" panose="020F0502020204030204" pitchFamily="34" charset="0"/>
+                <a:ea typeface="Calibri" panose="020F0502020204030204" pitchFamily="34" charset="0"/>
+                <a:cs typeface="Times New Roman" panose="02020603050405020304" pitchFamily="18" charset="0"/>
+              </a:rPr>
+              <a:t>[15]</a:t>
+            </a:r>
+            <a:r>
+              <a:rPr lang="en-US" dirty="0">
+                <a:latin typeface="Cambria Math" panose="02040503050406030204" pitchFamily="18" charset="0"/>
+                <a:ea typeface="Calibri" panose="020F0502020204030204" pitchFamily="34" charset="0"/>
+                <a:cs typeface="Cambria Math" panose="02040503050406030204" pitchFamily="18" charset="0"/>
+              </a:rPr>
+              <a:t> ⊕</a:t>
+            </a:r>
+            <a:r>
+              <a:rPr lang="en-US" dirty="0">
+                <a:latin typeface="Calibri" panose="020F0502020204030204" pitchFamily="34" charset="0"/>
+                <a:ea typeface="Calibri" panose="020F0502020204030204" pitchFamily="34" charset="0"/>
+                <a:cs typeface="Times New Roman" panose="02020603050405020304" pitchFamily="18" charset="0"/>
+              </a:rPr>
+              <a:t> C</a:t>
+            </a:r>
+            <a:r>
+              <a:rPr lang="en-US" baseline="-25000" dirty="0">
+                <a:latin typeface="Calibri" panose="020F0502020204030204" pitchFamily="34" charset="0"/>
+                <a:ea typeface="Calibri" panose="020F0502020204030204" pitchFamily="34" charset="0"/>
+                <a:cs typeface="Times New Roman" panose="02020603050405020304" pitchFamily="18" charset="0"/>
+              </a:rPr>
+              <a:t>i-1</a:t>
+            </a:r>
+            <a:r>
+              <a:rPr lang="en-US" dirty="0">
+                <a:latin typeface="Calibri" panose="020F0502020204030204" pitchFamily="34" charset="0"/>
+                <a:ea typeface="Calibri" panose="020F0502020204030204" pitchFamily="34" charset="0"/>
+                <a:cs typeface="Times New Roman" panose="02020603050405020304" pitchFamily="18" charset="0"/>
+              </a:rPr>
+              <a:t>[15]) </a:t>
+            </a:r>
+            <a:r>
+              <a:rPr lang="en-US" dirty="0">
+                <a:latin typeface="Cambria Math" panose="02040503050406030204" pitchFamily="18" charset="0"/>
+                <a:ea typeface="Calibri" panose="020F0502020204030204" pitchFamily="34" charset="0"/>
+                <a:cs typeface="Cambria Math" panose="02040503050406030204" pitchFamily="18" charset="0"/>
+              </a:rPr>
+              <a:t>⊕</a:t>
+            </a:r>
+            <a:r>
+              <a:rPr lang="en-US" dirty="0">
+                <a:latin typeface="Calibri" panose="020F0502020204030204" pitchFamily="34" charset="0"/>
+                <a:ea typeface="Calibri" panose="020F0502020204030204" pitchFamily="34" charset="0"/>
+                <a:cs typeface="Times New Roman" panose="02020603050405020304" pitchFamily="18" charset="0"/>
+              </a:rPr>
+              <a:t> C</a:t>
+            </a:r>
+            <a:r>
+              <a:rPr lang="en-US" baseline="-25000" dirty="0">
+                <a:latin typeface="Calibri" panose="020F0502020204030204" pitchFamily="34" charset="0"/>
+                <a:ea typeface="Calibri" panose="020F0502020204030204" pitchFamily="34" charset="0"/>
+                <a:cs typeface="Times New Roman" panose="02020603050405020304" pitchFamily="18" charset="0"/>
+              </a:rPr>
+              <a:t>n</a:t>
+            </a:r>
+            <a:r>
+              <a:rPr lang="en-US" baseline="-25000" dirty="0">
+                <a:latin typeface="Calibri" panose="020F0502020204030204" pitchFamily="34" charset="0"/>
+                <a:ea typeface="Calibri" panose="020F0502020204030204" pitchFamily="34" charset="0"/>
+                <a:cs typeface="Calibri" panose="020F0502020204030204" pitchFamily="34" charset="0"/>
+              </a:rPr>
+              <a:t>­</a:t>
+            </a:r>
+            <a:r>
+              <a:rPr lang="en-US" baseline="-25000" dirty="0">
+                <a:latin typeface="Calibri" panose="020F0502020204030204" pitchFamily="34" charset="0"/>
+                <a:ea typeface="Calibri" panose="020F0502020204030204" pitchFamily="34" charset="0"/>
+                <a:cs typeface="Times New Roman" panose="02020603050405020304" pitchFamily="18" charset="0"/>
+              </a:rPr>
+              <a:t>1</a:t>
+            </a:r>
+            <a:r>
+              <a:rPr lang="en-US" dirty="0">
+                <a:latin typeface="Calibri" panose="020F0502020204030204" pitchFamily="34" charset="0"/>
+                <a:ea typeface="Calibri" panose="020F0502020204030204" pitchFamily="34" charset="0"/>
+                <a:cs typeface="Times New Roman" panose="02020603050405020304" pitchFamily="18" charset="0"/>
+              </a:rPr>
+              <a:t>[15] = 15   Substitute</a:t>
+            </a:r>
+          </a:p>
+          <a:p>
+            <a:pPr>
+              <a:tabLst>
+                <a:tab pos="285750" algn="l"/>
+              </a:tabLst>
+            </a:pPr>
+            <a:endParaRPr lang="en-US" dirty="0">
+              <a:latin typeface="Calibri" panose="020F0502020204030204" pitchFamily="34" charset="0"/>
+              <a:ea typeface="Calibri" panose="020F0502020204030204" pitchFamily="34" charset="0"/>
+              <a:cs typeface="Times New Roman" panose="02020603050405020304" pitchFamily="18" charset="0"/>
+            </a:endParaRPr>
+          </a:p>
+          <a:p>
+            <a:pPr>
+              <a:tabLst>
+                <a:tab pos="285750" algn="l"/>
+              </a:tabLst>
+            </a:pPr>
+            <a:r>
+              <a:rPr lang="en-US" dirty="0">
+                <a:latin typeface="Calibri" panose="020F0502020204030204" pitchFamily="34" charset="0"/>
+                <a:ea typeface="Calibri" panose="020F0502020204030204" pitchFamily="34" charset="0"/>
+                <a:cs typeface="Times New Roman" panose="02020603050405020304" pitchFamily="18" charset="0"/>
+              </a:rPr>
+              <a:t>5. P</a:t>
+            </a:r>
+            <a:r>
+              <a:rPr lang="en-US" baseline="-25000" dirty="0">
+                <a:latin typeface="Calibri" panose="020F0502020204030204" pitchFamily="34" charset="0"/>
+                <a:ea typeface="Calibri" panose="020F0502020204030204" pitchFamily="34" charset="0"/>
+                <a:cs typeface="Times New Roman" panose="02020603050405020304" pitchFamily="18" charset="0"/>
+              </a:rPr>
+              <a:t>i</a:t>
+            </a:r>
+            <a:r>
+              <a:rPr lang="en-US" dirty="0">
+                <a:latin typeface="Calibri" panose="020F0502020204030204" pitchFamily="34" charset="0"/>
+                <a:ea typeface="Calibri" panose="020F0502020204030204" pitchFamily="34" charset="0"/>
+                <a:cs typeface="Times New Roman" panose="02020603050405020304" pitchFamily="18" charset="0"/>
+              </a:rPr>
+              <a:t>[15]</a:t>
+            </a:r>
+            <a:r>
+              <a:rPr lang="en-US" dirty="0">
+                <a:latin typeface="Cambria Math" panose="02040503050406030204" pitchFamily="18" charset="0"/>
+                <a:ea typeface="Calibri" panose="020F0502020204030204" pitchFamily="34" charset="0"/>
+                <a:cs typeface="Cambria Math" panose="02040503050406030204" pitchFamily="18" charset="0"/>
+              </a:rPr>
+              <a:t> ⊕</a:t>
+            </a:r>
+            <a:r>
+              <a:rPr lang="en-US" dirty="0">
+                <a:latin typeface="Calibri" panose="020F0502020204030204" pitchFamily="34" charset="0"/>
+                <a:ea typeface="Calibri" panose="020F0502020204030204" pitchFamily="34" charset="0"/>
+                <a:cs typeface="Times New Roman" panose="02020603050405020304" pitchFamily="18" charset="0"/>
+              </a:rPr>
+              <a:t> C</a:t>
+            </a:r>
+            <a:r>
+              <a:rPr lang="en-US" baseline="-25000" dirty="0">
+                <a:latin typeface="Calibri" panose="020F0502020204030204" pitchFamily="34" charset="0"/>
+                <a:ea typeface="Calibri" panose="020F0502020204030204" pitchFamily="34" charset="0"/>
+                <a:cs typeface="Times New Roman" panose="02020603050405020304" pitchFamily="18" charset="0"/>
+              </a:rPr>
+              <a:t>i-1</a:t>
+            </a:r>
+            <a:r>
+              <a:rPr lang="en-US" dirty="0">
+                <a:latin typeface="Calibri" panose="020F0502020204030204" pitchFamily="34" charset="0"/>
+                <a:ea typeface="Calibri" panose="020F0502020204030204" pitchFamily="34" charset="0"/>
+                <a:cs typeface="Times New Roman" panose="02020603050405020304" pitchFamily="18" charset="0"/>
+              </a:rPr>
+              <a:t>[15] </a:t>
+            </a:r>
+            <a:r>
+              <a:rPr lang="en-US" dirty="0">
+                <a:latin typeface="Cambria Math" panose="02040503050406030204" pitchFamily="18" charset="0"/>
+                <a:ea typeface="Calibri" panose="020F0502020204030204" pitchFamily="34" charset="0"/>
+                <a:cs typeface="Cambria Math" panose="02040503050406030204" pitchFamily="18" charset="0"/>
+              </a:rPr>
+              <a:t>⊕</a:t>
+            </a:r>
+            <a:r>
+              <a:rPr lang="en-US" dirty="0">
+                <a:latin typeface="Calibri" panose="020F0502020204030204" pitchFamily="34" charset="0"/>
+                <a:ea typeface="Calibri" panose="020F0502020204030204" pitchFamily="34" charset="0"/>
+                <a:cs typeface="Times New Roman" panose="02020603050405020304" pitchFamily="18" charset="0"/>
+              </a:rPr>
+              <a:t> C</a:t>
+            </a:r>
+            <a:r>
+              <a:rPr lang="en-US" baseline="-25000" dirty="0">
+                <a:latin typeface="Calibri" panose="020F0502020204030204" pitchFamily="34" charset="0"/>
+                <a:ea typeface="Calibri" panose="020F0502020204030204" pitchFamily="34" charset="0"/>
+                <a:cs typeface="Times New Roman" panose="02020603050405020304" pitchFamily="18" charset="0"/>
+              </a:rPr>
+              <a:t>n</a:t>
+            </a:r>
+            <a:r>
+              <a:rPr lang="en-US" baseline="-25000" dirty="0">
+                <a:latin typeface="Calibri" panose="020F0502020204030204" pitchFamily="34" charset="0"/>
+                <a:ea typeface="Calibri" panose="020F0502020204030204" pitchFamily="34" charset="0"/>
+                <a:cs typeface="Calibri" panose="020F0502020204030204" pitchFamily="34" charset="0"/>
+              </a:rPr>
+              <a:t>­</a:t>
+            </a:r>
+            <a:r>
+              <a:rPr lang="en-US" baseline="-25000" dirty="0">
+                <a:latin typeface="Calibri" panose="020F0502020204030204" pitchFamily="34" charset="0"/>
+                <a:ea typeface="Calibri" panose="020F0502020204030204" pitchFamily="34" charset="0"/>
+                <a:cs typeface="Times New Roman" panose="02020603050405020304" pitchFamily="18" charset="0"/>
+              </a:rPr>
+              <a:t>1</a:t>
+            </a:r>
+            <a:r>
+              <a:rPr lang="en-US" dirty="0">
+                <a:latin typeface="Calibri" panose="020F0502020204030204" pitchFamily="34" charset="0"/>
+                <a:ea typeface="Calibri" panose="020F0502020204030204" pitchFamily="34" charset="0"/>
+                <a:cs typeface="Times New Roman" panose="02020603050405020304" pitchFamily="18" charset="0"/>
+              </a:rPr>
+              <a:t>[15] = 15</a:t>
+            </a:r>
+          </a:p>
+          <a:p>
+            <a:pPr>
+              <a:tabLst>
+                <a:tab pos="285750" algn="l"/>
+              </a:tabLst>
+            </a:pPr>
+            <a:endParaRPr lang="en-US" dirty="0">
+              <a:latin typeface="Calibri" panose="020F0502020204030204" pitchFamily="34" charset="0"/>
+              <a:ea typeface="Calibri" panose="020F0502020204030204" pitchFamily="34" charset="0"/>
+              <a:cs typeface="Times New Roman" panose="02020603050405020304" pitchFamily="18" charset="0"/>
+            </a:endParaRPr>
+          </a:p>
+          <a:p>
+            <a:pPr>
+              <a:tabLst>
+                <a:tab pos="285750" algn="l"/>
+              </a:tabLst>
+            </a:pPr>
+            <a:r>
+              <a:rPr lang="en-US" dirty="0">
+                <a:latin typeface="Calibri" panose="020F0502020204030204" pitchFamily="34" charset="0"/>
+                <a:ea typeface="Calibri" panose="020F0502020204030204" pitchFamily="34" charset="0"/>
+                <a:cs typeface="Times New Roman" panose="02020603050405020304" pitchFamily="18" charset="0"/>
+              </a:rPr>
+              <a:t>6. </a:t>
+            </a:r>
+            <a:r>
+              <a:rPr lang="en-US" b="1" dirty="0">
+                <a:latin typeface="Calibri" panose="020F0502020204030204" pitchFamily="34" charset="0"/>
+                <a:ea typeface="Calibri" panose="020F0502020204030204" pitchFamily="34" charset="0"/>
+                <a:cs typeface="Times New Roman" panose="02020603050405020304" pitchFamily="18" charset="0"/>
+              </a:rPr>
+              <a:t>P</a:t>
+            </a:r>
+            <a:r>
+              <a:rPr lang="en-US" b="1" baseline="-25000" dirty="0">
+                <a:latin typeface="Calibri" panose="020F0502020204030204" pitchFamily="34" charset="0"/>
+                <a:ea typeface="Calibri" panose="020F0502020204030204" pitchFamily="34" charset="0"/>
+                <a:cs typeface="Times New Roman" panose="02020603050405020304" pitchFamily="18" charset="0"/>
+              </a:rPr>
+              <a:t>i</a:t>
+            </a:r>
+            <a:r>
+              <a:rPr lang="en-US" b="1" dirty="0">
+                <a:latin typeface="Calibri" panose="020F0502020204030204" pitchFamily="34" charset="0"/>
+                <a:ea typeface="Calibri" panose="020F0502020204030204" pitchFamily="34" charset="0"/>
+                <a:cs typeface="Times New Roman" panose="02020603050405020304" pitchFamily="18" charset="0"/>
+              </a:rPr>
+              <a:t>[15]</a:t>
+            </a:r>
+            <a:r>
+              <a:rPr lang="en-US" dirty="0">
+                <a:latin typeface="Calibri" panose="020F0502020204030204" pitchFamily="34" charset="0"/>
+                <a:ea typeface="Calibri" panose="020F0502020204030204" pitchFamily="34" charset="0"/>
+                <a:cs typeface="Times New Roman" panose="02020603050405020304" pitchFamily="18" charset="0"/>
+              </a:rPr>
+              <a:t> = 15 </a:t>
+            </a:r>
+            <a:r>
+              <a:rPr lang="en-US" dirty="0">
+                <a:latin typeface="Cambria Math" panose="02040503050406030204" pitchFamily="18" charset="0"/>
+                <a:ea typeface="Calibri" panose="020F0502020204030204" pitchFamily="34" charset="0"/>
+                <a:cs typeface="Cambria Math" panose="02040503050406030204" pitchFamily="18" charset="0"/>
+              </a:rPr>
+              <a:t>⊕</a:t>
+            </a:r>
+            <a:r>
+              <a:rPr lang="en-US" dirty="0">
+                <a:latin typeface="Calibri" panose="020F0502020204030204" pitchFamily="34" charset="0"/>
+                <a:ea typeface="Calibri" panose="020F0502020204030204" pitchFamily="34" charset="0"/>
+                <a:cs typeface="Times New Roman" panose="02020603050405020304" pitchFamily="18" charset="0"/>
+              </a:rPr>
+              <a:t> C</a:t>
+            </a:r>
+            <a:r>
+              <a:rPr lang="en-US" baseline="-25000" dirty="0">
+                <a:latin typeface="Calibri" panose="020F0502020204030204" pitchFamily="34" charset="0"/>
+                <a:ea typeface="Calibri" panose="020F0502020204030204" pitchFamily="34" charset="0"/>
+                <a:cs typeface="Times New Roman" panose="02020603050405020304" pitchFamily="18" charset="0"/>
+              </a:rPr>
+              <a:t>n</a:t>
+            </a:r>
+            <a:r>
+              <a:rPr lang="en-US" baseline="-25000" dirty="0">
+                <a:latin typeface="Calibri" panose="020F0502020204030204" pitchFamily="34" charset="0"/>
+                <a:ea typeface="Calibri" panose="020F0502020204030204" pitchFamily="34" charset="0"/>
+                <a:cs typeface="Calibri" panose="020F0502020204030204" pitchFamily="34" charset="0"/>
+              </a:rPr>
+              <a:t>­</a:t>
+            </a:r>
+            <a:r>
+              <a:rPr lang="en-US" baseline="-25000" dirty="0">
+                <a:latin typeface="Calibri" panose="020F0502020204030204" pitchFamily="34" charset="0"/>
+                <a:ea typeface="Calibri" panose="020F0502020204030204" pitchFamily="34" charset="0"/>
+                <a:cs typeface="Times New Roman" panose="02020603050405020304" pitchFamily="18" charset="0"/>
+              </a:rPr>
+              <a:t>1</a:t>
+            </a:r>
+            <a:r>
+              <a:rPr lang="en-US" dirty="0">
+                <a:latin typeface="Calibri" panose="020F0502020204030204" pitchFamily="34" charset="0"/>
+                <a:ea typeface="Calibri" panose="020F0502020204030204" pitchFamily="34" charset="0"/>
+                <a:cs typeface="Times New Roman" panose="02020603050405020304" pitchFamily="18" charset="0"/>
+              </a:rPr>
+              <a:t>[15] </a:t>
+            </a:r>
+            <a:r>
+              <a:rPr lang="en-US" dirty="0">
+                <a:latin typeface="Cambria Math" panose="02040503050406030204" pitchFamily="18" charset="0"/>
+                <a:ea typeface="Calibri" panose="020F0502020204030204" pitchFamily="34" charset="0"/>
+                <a:cs typeface="Cambria Math" panose="02040503050406030204" pitchFamily="18" charset="0"/>
+              </a:rPr>
+              <a:t>⊕</a:t>
+            </a:r>
+            <a:r>
+              <a:rPr lang="en-US" dirty="0">
+                <a:latin typeface="Calibri" panose="020F0502020204030204" pitchFamily="34" charset="0"/>
+                <a:ea typeface="Calibri" panose="020F0502020204030204" pitchFamily="34" charset="0"/>
+                <a:cs typeface="Times New Roman" panose="02020603050405020304" pitchFamily="18" charset="0"/>
+              </a:rPr>
+              <a:t> C</a:t>
+            </a:r>
+            <a:r>
+              <a:rPr lang="en-US" baseline="-25000" dirty="0">
+                <a:latin typeface="Calibri" panose="020F0502020204030204" pitchFamily="34" charset="0"/>
+                <a:ea typeface="Calibri" panose="020F0502020204030204" pitchFamily="34" charset="0"/>
+                <a:cs typeface="Times New Roman" panose="02020603050405020304" pitchFamily="18" charset="0"/>
+              </a:rPr>
+              <a:t>i</a:t>
+            </a:r>
+            <a:r>
+              <a:rPr lang="en-US" baseline="-25000" dirty="0">
+                <a:latin typeface="Calibri" panose="020F0502020204030204" pitchFamily="34" charset="0"/>
+                <a:ea typeface="Calibri" panose="020F0502020204030204" pitchFamily="34" charset="0"/>
+                <a:cs typeface="Calibri" panose="020F0502020204030204" pitchFamily="34" charset="0"/>
+              </a:rPr>
+              <a:t>­</a:t>
+            </a:r>
+            <a:r>
+              <a:rPr lang="en-US" baseline="-25000" dirty="0">
+                <a:latin typeface="Calibri" panose="020F0502020204030204" pitchFamily="34" charset="0"/>
+                <a:ea typeface="Calibri" panose="020F0502020204030204" pitchFamily="34" charset="0"/>
+                <a:cs typeface="Times New Roman" panose="02020603050405020304" pitchFamily="18" charset="0"/>
+              </a:rPr>
+              <a:t>1</a:t>
+            </a:r>
+            <a:r>
+              <a:rPr lang="en-US" dirty="0">
+                <a:latin typeface="Calibri" panose="020F0502020204030204" pitchFamily="34" charset="0"/>
+                <a:ea typeface="Calibri" panose="020F0502020204030204" pitchFamily="34" charset="0"/>
+                <a:cs typeface="Times New Roman" panose="02020603050405020304" pitchFamily="18" charset="0"/>
+              </a:rPr>
+              <a:t>[15]</a:t>
+            </a:r>
+          </a:p>
+        </p:txBody>
+      </p:sp>
+      <p:sp>
+        <p:nvSpPr>
+          <p:cNvPr id="8" name="Arrow: Right 7">
+            <a:extLst>
+              <a:ext uri="{FF2B5EF4-FFF2-40B4-BE49-F238E27FC236}">
+                <a16:creationId xmlns:a16="http://schemas.microsoft.com/office/drawing/2014/main" id="{A46F2D64-1D0E-4613-AD0D-C313C2D383FF}"/>
+              </a:ext>
+            </a:extLst>
+          </p:cNvPr>
+          <p:cNvSpPr/>
+          <p:nvPr/>
+        </p:nvSpPr>
+        <p:spPr>
+          <a:xfrm rot="1491555">
+            <a:off x="3446713" y="3090178"/>
+            <a:ext cx="1847973" cy="340146"/>
+          </a:xfrm>
+          <a:prstGeom prst="rightArrow">
+            <a:avLst/>
+          </a:prstGeom>
+        </p:spPr>
+        <p:style>
+          <a:lnRef idx="2">
+            <a:schemeClr val="accent1">
+              <a:shade val="50000"/>
+            </a:schemeClr>
+          </a:lnRef>
+          <a:fillRef idx="1">
+            <a:schemeClr val="accent1"/>
+          </a:fillRef>
+          <a:effectRef idx="0">
+            <a:schemeClr val="accent1"/>
+          </a:effectRef>
+          <a:fontRef idx="minor">
+            <a:schemeClr val="lt1"/>
+          </a:fontRef>
+        </p:style>
+        <p:txBody>
+          <a:bodyPr rtlCol="0" anchor="ctr"/>
+          <a:lstStyle/>
+          <a:p>
+            <a:pPr algn="ctr"/>
+            <a:endParaRPr lang="en-US"/>
+          </a:p>
+        </p:txBody>
+      </p:sp>
+      <p:sp>
+        <p:nvSpPr>
+          <p:cNvPr id="22" name="Rectangle 21">
+            <a:extLst>
+              <a:ext uri="{FF2B5EF4-FFF2-40B4-BE49-F238E27FC236}">
+                <a16:creationId xmlns:a16="http://schemas.microsoft.com/office/drawing/2014/main" id="{3B3DC5C8-8637-4EB4-9F05-1EDBD92D0941}"/>
+              </a:ext>
+            </a:extLst>
+          </p:cNvPr>
+          <p:cNvSpPr/>
+          <p:nvPr/>
+        </p:nvSpPr>
+        <p:spPr>
+          <a:xfrm>
+            <a:off x="5351637" y="3681467"/>
+            <a:ext cx="925974" cy="243068"/>
+          </a:xfrm>
+          <a:prstGeom prst="rect">
+            <a:avLst/>
+          </a:prstGeom>
+          <a:solidFill>
+            <a:schemeClr val="bg1"/>
+          </a:solidFill>
+          <a:ln w="19050">
+            <a:solidFill>
+              <a:schemeClr val="tx1"/>
+            </a:solidFill>
+          </a:ln>
+        </p:spPr>
+        <p:style>
+          <a:lnRef idx="2">
+            <a:schemeClr val="accent1">
+              <a:shade val="50000"/>
+            </a:schemeClr>
+          </a:lnRef>
+          <a:fillRef idx="1">
+            <a:schemeClr val="accent1"/>
+          </a:fillRef>
+          <a:effectRef idx="0">
+            <a:schemeClr val="accent1"/>
+          </a:effectRef>
+          <a:fontRef idx="minor">
+            <a:schemeClr val="lt1"/>
+          </a:fontRef>
+        </p:style>
+        <p:txBody>
+          <a:bodyPr rtlCol="0" anchor="ctr"/>
+          <a:lstStyle/>
+          <a:p>
+            <a:pPr algn="ctr"/>
+            <a:r>
+              <a:rPr lang="en-US" i="1" dirty="0">
+                <a:solidFill>
+                  <a:schemeClr val="tx1"/>
+                </a:solidFill>
+              </a:rPr>
+              <a:t>C</a:t>
+            </a:r>
+            <a:r>
+              <a:rPr lang="en-US" sz="1400" i="1" dirty="0">
+                <a:solidFill>
+                  <a:schemeClr val="tx1"/>
+                </a:solidFill>
+              </a:rPr>
+              <a:t>i</a:t>
+            </a:r>
+            <a:endParaRPr lang="en-US" i="1" dirty="0">
+              <a:solidFill>
+                <a:schemeClr val="tx1"/>
+              </a:solidFill>
+            </a:endParaRPr>
+          </a:p>
+        </p:txBody>
+      </p:sp>
+      <p:sp>
+        <p:nvSpPr>
+          <p:cNvPr id="23" name="Rectangle 22">
+            <a:extLst>
+              <a:ext uri="{FF2B5EF4-FFF2-40B4-BE49-F238E27FC236}">
+                <a16:creationId xmlns:a16="http://schemas.microsoft.com/office/drawing/2014/main" id="{0573711B-C4B7-4D07-927F-4818F303B84E}"/>
+              </a:ext>
+            </a:extLst>
+          </p:cNvPr>
+          <p:cNvSpPr/>
+          <p:nvPr/>
+        </p:nvSpPr>
+        <p:spPr>
+          <a:xfrm>
+            <a:off x="5053974" y="603254"/>
+            <a:ext cx="925974" cy="243068"/>
+          </a:xfrm>
+          <a:prstGeom prst="rect">
+            <a:avLst/>
+          </a:prstGeom>
+          <a:solidFill>
+            <a:schemeClr val="bg1"/>
+          </a:solidFill>
+          <a:ln w="19050">
+            <a:solidFill>
+              <a:schemeClr val="tx1"/>
+            </a:solidFill>
+          </a:ln>
+        </p:spPr>
+        <p:style>
+          <a:lnRef idx="2">
+            <a:schemeClr val="accent1">
+              <a:shade val="50000"/>
+            </a:schemeClr>
+          </a:lnRef>
+          <a:fillRef idx="1">
+            <a:schemeClr val="accent1"/>
+          </a:fillRef>
+          <a:effectRef idx="0">
+            <a:schemeClr val="accent1"/>
+          </a:effectRef>
+          <a:fontRef idx="minor">
+            <a:schemeClr val="lt1"/>
+          </a:fontRef>
+        </p:style>
+        <p:txBody>
+          <a:bodyPr rtlCol="0" anchor="ctr"/>
+          <a:lstStyle/>
+          <a:p>
+            <a:pPr algn="ctr"/>
+            <a:r>
+              <a:rPr lang="en-US" sz="1600" b="1" dirty="0">
+                <a:solidFill>
+                  <a:schemeClr val="tx1"/>
+                </a:solidFill>
+              </a:rPr>
+              <a:t>xxxxx15</a:t>
+            </a:r>
+            <a:endParaRPr lang="en-US" sz="2000" b="1" dirty="0">
+              <a:solidFill>
+                <a:schemeClr val="tx1"/>
+              </a:solidFill>
+            </a:endParaRPr>
+          </a:p>
+        </p:txBody>
+      </p:sp>
+      <p:sp>
+        <p:nvSpPr>
+          <p:cNvPr id="10" name="TextBox 9">
+            <a:extLst>
+              <a:ext uri="{FF2B5EF4-FFF2-40B4-BE49-F238E27FC236}">
+                <a16:creationId xmlns:a16="http://schemas.microsoft.com/office/drawing/2014/main" id="{8521E3D1-597A-4E5B-A533-EC0B02B89CE5}"/>
+              </a:ext>
+            </a:extLst>
+          </p:cNvPr>
+          <p:cNvSpPr txBox="1"/>
+          <p:nvPr/>
+        </p:nvSpPr>
+        <p:spPr>
+          <a:xfrm>
+            <a:off x="5119911" y="274184"/>
+            <a:ext cx="1656223" cy="369332"/>
+          </a:xfrm>
+          <a:prstGeom prst="rect">
+            <a:avLst/>
+          </a:prstGeom>
+          <a:noFill/>
+        </p:spPr>
+        <p:txBody>
+          <a:bodyPr wrap="none" rtlCol="0">
+            <a:spAutoFit/>
+          </a:bodyPr>
+          <a:lstStyle/>
+          <a:p>
+            <a:r>
+              <a:rPr lang="en-US" dirty="0"/>
+              <a:t>padding </a:t>
+            </a:r>
+            <a:r>
+              <a:rPr lang="en-US" sz="1200" dirty="0"/>
+              <a:t>(full block)</a:t>
+            </a:r>
+          </a:p>
+        </p:txBody>
+      </p:sp>
+      <p:sp>
+        <p:nvSpPr>
+          <p:cNvPr id="24" name="Rectangle 23">
+            <a:extLst>
+              <a:ext uri="{FF2B5EF4-FFF2-40B4-BE49-F238E27FC236}">
+                <a16:creationId xmlns:a16="http://schemas.microsoft.com/office/drawing/2014/main" id="{7EC70D98-2060-4752-9547-771F4A176374}"/>
+              </a:ext>
+            </a:extLst>
+          </p:cNvPr>
+          <p:cNvSpPr/>
+          <p:nvPr/>
+        </p:nvSpPr>
+        <p:spPr>
+          <a:xfrm>
+            <a:off x="5351637" y="4890662"/>
+            <a:ext cx="925974" cy="243068"/>
+          </a:xfrm>
+          <a:prstGeom prst="rect">
+            <a:avLst/>
+          </a:prstGeom>
+          <a:solidFill>
+            <a:schemeClr val="bg1"/>
+          </a:solidFill>
+          <a:ln w="19050">
+            <a:solidFill>
+              <a:schemeClr val="tx1"/>
+            </a:solidFill>
+          </a:ln>
+        </p:spPr>
+        <p:style>
+          <a:lnRef idx="2">
+            <a:schemeClr val="accent1">
+              <a:shade val="50000"/>
+            </a:schemeClr>
+          </a:lnRef>
+          <a:fillRef idx="1">
+            <a:schemeClr val="accent1"/>
+          </a:fillRef>
+          <a:effectRef idx="0">
+            <a:schemeClr val="accent1"/>
+          </a:effectRef>
+          <a:fontRef idx="minor">
+            <a:schemeClr val="lt1"/>
+          </a:fontRef>
+        </p:style>
+        <p:txBody>
+          <a:bodyPr rtlCol="0" anchor="ctr"/>
+          <a:lstStyle/>
+          <a:p>
+            <a:pPr algn="ctr"/>
+            <a:r>
+              <a:rPr lang="en-US" i="1" dirty="0" err="1">
+                <a:solidFill>
+                  <a:schemeClr val="tx1"/>
+                </a:solidFill>
+              </a:rPr>
+              <a:t>D</a:t>
+            </a:r>
+            <a:r>
+              <a:rPr lang="en-US" sz="1400" i="1" dirty="0" err="1">
+                <a:solidFill>
+                  <a:schemeClr val="tx1"/>
+                </a:solidFill>
+              </a:rPr>
+              <a:t>k</a:t>
+            </a:r>
+            <a:r>
+              <a:rPr lang="en-US" i="1" dirty="0">
+                <a:solidFill>
+                  <a:schemeClr val="tx1"/>
+                </a:solidFill>
+              </a:rPr>
+              <a:t>(C</a:t>
+            </a:r>
+            <a:r>
+              <a:rPr lang="en-US" sz="1400" i="1" dirty="0">
+                <a:solidFill>
+                  <a:schemeClr val="tx1"/>
+                </a:solidFill>
+              </a:rPr>
+              <a:t>i</a:t>
+            </a:r>
+            <a:r>
+              <a:rPr lang="en-US" i="1" dirty="0">
+                <a:solidFill>
+                  <a:schemeClr val="tx1"/>
+                </a:solidFill>
+              </a:rPr>
+              <a:t>)</a:t>
+            </a:r>
+          </a:p>
+        </p:txBody>
+      </p:sp>
+      <p:sp>
+        <p:nvSpPr>
+          <p:cNvPr id="25" name="Rectangle 24">
+            <a:extLst>
+              <a:ext uri="{FF2B5EF4-FFF2-40B4-BE49-F238E27FC236}">
+                <a16:creationId xmlns:a16="http://schemas.microsoft.com/office/drawing/2014/main" id="{29E0872D-9CA2-4FCB-9043-3724F7083107}"/>
+              </a:ext>
+            </a:extLst>
+          </p:cNvPr>
+          <p:cNvSpPr/>
+          <p:nvPr/>
+        </p:nvSpPr>
+        <p:spPr>
+          <a:xfrm>
+            <a:off x="5361465" y="5533072"/>
+            <a:ext cx="925974" cy="243068"/>
+          </a:xfrm>
+          <a:prstGeom prst="rect">
+            <a:avLst/>
+          </a:prstGeom>
+          <a:solidFill>
+            <a:schemeClr val="bg1"/>
+          </a:solidFill>
+          <a:ln w="19050">
+            <a:solidFill>
+              <a:schemeClr val="tx1"/>
+            </a:solidFill>
+          </a:ln>
+        </p:spPr>
+        <p:style>
+          <a:lnRef idx="2">
+            <a:schemeClr val="accent1">
+              <a:shade val="50000"/>
+            </a:schemeClr>
+          </a:lnRef>
+          <a:fillRef idx="1">
+            <a:schemeClr val="accent1"/>
+          </a:fillRef>
+          <a:effectRef idx="0">
+            <a:schemeClr val="accent1"/>
+          </a:effectRef>
+          <a:fontRef idx="minor">
+            <a:schemeClr val="lt1"/>
+          </a:fontRef>
+        </p:style>
+        <p:txBody>
+          <a:bodyPr rtlCol="0" anchor="ctr"/>
+          <a:lstStyle/>
+          <a:p>
+            <a:pPr algn="ctr"/>
+            <a:r>
+              <a:rPr lang="en-US" sz="1600" b="1" dirty="0">
+                <a:solidFill>
+                  <a:schemeClr val="tx1"/>
+                </a:solidFill>
+              </a:rPr>
+              <a:t>xxxxx15</a:t>
+            </a:r>
+            <a:endParaRPr lang="en-US" sz="2000" b="1" dirty="0">
+              <a:solidFill>
+                <a:schemeClr val="tx1"/>
+              </a:solidFill>
+            </a:endParaRPr>
+          </a:p>
+        </p:txBody>
+      </p:sp>
+      <p:sp>
+        <p:nvSpPr>
+          <p:cNvPr id="26" name="Rectangle 25">
+            <a:extLst>
+              <a:ext uri="{FF2B5EF4-FFF2-40B4-BE49-F238E27FC236}">
+                <a16:creationId xmlns:a16="http://schemas.microsoft.com/office/drawing/2014/main" id="{141E9AFA-8575-489C-9E0D-D07D0EEBE48E}"/>
+              </a:ext>
+            </a:extLst>
+          </p:cNvPr>
+          <p:cNvSpPr/>
+          <p:nvPr/>
+        </p:nvSpPr>
+        <p:spPr>
+          <a:xfrm>
+            <a:off x="2851509" y="3666034"/>
+            <a:ext cx="925974" cy="243068"/>
+          </a:xfrm>
+          <a:prstGeom prst="rect">
+            <a:avLst/>
+          </a:prstGeom>
+          <a:solidFill>
+            <a:schemeClr val="bg1"/>
+          </a:solidFill>
+          <a:ln w="19050">
+            <a:solidFill>
+              <a:schemeClr val="tx1"/>
+            </a:solidFill>
+          </a:ln>
+        </p:spPr>
+        <p:style>
+          <a:lnRef idx="2">
+            <a:schemeClr val="accent1">
+              <a:shade val="50000"/>
+            </a:schemeClr>
+          </a:lnRef>
+          <a:fillRef idx="1">
+            <a:schemeClr val="accent1"/>
+          </a:fillRef>
+          <a:effectRef idx="0">
+            <a:schemeClr val="accent1"/>
+          </a:effectRef>
+          <a:fontRef idx="minor">
+            <a:schemeClr val="lt1"/>
+          </a:fontRef>
+        </p:style>
+        <p:txBody>
+          <a:bodyPr rtlCol="0" anchor="ctr"/>
+          <a:lstStyle/>
+          <a:p>
+            <a:pPr algn="ctr"/>
+            <a:r>
+              <a:rPr lang="en-US" i="1" dirty="0">
+                <a:solidFill>
+                  <a:schemeClr val="tx1"/>
+                </a:solidFill>
+              </a:rPr>
+              <a:t>C</a:t>
+            </a:r>
+            <a:r>
+              <a:rPr lang="en-US" sz="1400" i="1" dirty="0">
+                <a:solidFill>
+                  <a:schemeClr val="tx1"/>
+                </a:solidFill>
+              </a:rPr>
+              <a:t>n-1</a:t>
+            </a:r>
+            <a:endParaRPr lang="en-US" i="1" dirty="0">
+              <a:solidFill>
+                <a:schemeClr val="tx1"/>
+              </a:solidFill>
+            </a:endParaRPr>
+          </a:p>
+        </p:txBody>
+      </p:sp>
+      <p:sp>
+        <p:nvSpPr>
+          <p:cNvPr id="27" name="Rectangle 26">
+            <a:extLst>
+              <a:ext uri="{FF2B5EF4-FFF2-40B4-BE49-F238E27FC236}">
+                <a16:creationId xmlns:a16="http://schemas.microsoft.com/office/drawing/2014/main" id="{48C5A6F1-9C42-4497-A723-9B791B4E308C}"/>
+              </a:ext>
+            </a:extLst>
+          </p:cNvPr>
+          <p:cNvSpPr/>
+          <p:nvPr/>
+        </p:nvSpPr>
+        <p:spPr>
+          <a:xfrm>
+            <a:off x="2851509" y="5513100"/>
+            <a:ext cx="925974" cy="243068"/>
+          </a:xfrm>
+          <a:prstGeom prst="rect">
+            <a:avLst/>
+          </a:prstGeom>
+          <a:solidFill>
+            <a:schemeClr val="bg1"/>
+          </a:solidFill>
+          <a:ln w="19050">
+            <a:solidFill>
+              <a:schemeClr val="tx1"/>
+            </a:solidFill>
+          </a:ln>
+        </p:spPr>
+        <p:style>
+          <a:lnRef idx="2">
+            <a:schemeClr val="accent1">
+              <a:shade val="50000"/>
+            </a:schemeClr>
+          </a:lnRef>
+          <a:fillRef idx="1">
+            <a:schemeClr val="accent1"/>
+          </a:fillRef>
+          <a:effectRef idx="0">
+            <a:schemeClr val="accent1"/>
+          </a:effectRef>
+          <a:fontRef idx="minor">
+            <a:schemeClr val="lt1"/>
+          </a:fontRef>
+        </p:style>
+        <p:txBody>
+          <a:bodyPr rtlCol="0" anchor="ctr"/>
+          <a:lstStyle/>
+          <a:p>
+            <a:pPr algn="ctr"/>
+            <a:r>
+              <a:rPr lang="en-US" i="1" dirty="0">
+                <a:solidFill>
+                  <a:schemeClr val="tx1"/>
+                </a:solidFill>
+              </a:rPr>
+              <a:t>P</a:t>
+            </a:r>
+            <a:r>
+              <a:rPr lang="en-US" sz="1400" i="1" dirty="0">
+                <a:solidFill>
+                  <a:schemeClr val="tx1"/>
+                </a:solidFill>
+              </a:rPr>
+              <a:t>n-1</a:t>
+            </a:r>
+            <a:endParaRPr lang="en-US" i="1" dirty="0">
+              <a:solidFill>
+                <a:schemeClr val="tx1"/>
+              </a:solidFill>
+            </a:endParaRPr>
+          </a:p>
+        </p:txBody>
+      </p:sp>
+      <p:sp>
+        <p:nvSpPr>
+          <p:cNvPr id="28" name="Rectangle 27">
+            <a:extLst>
+              <a:ext uri="{FF2B5EF4-FFF2-40B4-BE49-F238E27FC236}">
+                <a16:creationId xmlns:a16="http://schemas.microsoft.com/office/drawing/2014/main" id="{CD42A929-4F4D-4576-8B7F-FF1F6DA3CB77}"/>
+              </a:ext>
+            </a:extLst>
+          </p:cNvPr>
+          <p:cNvSpPr/>
+          <p:nvPr/>
+        </p:nvSpPr>
+        <p:spPr>
+          <a:xfrm>
+            <a:off x="970465" y="3686786"/>
+            <a:ext cx="925974" cy="243068"/>
+          </a:xfrm>
+          <a:prstGeom prst="rect">
+            <a:avLst/>
+          </a:prstGeom>
+          <a:solidFill>
+            <a:schemeClr val="bg1"/>
+          </a:solidFill>
+          <a:ln w="19050">
+            <a:solidFill>
+              <a:schemeClr val="tx1"/>
+            </a:solidFill>
+          </a:ln>
+        </p:spPr>
+        <p:style>
+          <a:lnRef idx="2">
+            <a:schemeClr val="accent1">
+              <a:shade val="50000"/>
+            </a:schemeClr>
+          </a:lnRef>
+          <a:fillRef idx="1">
+            <a:schemeClr val="accent1"/>
+          </a:fillRef>
+          <a:effectRef idx="0">
+            <a:schemeClr val="accent1"/>
+          </a:effectRef>
+          <a:fontRef idx="minor">
+            <a:schemeClr val="lt1"/>
+          </a:fontRef>
+        </p:style>
+        <p:txBody>
+          <a:bodyPr rtlCol="0" anchor="ctr"/>
+          <a:lstStyle/>
+          <a:p>
+            <a:pPr algn="ctr"/>
+            <a:r>
+              <a:rPr lang="en-US" i="1" dirty="0">
+                <a:solidFill>
+                  <a:schemeClr val="tx1"/>
+                </a:solidFill>
+              </a:rPr>
+              <a:t>C</a:t>
+            </a:r>
+            <a:r>
+              <a:rPr lang="en-US" sz="1400" i="1" dirty="0">
+                <a:solidFill>
+                  <a:schemeClr val="tx1"/>
+                </a:solidFill>
+              </a:rPr>
+              <a:t>i</a:t>
+            </a:r>
+            <a:endParaRPr lang="en-US" i="1" dirty="0">
+              <a:solidFill>
+                <a:schemeClr val="tx1"/>
+              </a:solidFill>
+            </a:endParaRPr>
+          </a:p>
+        </p:txBody>
+      </p:sp>
+      <p:sp>
+        <p:nvSpPr>
+          <p:cNvPr id="29" name="Rectangle 28">
+            <a:extLst>
+              <a:ext uri="{FF2B5EF4-FFF2-40B4-BE49-F238E27FC236}">
+                <a16:creationId xmlns:a16="http://schemas.microsoft.com/office/drawing/2014/main" id="{8CA7E4B4-3F18-4E3F-92F3-96E59E7B93CF}"/>
+              </a:ext>
+            </a:extLst>
+          </p:cNvPr>
+          <p:cNvSpPr/>
+          <p:nvPr/>
+        </p:nvSpPr>
+        <p:spPr>
+          <a:xfrm>
+            <a:off x="987975" y="5567003"/>
+            <a:ext cx="925974" cy="243068"/>
+          </a:xfrm>
+          <a:prstGeom prst="rect">
+            <a:avLst/>
+          </a:prstGeom>
+          <a:solidFill>
+            <a:schemeClr val="bg1"/>
+          </a:solidFill>
+          <a:ln w="19050">
+            <a:solidFill>
+              <a:srgbClr val="FF0000"/>
+            </a:solidFill>
+          </a:ln>
+        </p:spPr>
+        <p:style>
+          <a:lnRef idx="2">
+            <a:schemeClr val="accent1">
+              <a:shade val="50000"/>
+            </a:schemeClr>
+          </a:lnRef>
+          <a:fillRef idx="1">
+            <a:schemeClr val="accent1"/>
+          </a:fillRef>
+          <a:effectRef idx="0">
+            <a:schemeClr val="accent1"/>
+          </a:effectRef>
+          <a:fontRef idx="minor">
+            <a:schemeClr val="lt1"/>
+          </a:fontRef>
+        </p:style>
+        <p:txBody>
+          <a:bodyPr rtlCol="0" anchor="ctr"/>
+          <a:lstStyle/>
+          <a:p>
+            <a:pPr algn="ctr"/>
+            <a:r>
+              <a:rPr lang="en-US" i="1" dirty="0">
+                <a:solidFill>
+                  <a:schemeClr val="tx1"/>
+                </a:solidFill>
+              </a:rPr>
+              <a:t>P</a:t>
+            </a:r>
+            <a:r>
+              <a:rPr lang="en-US" sz="1400" i="1" dirty="0">
+                <a:solidFill>
+                  <a:schemeClr val="tx1"/>
+                </a:solidFill>
+              </a:rPr>
+              <a:t>i</a:t>
+            </a:r>
+            <a:endParaRPr lang="en-US" i="1" dirty="0">
+              <a:solidFill>
+                <a:schemeClr val="tx1"/>
+              </a:solidFill>
+            </a:endParaRPr>
+          </a:p>
+        </p:txBody>
+      </p:sp>
+      <p:sp>
+        <p:nvSpPr>
+          <p:cNvPr id="30" name="Rectangle 29">
+            <a:extLst>
+              <a:ext uri="{FF2B5EF4-FFF2-40B4-BE49-F238E27FC236}">
+                <a16:creationId xmlns:a16="http://schemas.microsoft.com/office/drawing/2014/main" id="{FFEB3DE0-C42A-442A-9211-569B59028A44}"/>
+              </a:ext>
+            </a:extLst>
+          </p:cNvPr>
+          <p:cNvSpPr/>
+          <p:nvPr/>
+        </p:nvSpPr>
+        <p:spPr>
+          <a:xfrm>
+            <a:off x="102004" y="4890662"/>
+            <a:ext cx="781569" cy="263244"/>
+          </a:xfrm>
+          <a:prstGeom prst="rect">
+            <a:avLst/>
+          </a:prstGeom>
+          <a:solidFill>
+            <a:schemeClr val="bg1"/>
+          </a:solidFill>
+          <a:ln w="19050">
+            <a:solidFill>
+              <a:schemeClr val="tx1"/>
+            </a:solidFill>
+          </a:ln>
+        </p:spPr>
+        <p:style>
+          <a:lnRef idx="2">
+            <a:schemeClr val="accent1">
+              <a:shade val="50000"/>
+            </a:schemeClr>
+          </a:lnRef>
+          <a:fillRef idx="1">
+            <a:schemeClr val="accent1"/>
+          </a:fillRef>
+          <a:effectRef idx="0">
+            <a:schemeClr val="accent1"/>
+          </a:effectRef>
+          <a:fontRef idx="minor">
+            <a:schemeClr val="lt1"/>
+          </a:fontRef>
+        </p:style>
+        <p:txBody>
+          <a:bodyPr rtlCol="0" anchor="ctr"/>
+          <a:lstStyle/>
+          <a:p>
+            <a:pPr algn="ctr"/>
+            <a:r>
+              <a:rPr lang="en-US" i="1" dirty="0">
+                <a:solidFill>
+                  <a:schemeClr val="tx1"/>
+                </a:solidFill>
+              </a:rPr>
+              <a:t>C</a:t>
+            </a:r>
+            <a:r>
+              <a:rPr lang="en-US" sz="1400" i="1" dirty="0">
+                <a:solidFill>
+                  <a:schemeClr val="tx1"/>
+                </a:solidFill>
+              </a:rPr>
+              <a:t>i-1</a:t>
+            </a:r>
+            <a:endParaRPr lang="en-US" i="1" dirty="0">
+              <a:solidFill>
+                <a:schemeClr val="tx1"/>
+              </a:solidFill>
+            </a:endParaRPr>
+          </a:p>
+        </p:txBody>
+      </p:sp>
+      <p:sp>
+        <p:nvSpPr>
+          <p:cNvPr id="31" name="Rectangle 30">
+            <a:extLst>
+              <a:ext uri="{FF2B5EF4-FFF2-40B4-BE49-F238E27FC236}">
+                <a16:creationId xmlns:a16="http://schemas.microsoft.com/office/drawing/2014/main" id="{7E16198B-FF77-4C6A-8D65-0DF3A848DF5A}"/>
+              </a:ext>
+            </a:extLst>
+          </p:cNvPr>
+          <p:cNvSpPr/>
+          <p:nvPr/>
+        </p:nvSpPr>
+        <p:spPr>
+          <a:xfrm>
+            <a:off x="5028064" y="5180059"/>
+            <a:ext cx="417102" cy="461665"/>
+          </a:xfrm>
+          <a:prstGeom prst="rect">
+            <a:avLst/>
+          </a:prstGeom>
+          <a:noFill/>
+        </p:spPr>
+        <p:txBody>
+          <a:bodyPr wrap="none" lIns="91440" tIns="45720" rIns="91440" bIns="45720">
+            <a:spAutoFit/>
+          </a:bodyPr>
+          <a:lstStyle/>
+          <a:p>
+            <a:pPr algn="ctr"/>
+            <a:r>
+              <a:rPr lang="en-US" sz="2400" dirty="0">
+                <a:ln w="0"/>
+                <a:solidFill>
+                  <a:srgbClr val="FF0000"/>
+                </a:solidFill>
+                <a:effectLst>
+                  <a:outerShdw blurRad="38100" dist="19050" dir="2700000" algn="tl" rotWithShape="0">
+                    <a:schemeClr val="dk1">
+                      <a:alpha val="40000"/>
+                    </a:schemeClr>
+                  </a:outerShdw>
+                </a:effectLst>
+              </a:rPr>
+              <a:t>1.</a:t>
+            </a:r>
+          </a:p>
+        </p:txBody>
+      </p:sp>
+      <p:sp>
+        <p:nvSpPr>
+          <p:cNvPr id="32" name="Rectangle 31">
+            <a:extLst>
+              <a:ext uri="{FF2B5EF4-FFF2-40B4-BE49-F238E27FC236}">
+                <a16:creationId xmlns:a16="http://schemas.microsoft.com/office/drawing/2014/main" id="{EAD8B88D-DD0C-4CDD-9E7F-CFDEEAC0315D}"/>
+              </a:ext>
+            </a:extLst>
+          </p:cNvPr>
+          <p:cNvSpPr/>
+          <p:nvPr/>
+        </p:nvSpPr>
+        <p:spPr>
+          <a:xfrm>
+            <a:off x="425507" y="5172969"/>
+            <a:ext cx="795411" cy="461665"/>
+          </a:xfrm>
+          <a:prstGeom prst="rect">
+            <a:avLst/>
+          </a:prstGeom>
+          <a:noFill/>
+        </p:spPr>
+        <p:txBody>
+          <a:bodyPr wrap="none" lIns="91440" tIns="45720" rIns="91440" bIns="45720">
+            <a:spAutoFit/>
+          </a:bodyPr>
+          <a:lstStyle/>
+          <a:p>
+            <a:pPr algn="ctr"/>
+            <a:r>
+              <a:rPr lang="en-US" sz="2400" dirty="0">
+                <a:ln w="0"/>
+                <a:solidFill>
+                  <a:srgbClr val="FF0000"/>
+                </a:solidFill>
+                <a:effectLst>
+                  <a:outerShdw blurRad="38100" dist="19050" dir="2700000" algn="tl" rotWithShape="0">
+                    <a:schemeClr val="dk1">
+                      <a:alpha val="40000"/>
+                    </a:schemeClr>
+                  </a:outerShdw>
+                </a:effectLst>
+              </a:rPr>
+              <a:t>2., 3.</a:t>
+            </a:r>
+          </a:p>
+        </p:txBody>
+      </p:sp>
+      <p:sp>
+        <p:nvSpPr>
+          <p:cNvPr id="33" name="Rectangle 32">
+            <a:extLst>
+              <a:ext uri="{FF2B5EF4-FFF2-40B4-BE49-F238E27FC236}">
+                <a16:creationId xmlns:a16="http://schemas.microsoft.com/office/drawing/2014/main" id="{F1342484-5E10-43A5-97EE-F05CAD9D11EE}"/>
+              </a:ext>
+            </a:extLst>
+          </p:cNvPr>
+          <p:cNvSpPr/>
+          <p:nvPr/>
+        </p:nvSpPr>
+        <p:spPr>
+          <a:xfrm>
+            <a:off x="992299" y="4873597"/>
+            <a:ext cx="925974" cy="243068"/>
+          </a:xfrm>
+          <a:prstGeom prst="rect">
+            <a:avLst/>
+          </a:prstGeom>
+          <a:solidFill>
+            <a:schemeClr val="bg1"/>
+          </a:solidFill>
+          <a:ln w="19050">
+            <a:solidFill>
+              <a:schemeClr val="tx1"/>
+            </a:solidFill>
+          </a:ln>
+        </p:spPr>
+        <p:style>
+          <a:lnRef idx="2">
+            <a:schemeClr val="accent1">
+              <a:shade val="50000"/>
+            </a:schemeClr>
+          </a:lnRef>
+          <a:fillRef idx="1">
+            <a:schemeClr val="accent1"/>
+          </a:fillRef>
+          <a:effectRef idx="0">
+            <a:schemeClr val="accent1"/>
+          </a:effectRef>
+          <a:fontRef idx="minor">
+            <a:schemeClr val="lt1"/>
+          </a:fontRef>
+        </p:style>
+        <p:txBody>
+          <a:bodyPr rtlCol="0" anchor="ctr"/>
+          <a:lstStyle/>
+          <a:p>
+            <a:pPr algn="ctr"/>
+            <a:r>
+              <a:rPr lang="en-US" i="1" dirty="0" err="1">
+                <a:solidFill>
+                  <a:schemeClr val="tx1"/>
+                </a:solidFill>
+              </a:rPr>
+              <a:t>D</a:t>
+            </a:r>
+            <a:r>
+              <a:rPr lang="en-US" sz="1400" i="1" dirty="0" err="1">
+                <a:solidFill>
+                  <a:schemeClr val="tx1"/>
+                </a:solidFill>
+              </a:rPr>
+              <a:t>k</a:t>
+            </a:r>
+            <a:r>
+              <a:rPr lang="en-US" i="1" dirty="0">
+                <a:solidFill>
+                  <a:schemeClr val="tx1"/>
+                </a:solidFill>
+              </a:rPr>
+              <a:t>(C</a:t>
+            </a:r>
+            <a:r>
+              <a:rPr lang="en-US" sz="1400" i="1" dirty="0">
+                <a:solidFill>
+                  <a:schemeClr val="tx1"/>
+                </a:solidFill>
+              </a:rPr>
+              <a:t>i</a:t>
+            </a:r>
+            <a:r>
+              <a:rPr lang="en-US" i="1" dirty="0">
+                <a:solidFill>
+                  <a:schemeClr val="tx1"/>
+                </a:solidFill>
+              </a:rPr>
+              <a:t>)</a:t>
+            </a:r>
+          </a:p>
+        </p:txBody>
+      </p:sp>
+      <p:sp>
+        <p:nvSpPr>
+          <p:cNvPr id="34" name="TextBox 33">
+            <a:extLst>
+              <a:ext uri="{FF2B5EF4-FFF2-40B4-BE49-F238E27FC236}">
+                <a16:creationId xmlns:a16="http://schemas.microsoft.com/office/drawing/2014/main" id="{4208EDF7-B6E6-43D1-96DF-D614F0508923}"/>
+              </a:ext>
+            </a:extLst>
+          </p:cNvPr>
+          <p:cNvSpPr txBox="1"/>
+          <p:nvPr/>
+        </p:nvSpPr>
+        <p:spPr>
+          <a:xfrm>
+            <a:off x="1248248" y="108871"/>
+            <a:ext cx="1590692" cy="369332"/>
+          </a:xfrm>
+          <a:prstGeom prst="rect">
+            <a:avLst/>
+          </a:prstGeom>
+          <a:noFill/>
+        </p:spPr>
+        <p:txBody>
+          <a:bodyPr wrap="none" rtlCol="0">
+            <a:spAutoFit/>
+          </a:bodyPr>
+          <a:lstStyle/>
+          <a:p>
+            <a:r>
+              <a:rPr lang="en-US" dirty="0"/>
+              <a:t>16-byte blocks</a:t>
+            </a:r>
+            <a:endParaRPr lang="en-US" sz="1200" dirty="0"/>
+          </a:p>
+        </p:txBody>
+      </p:sp>
     </p:spTree>
     <p:extLst>
       <p:ext uri="{BB962C8B-B14F-4D97-AF65-F5344CB8AC3E}">
         <p14:creationId xmlns:p14="http://schemas.microsoft.com/office/powerpoint/2010/main" val="3485554716"/>
+      </p:ext>
+    </p:extLst>
+  </p:cSld>
+  <p:clrMapOvr>
+    <a:masterClrMapping/>
+  </p:clrMapOvr>
+</p:sld>
+</file>
+
+<file path=ppt/slides/slide7.xml><?xml version="1.0" encoding="utf-8"?>
+<p:sld xmlns:a="http://schemas.openxmlformats.org/drawingml/2006/main" xmlns:r="http://schemas.openxmlformats.org/officeDocument/2006/relationships" xmlns:p="http://schemas.openxmlformats.org/presentationml/2006/main">
+  <p:cSld>
+    <p:spTree>
+      <p:nvGrpSpPr>
+        <p:cNvPr id="1" name=""/>
+        <p:cNvGrpSpPr/>
+        <p:nvPr/>
+      </p:nvGrpSpPr>
+      <p:grpSpPr>
+        <a:xfrm>
+          <a:off x="0" y="0"/>
+          <a:ext cx="0" cy="0"/>
+          <a:chOff x="0" y="0"/>
+          <a:chExt cx="0" cy="0"/>
+        </a:xfrm>
+      </p:grpSpPr>
+      <p:sp>
+        <p:nvSpPr>
+          <p:cNvPr id="2" name="Title 1">
+            <a:extLst>
+              <a:ext uri="{FF2B5EF4-FFF2-40B4-BE49-F238E27FC236}">
+                <a16:creationId xmlns:a16="http://schemas.microsoft.com/office/drawing/2014/main" id="{192D89FB-05EA-420A-A11A-E46B908CCC7A}"/>
+              </a:ext>
+            </a:extLst>
+          </p:cNvPr>
+          <p:cNvSpPr>
+            <a:spLocks noGrp="1"/>
+          </p:cNvSpPr>
+          <p:nvPr>
+            <p:ph type="title"/>
+          </p:nvPr>
+        </p:nvSpPr>
+        <p:spPr/>
+        <p:txBody>
+          <a:bodyPr/>
+          <a:lstStyle/>
+          <a:p>
+            <a:r>
+              <a:rPr lang="en-US" dirty="0"/>
+              <a:t>Defense Idea: Record Splitting</a:t>
+            </a:r>
+          </a:p>
+        </p:txBody>
+      </p:sp>
+      <p:sp>
+        <p:nvSpPr>
+          <p:cNvPr id="3" name="Content Placeholder 2">
+            <a:extLst>
+              <a:ext uri="{FF2B5EF4-FFF2-40B4-BE49-F238E27FC236}">
+                <a16:creationId xmlns:a16="http://schemas.microsoft.com/office/drawing/2014/main" id="{5425A1EC-6D6F-4E79-962E-A97E57038B26}"/>
+              </a:ext>
+            </a:extLst>
+          </p:cNvPr>
+          <p:cNvSpPr>
+            <a:spLocks noGrp="1"/>
+          </p:cNvSpPr>
+          <p:nvPr>
+            <p:ph idx="1"/>
+          </p:nvPr>
+        </p:nvSpPr>
+        <p:spPr/>
+        <p:txBody>
+          <a:bodyPr>
+            <a:normAutofit fontScale="77500" lnSpcReduction="20000"/>
+          </a:bodyPr>
+          <a:lstStyle/>
+          <a:p>
+            <a:r>
+              <a:rPr lang="en-US" dirty="0"/>
+              <a:t>Now running the attack with the browser implementing 6/n-6 record splitting anytime it receives a message length where length(message +MAC) % 16 ==0, i.e. a message that would result in a full block of padding.  Upon identifying this condition, the browser splits the record into two records.  The first record contains the first 6 bytes of the plaintext message, and the second record contains the remaining n-6 bytes.  Both records are then independently </a:t>
+            </a:r>
+            <a:r>
+              <a:rPr lang="en-US" dirty="0" err="1"/>
+              <a:t>MAC’d</a:t>
+            </a:r>
+            <a:r>
+              <a:rPr lang="en-US" dirty="0"/>
+              <a:t>, padded, and encrypted.  The effect is that the 20-byte MAC is pushed into the final message block, so that both messages contain 10 bytes of MAC, and 6 bytes of padding.  This now decreases the probability that an attacker can replace the final block and achieve a successful match of both the final byte of padding AND 10 bytes of MAC in the last block from 1/256 to 1/2</a:t>
+            </a:r>
+            <a:r>
+              <a:rPr lang="en-US" baseline="30000" dirty="0"/>
+              <a:t>88</a:t>
+            </a:r>
+            <a:r>
+              <a:rPr lang="en-US" dirty="0"/>
+              <a:t> = 3.23x10</a:t>
+            </a:r>
+            <a:r>
+              <a:rPr lang="en-US" baseline="30000" dirty="0"/>
+              <a:t>-27</a:t>
+            </a:r>
+            <a:r>
+              <a:rPr lang="en-US" dirty="0"/>
+              <a:t>.  This makes a successful attack much less likely.  As seen below, the attacker is not successful after 3,000 oracle requests.  Of course the ultimate solution is to disable SSLv3 altogether, as modern browsers have now done, but this record splitting may server as an effective interim solution.  In fact, the Opera browser did implement some kind of anti-POODLE record splitting in its browser for a short period before SSLv3 was entirely deprecated, but I don’t have any information on their approach or algorithm.</a:t>
+            </a:r>
+          </a:p>
+        </p:txBody>
+      </p:sp>
+    </p:spTree>
+    <p:extLst>
+      <p:ext uri="{BB962C8B-B14F-4D97-AF65-F5344CB8AC3E}">
+        <p14:creationId xmlns:p14="http://schemas.microsoft.com/office/powerpoint/2010/main" val="297830821"/>
       </p:ext>
     </p:extLst>
   </p:cSld>

</xml_diff>